<commit_message>
Work on presentation and online hosting
</commit_message>
<xml_diff>
--- a/research/Usability Testing Presentation.pptx
+++ b/research/Usability Testing Presentation.pptx
@@ -4,11 +4,14 @@
   <p:sldMasterIdLst>
     <p:sldMasterId id="2147483648" r:id="rId1"/>
   </p:sldMasterIdLst>
+  <p:notesMasterIdLst>
+    <p:notesMasterId r:id="rId7"/>
+  </p:notesMasterIdLst>
   <p:sldIdLst>
     <p:sldId id="256" r:id="rId2"/>
     <p:sldId id="257" r:id="rId3"/>
-    <p:sldId id="259" r:id="rId4"/>
-    <p:sldId id="260" r:id="rId5"/>
+    <p:sldId id="261" r:id="rId4"/>
+    <p:sldId id="262" r:id="rId5"/>
     <p:sldId id="258" r:id="rId6"/>
   </p:sldIdLst>
   <p:sldSz cx="12192000" cy="6858000"/>
@@ -108,7 +111,639 @@
       </a:defRPr>
     </a:lvl9pPr>
   </p:defaultTextStyle>
+  <p:extLst>
+    <p:ext uri="{EFAFB233-063F-42B5-8137-9DF3F51BA10A}">
+      <p15:sldGuideLst xmlns:p15="http://schemas.microsoft.com/office/powerpoint/2012/main"/>
+    </p:ext>
+  </p:extLst>
 </p:presentation>
+</file>
+
+<file path=ppt/notesMasters/notesMaster1.xml><?xml version="1.0" encoding="utf-8"?>
+<p:notesMaster xmlns:a="http://schemas.openxmlformats.org/drawingml/2006/main" xmlns:r="http://schemas.openxmlformats.org/officeDocument/2006/relationships" xmlns:p="http://schemas.openxmlformats.org/presentationml/2006/main">
+  <p:cSld>
+    <p:bg>
+      <p:bgRef idx="1001">
+        <a:schemeClr val="bg1"/>
+      </p:bgRef>
+    </p:bg>
+    <p:spTree>
+      <p:nvGrpSpPr>
+        <p:cNvPr id="1" name=""/>
+        <p:cNvGrpSpPr/>
+        <p:nvPr/>
+      </p:nvGrpSpPr>
+      <p:grpSpPr>
+        <a:xfrm>
+          <a:off x="0" y="0"/>
+          <a:ext cx="0" cy="0"/>
+          <a:chOff x="0" y="0"/>
+          <a:chExt cx="0" cy="0"/>
+        </a:xfrm>
+      </p:grpSpPr>
+      <p:sp>
+        <p:nvSpPr>
+          <p:cNvPr id="2" name="Header Placeholder 1"/>
+          <p:cNvSpPr>
+            <a:spLocks noGrp="1"/>
+          </p:cNvSpPr>
+          <p:nvPr>
+            <p:ph type="hdr" sz="quarter"/>
+          </p:nvPr>
+        </p:nvSpPr>
+        <p:spPr>
+          <a:xfrm>
+            <a:off x="0" y="0"/>
+            <a:ext cx="2971800" cy="458788"/>
+          </a:xfrm>
+          <a:prstGeom prst="rect">
+            <a:avLst/>
+          </a:prstGeom>
+        </p:spPr>
+        <p:txBody>
+          <a:bodyPr vert="horz" lIns="91440" tIns="45720" rIns="91440" bIns="45720" rtlCol="0"/>
+          <a:lstStyle>
+            <a:lvl1pPr algn="l">
+              <a:defRPr sz="1200"/>
+            </a:lvl1pPr>
+          </a:lstStyle>
+          <a:p>
+            <a:endParaRPr lang="en-GB"/>
+          </a:p>
+        </p:txBody>
+      </p:sp>
+      <p:sp>
+        <p:nvSpPr>
+          <p:cNvPr id="3" name="Date Placeholder 2"/>
+          <p:cNvSpPr>
+            <a:spLocks noGrp="1"/>
+          </p:cNvSpPr>
+          <p:nvPr>
+            <p:ph type="dt" idx="1"/>
+          </p:nvPr>
+        </p:nvSpPr>
+        <p:spPr>
+          <a:xfrm>
+            <a:off x="3884613" y="0"/>
+            <a:ext cx="2971800" cy="458788"/>
+          </a:xfrm>
+          <a:prstGeom prst="rect">
+            <a:avLst/>
+          </a:prstGeom>
+        </p:spPr>
+        <p:txBody>
+          <a:bodyPr vert="horz" lIns="91440" tIns="45720" rIns="91440" bIns="45720" rtlCol="0"/>
+          <a:lstStyle>
+            <a:lvl1pPr algn="r">
+              <a:defRPr sz="1200"/>
+            </a:lvl1pPr>
+          </a:lstStyle>
+          <a:p>
+            <a:fld id="{A4B94F35-941F-4679-9C47-BB5DBD679134}" type="datetimeFigureOut">
+              <a:rPr lang="en-GB" smtClean="0"/>
+              <a:t>17/01/2023</a:t>
+            </a:fld>
+            <a:endParaRPr lang="en-GB"/>
+          </a:p>
+        </p:txBody>
+      </p:sp>
+      <p:sp>
+        <p:nvSpPr>
+          <p:cNvPr id="4" name="Slide Image Placeholder 3"/>
+          <p:cNvSpPr>
+            <a:spLocks noGrp="1" noRot="1" noChangeAspect="1"/>
+          </p:cNvSpPr>
+          <p:nvPr>
+            <p:ph type="sldImg" idx="2"/>
+          </p:nvPr>
+        </p:nvSpPr>
+        <p:spPr>
+          <a:xfrm>
+            <a:off x="685800" y="1143000"/>
+            <a:ext cx="5486400" cy="3086100"/>
+          </a:xfrm>
+          <a:prstGeom prst="rect">
+            <a:avLst/>
+          </a:prstGeom>
+          <a:noFill/>
+          <a:ln w="12700">
+            <a:solidFill>
+              <a:prstClr val="black"/>
+            </a:solidFill>
+          </a:ln>
+        </p:spPr>
+        <p:txBody>
+          <a:bodyPr vert="horz" lIns="91440" tIns="45720" rIns="91440" bIns="45720" rtlCol="0" anchor="ctr"/>
+          <a:lstStyle/>
+          <a:p>
+            <a:endParaRPr lang="en-GB"/>
+          </a:p>
+        </p:txBody>
+      </p:sp>
+      <p:sp>
+        <p:nvSpPr>
+          <p:cNvPr id="5" name="Notes Placeholder 4"/>
+          <p:cNvSpPr>
+            <a:spLocks noGrp="1"/>
+          </p:cNvSpPr>
+          <p:nvPr>
+            <p:ph type="body" sz="quarter" idx="3"/>
+          </p:nvPr>
+        </p:nvSpPr>
+        <p:spPr>
+          <a:xfrm>
+            <a:off x="685800" y="4400550"/>
+            <a:ext cx="5486400" cy="3600450"/>
+          </a:xfrm>
+          <a:prstGeom prst="rect">
+            <a:avLst/>
+          </a:prstGeom>
+        </p:spPr>
+        <p:txBody>
+          <a:bodyPr vert="horz" lIns="91440" tIns="45720" rIns="91440" bIns="45720" rtlCol="0"/>
+          <a:lstStyle/>
+          <a:p>
+            <a:pPr lvl="0"/>
+            <a:r>
+              <a:rPr lang="en-US"/>
+              <a:t>Click to edit Master text styles</a:t>
+            </a:r>
+          </a:p>
+          <a:p>
+            <a:pPr lvl="1"/>
+            <a:r>
+              <a:rPr lang="en-US"/>
+              <a:t>Second level</a:t>
+            </a:r>
+          </a:p>
+          <a:p>
+            <a:pPr lvl="2"/>
+            <a:r>
+              <a:rPr lang="en-US"/>
+              <a:t>Third level</a:t>
+            </a:r>
+          </a:p>
+          <a:p>
+            <a:pPr lvl="3"/>
+            <a:r>
+              <a:rPr lang="en-US"/>
+              <a:t>Fourth level</a:t>
+            </a:r>
+          </a:p>
+          <a:p>
+            <a:pPr lvl="4"/>
+            <a:r>
+              <a:rPr lang="en-US"/>
+              <a:t>Fifth level</a:t>
+            </a:r>
+            <a:endParaRPr lang="en-GB"/>
+          </a:p>
+        </p:txBody>
+      </p:sp>
+      <p:sp>
+        <p:nvSpPr>
+          <p:cNvPr id="6" name="Footer Placeholder 5"/>
+          <p:cNvSpPr>
+            <a:spLocks noGrp="1"/>
+          </p:cNvSpPr>
+          <p:nvPr>
+            <p:ph type="ftr" sz="quarter" idx="4"/>
+          </p:nvPr>
+        </p:nvSpPr>
+        <p:spPr>
+          <a:xfrm>
+            <a:off x="0" y="8685213"/>
+            <a:ext cx="2971800" cy="458787"/>
+          </a:xfrm>
+          <a:prstGeom prst="rect">
+            <a:avLst/>
+          </a:prstGeom>
+        </p:spPr>
+        <p:txBody>
+          <a:bodyPr vert="horz" lIns="91440" tIns="45720" rIns="91440" bIns="45720" rtlCol="0" anchor="b"/>
+          <a:lstStyle>
+            <a:lvl1pPr algn="l">
+              <a:defRPr sz="1200"/>
+            </a:lvl1pPr>
+          </a:lstStyle>
+          <a:p>
+            <a:endParaRPr lang="en-GB"/>
+          </a:p>
+        </p:txBody>
+      </p:sp>
+      <p:sp>
+        <p:nvSpPr>
+          <p:cNvPr id="7" name="Slide Number Placeholder 6"/>
+          <p:cNvSpPr>
+            <a:spLocks noGrp="1"/>
+          </p:cNvSpPr>
+          <p:nvPr>
+            <p:ph type="sldNum" sz="quarter" idx="5"/>
+          </p:nvPr>
+        </p:nvSpPr>
+        <p:spPr>
+          <a:xfrm>
+            <a:off x="3884613" y="8685213"/>
+            <a:ext cx="2971800" cy="458787"/>
+          </a:xfrm>
+          <a:prstGeom prst="rect">
+            <a:avLst/>
+          </a:prstGeom>
+        </p:spPr>
+        <p:txBody>
+          <a:bodyPr vert="horz" lIns="91440" tIns="45720" rIns="91440" bIns="45720" rtlCol="0" anchor="b"/>
+          <a:lstStyle>
+            <a:lvl1pPr algn="r">
+              <a:defRPr sz="1200"/>
+            </a:lvl1pPr>
+          </a:lstStyle>
+          <a:p>
+            <a:fld id="{0FCFED6C-7B9F-4E48-89DA-B7F4954BD38C}" type="slidenum">
+              <a:rPr lang="en-GB" smtClean="0"/>
+              <a:t>‹#›</a:t>
+            </a:fld>
+            <a:endParaRPr lang="en-GB"/>
+          </a:p>
+        </p:txBody>
+      </p:sp>
+    </p:spTree>
+    <p:extLst>
+      <p:ext uri="{BB962C8B-B14F-4D97-AF65-F5344CB8AC3E}">
+        <p14:creationId xmlns:p14="http://schemas.microsoft.com/office/powerpoint/2010/main" val="3010530275"/>
+      </p:ext>
+    </p:extLst>
+  </p:cSld>
+  <p:clrMap bg1="lt1" tx1="dk1" bg2="lt2" tx2="dk2" accent1="accent1" accent2="accent2" accent3="accent3" accent4="accent4" accent5="accent5" accent6="accent6" hlink="hlink" folHlink="folHlink"/>
+  <p:notesStyle>
+    <a:lvl1pPr marL="0" algn="l" defTabSz="914400" rtl="0" eaLnBrk="1" latinLnBrk="0" hangingPunct="1">
+      <a:defRPr sz="1200" kern="1200">
+        <a:solidFill>
+          <a:schemeClr val="tx1"/>
+        </a:solidFill>
+        <a:latin typeface="+mn-lt"/>
+        <a:ea typeface="+mn-ea"/>
+        <a:cs typeface="+mn-cs"/>
+      </a:defRPr>
+    </a:lvl1pPr>
+    <a:lvl2pPr marL="457200" algn="l" defTabSz="914400" rtl="0" eaLnBrk="1" latinLnBrk="0" hangingPunct="1">
+      <a:defRPr sz="1200" kern="1200">
+        <a:solidFill>
+          <a:schemeClr val="tx1"/>
+        </a:solidFill>
+        <a:latin typeface="+mn-lt"/>
+        <a:ea typeface="+mn-ea"/>
+        <a:cs typeface="+mn-cs"/>
+      </a:defRPr>
+    </a:lvl2pPr>
+    <a:lvl3pPr marL="914400" algn="l" defTabSz="914400" rtl="0" eaLnBrk="1" latinLnBrk="0" hangingPunct="1">
+      <a:defRPr sz="1200" kern="1200">
+        <a:solidFill>
+          <a:schemeClr val="tx1"/>
+        </a:solidFill>
+        <a:latin typeface="+mn-lt"/>
+        <a:ea typeface="+mn-ea"/>
+        <a:cs typeface="+mn-cs"/>
+      </a:defRPr>
+    </a:lvl3pPr>
+    <a:lvl4pPr marL="1371600" algn="l" defTabSz="914400" rtl="0" eaLnBrk="1" latinLnBrk="0" hangingPunct="1">
+      <a:defRPr sz="1200" kern="1200">
+        <a:solidFill>
+          <a:schemeClr val="tx1"/>
+        </a:solidFill>
+        <a:latin typeface="+mn-lt"/>
+        <a:ea typeface="+mn-ea"/>
+        <a:cs typeface="+mn-cs"/>
+      </a:defRPr>
+    </a:lvl4pPr>
+    <a:lvl5pPr marL="1828800" algn="l" defTabSz="914400" rtl="0" eaLnBrk="1" latinLnBrk="0" hangingPunct="1">
+      <a:defRPr sz="1200" kern="1200">
+        <a:solidFill>
+          <a:schemeClr val="tx1"/>
+        </a:solidFill>
+        <a:latin typeface="+mn-lt"/>
+        <a:ea typeface="+mn-ea"/>
+        <a:cs typeface="+mn-cs"/>
+      </a:defRPr>
+    </a:lvl5pPr>
+    <a:lvl6pPr marL="2286000" algn="l" defTabSz="914400" rtl="0" eaLnBrk="1" latinLnBrk="0" hangingPunct="1">
+      <a:defRPr sz="1200" kern="1200">
+        <a:solidFill>
+          <a:schemeClr val="tx1"/>
+        </a:solidFill>
+        <a:latin typeface="+mn-lt"/>
+        <a:ea typeface="+mn-ea"/>
+        <a:cs typeface="+mn-cs"/>
+      </a:defRPr>
+    </a:lvl6pPr>
+    <a:lvl7pPr marL="2743200" algn="l" defTabSz="914400" rtl="0" eaLnBrk="1" latinLnBrk="0" hangingPunct="1">
+      <a:defRPr sz="1200" kern="1200">
+        <a:solidFill>
+          <a:schemeClr val="tx1"/>
+        </a:solidFill>
+        <a:latin typeface="+mn-lt"/>
+        <a:ea typeface="+mn-ea"/>
+        <a:cs typeface="+mn-cs"/>
+      </a:defRPr>
+    </a:lvl7pPr>
+    <a:lvl8pPr marL="3200400" algn="l" defTabSz="914400" rtl="0" eaLnBrk="1" latinLnBrk="0" hangingPunct="1">
+      <a:defRPr sz="1200" kern="1200">
+        <a:solidFill>
+          <a:schemeClr val="tx1"/>
+        </a:solidFill>
+        <a:latin typeface="+mn-lt"/>
+        <a:ea typeface="+mn-ea"/>
+        <a:cs typeface="+mn-cs"/>
+      </a:defRPr>
+    </a:lvl8pPr>
+    <a:lvl9pPr marL="3657600" algn="l" defTabSz="914400" rtl="0" eaLnBrk="1" latinLnBrk="0" hangingPunct="1">
+      <a:defRPr sz="1200" kern="1200">
+        <a:solidFill>
+          <a:schemeClr val="tx1"/>
+        </a:solidFill>
+        <a:latin typeface="+mn-lt"/>
+        <a:ea typeface="+mn-ea"/>
+        <a:cs typeface="+mn-cs"/>
+      </a:defRPr>
+    </a:lvl9pPr>
+  </p:notesStyle>
+</p:notesMaster>
+</file>
+
+<file path=ppt/notesSlides/notesSlide1.xml><?xml version="1.0" encoding="utf-8"?>
+<p:notes xmlns:a="http://schemas.openxmlformats.org/drawingml/2006/main" xmlns:r="http://schemas.openxmlformats.org/officeDocument/2006/relationships" xmlns:p="http://schemas.openxmlformats.org/presentationml/2006/main">
+  <p:cSld>
+    <p:spTree>
+      <p:nvGrpSpPr>
+        <p:cNvPr id="1" name=""/>
+        <p:cNvGrpSpPr/>
+        <p:nvPr/>
+      </p:nvGrpSpPr>
+      <p:grpSpPr>
+        <a:xfrm>
+          <a:off x="0" y="0"/>
+          <a:ext cx="0" cy="0"/>
+          <a:chOff x="0" y="0"/>
+          <a:chExt cx="0" cy="0"/>
+        </a:xfrm>
+      </p:grpSpPr>
+      <p:sp>
+        <p:nvSpPr>
+          <p:cNvPr id="2" name="Slide Image Placeholder 1"/>
+          <p:cNvSpPr>
+            <a:spLocks noGrp="1" noRot="1" noChangeAspect="1"/>
+          </p:cNvSpPr>
+          <p:nvPr>
+            <p:ph type="sldImg"/>
+          </p:nvPr>
+        </p:nvSpPr>
+        <p:spPr/>
+      </p:sp>
+      <p:sp>
+        <p:nvSpPr>
+          <p:cNvPr id="3" name="Notes Placeholder 2"/>
+          <p:cNvSpPr>
+            <a:spLocks noGrp="1"/>
+          </p:cNvSpPr>
+          <p:nvPr>
+            <p:ph type="body" idx="1"/>
+          </p:nvPr>
+        </p:nvSpPr>
+        <p:spPr/>
+        <p:txBody>
+          <a:bodyPr/>
+          <a:lstStyle/>
+          <a:p>
+            <a:r>
+              <a:rPr lang="en-GB" dirty="0"/>
+              <a:t>After the presentation I will link a short 5-10 minutes questionnaire. If possible could you fill it out whenever possible so I can use the analysis in my dissertation. It’s on the effectiveness of the interface and visualisation. The questionnaire has a link to a mock version of the interface for you to try yourself.</a:t>
+            </a:r>
+          </a:p>
+        </p:txBody>
+      </p:sp>
+      <p:sp>
+        <p:nvSpPr>
+          <p:cNvPr id="4" name="Slide Number Placeholder 3"/>
+          <p:cNvSpPr>
+            <a:spLocks noGrp="1"/>
+          </p:cNvSpPr>
+          <p:nvPr>
+            <p:ph type="sldNum" sz="quarter" idx="5"/>
+          </p:nvPr>
+        </p:nvSpPr>
+        <p:spPr/>
+        <p:txBody>
+          <a:bodyPr/>
+          <a:lstStyle/>
+          <a:p>
+            <a:fld id="{0FCFED6C-7B9F-4E48-89DA-B7F4954BD38C}" type="slidenum">
+              <a:rPr lang="en-GB" smtClean="0"/>
+              <a:t>2</a:t>
+            </a:fld>
+            <a:endParaRPr lang="en-GB"/>
+          </a:p>
+        </p:txBody>
+      </p:sp>
+    </p:spTree>
+    <p:extLst>
+      <p:ext uri="{BB962C8B-B14F-4D97-AF65-F5344CB8AC3E}">
+        <p14:creationId xmlns:p14="http://schemas.microsoft.com/office/powerpoint/2010/main" val="405085906"/>
+      </p:ext>
+    </p:extLst>
+  </p:cSld>
+  <p:clrMapOvr>
+    <a:masterClrMapping/>
+  </p:clrMapOvr>
+</p:notes>
+</file>
+
+<file path=ppt/notesSlides/notesSlide2.xml><?xml version="1.0" encoding="utf-8"?>
+<p:notes xmlns:a="http://schemas.openxmlformats.org/drawingml/2006/main" xmlns:r="http://schemas.openxmlformats.org/officeDocument/2006/relationships" xmlns:p="http://schemas.openxmlformats.org/presentationml/2006/main">
+  <p:cSld>
+    <p:spTree>
+      <p:nvGrpSpPr>
+        <p:cNvPr id="1" name=""/>
+        <p:cNvGrpSpPr/>
+        <p:nvPr/>
+      </p:nvGrpSpPr>
+      <p:grpSpPr>
+        <a:xfrm>
+          <a:off x="0" y="0"/>
+          <a:ext cx="0" cy="0"/>
+          <a:chOff x="0" y="0"/>
+          <a:chExt cx="0" cy="0"/>
+        </a:xfrm>
+      </p:grpSpPr>
+      <p:sp>
+        <p:nvSpPr>
+          <p:cNvPr id="2" name="Slide Image Placeholder 1"/>
+          <p:cNvSpPr>
+            <a:spLocks noGrp="1" noRot="1" noChangeAspect="1"/>
+          </p:cNvSpPr>
+          <p:nvPr>
+            <p:ph type="sldImg"/>
+          </p:nvPr>
+        </p:nvSpPr>
+        <p:spPr/>
+      </p:sp>
+      <p:sp>
+        <p:nvSpPr>
+          <p:cNvPr id="3" name="Notes Placeholder 2"/>
+          <p:cNvSpPr>
+            <a:spLocks noGrp="1"/>
+          </p:cNvSpPr>
+          <p:nvPr>
+            <p:ph type="body" idx="1"/>
+          </p:nvPr>
+        </p:nvSpPr>
+        <p:spPr/>
+        <p:txBody>
+          <a:bodyPr/>
+          <a:lstStyle/>
+          <a:p>
+            <a:r>
+              <a:rPr lang="en-GB" dirty="0"/>
+              <a:t>Just to recap, </a:t>
+            </a:r>
+            <a:r>
+              <a:rPr lang="en-GB" dirty="0" err="1"/>
+              <a:t>biocaster</a:t>
+            </a:r>
+            <a:r>
+              <a:rPr lang="en-GB" dirty="0"/>
+              <a:t> currently gets its news information from RSS feeds. My individual project is to create a system which is more configurable and can use multiple different information sources, such as website scraping, to curate a wider range of news sources. This will be combined with a classifier to categorise the incoming articles. I am also creating a dashboard so that this system can be managed and you can see a </a:t>
+            </a:r>
+            <a:r>
+              <a:rPr lang="en-GB" dirty="0" err="1"/>
+              <a:t>kibana</a:t>
+            </a:r>
+            <a:r>
+              <a:rPr lang="en-GB" dirty="0"/>
+              <a:t> visualisation of the data gathered, which I will demonstrate today.</a:t>
+            </a:r>
+          </a:p>
+        </p:txBody>
+      </p:sp>
+      <p:sp>
+        <p:nvSpPr>
+          <p:cNvPr id="4" name="Slide Number Placeholder 3"/>
+          <p:cNvSpPr>
+            <a:spLocks noGrp="1"/>
+          </p:cNvSpPr>
+          <p:nvPr>
+            <p:ph type="sldNum" sz="quarter" idx="5"/>
+          </p:nvPr>
+        </p:nvSpPr>
+        <p:spPr/>
+        <p:txBody>
+          <a:bodyPr/>
+          <a:lstStyle/>
+          <a:p>
+            <a:fld id="{0FCFED6C-7B9F-4E48-89DA-B7F4954BD38C}" type="slidenum">
+              <a:rPr lang="en-GB" smtClean="0"/>
+              <a:t>3</a:t>
+            </a:fld>
+            <a:endParaRPr lang="en-GB"/>
+          </a:p>
+        </p:txBody>
+      </p:sp>
+    </p:spTree>
+    <p:extLst>
+      <p:ext uri="{BB962C8B-B14F-4D97-AF65-F5344CB8AC3E}">
+        <p14:creationId xmlns:p14="http://schemas.microsoft.com/office/powerpoint/2010/main" val="638209211"/>
+      </p:ext>
+    </p:extLst>
+  </p:cSld>
+  <p:clrMapOvr>
+    <a:masterClrMapping/>
+  </p:clrMapOvr>
+</p:notes>
+</file>
+
+<file path=ppt/notesSlides/notesSlide3.xml><?xml version="1.0" encoding="utf-8"?>
+<p:notes xmlns:a="http://schemas.openxmlformats.org/drawingml/2006/main" xmlns:r="http://schemas.openxmlformats.org/officeDocument/2006/relationships" xmlns:p="http://schemas.openxmlformats.org/presentationml/2006/main">
+  <p:cSld>
+    <p:spTree>
+      <p:nvGrpSpPr>
+        <p:cNvPr id="1" name=""/>
+        <p:cNvGrpSpPr/>
+        <p:nvPr/>
+      </p:nvGrpSpPr>
+      <p:grpSpPr>
+        <a:xfrm>
+          <a:off x="0" y="0"/>
+          <a:ext cx="0" cy="0"/>
+          <a:chOff x="0" y="0"/>
+          <a:chExt cx="0" cy="0"/>
+        </a:xfrm>
+      </p:grpSpPr>
+      <p:sp>
+        <p:nvSpPr>
+          <p:cNvPr id="2" name="Slide Image Placeholder 1"/>
+          <p:cNvSpPr>
+            <a:spLocks noGrp="1" noRot="1" noChangeAspect="1"/>
+          </p:cNvSpPr>
+          <p:nvPr>
+            <p:ph type="sldImg"/>
+          </p:nvPr>
+        </p:nvSpPr>
+        <p:spPr/>
+      </p:sp>
+      <p:sp>
+        <p:nvSpPr>
+          <p:cNvPr id="3" name="Notes Placeholder 2"/>
+          <p:cNvSpPr>
+            <a:spLocks noGrp="1"/>
+          </p:cNvSpPr>
+          <p:nvPr>
+            <p:ph type="body" idx="1"/>
+          </p:nvPr>
+        </p:nvSpPr>
+        <p:spPr/>
+        <p:txBody>
+          <a:bodyPr/>
+          <a:lstStyle/>
+          <a:p>
+            <a:r>
+              <a:rPr lang="en-GB" dirty="0"/>
+              <a:t>I wanted to create an easy to use dashboard where you can easily see the sources being used in the system, and add and remove sources, and turn them on and off. You can also see which sources are stale, which was mentioned in my previous meeting as something useful.</a:t>
+            </a:r>
+          </a:p>
+        </p:txBody>
+      </p:sp>
+      <p:sp>
+        <p:nvSpPr>
+          <p:cNvPr id="4" name="Slide Number Placeholder 3"/>
+          <p:cNvSpPr>
+            <a:spLocks noGrp="1"/>
+          </p:cNvSpPr>
+          <p:nvPr>
+            <p:ph type="sldNum" sz="quarter" idx="5"/>
+          </p:nvPr>
+        </p:nvSpPr>
+        <p:spPr/>
+        <p:txBody>
+          <a:bodyPr/>
+          <a:lstStyle/>
+          <a:p>
+            <a:fld id="{0FCFED6C-7B9F-4E48-89DA-B7F4954BD38C}" type="slidenum">
+              <a:rPr lang="en-GB" smtClean="0"/>
+              <a:t>4</a:t>
+            </a:fld>
+            <a:endParaRPr lang="en-GB"/>
+          </a:p>
+        </p:txBody>
+      </p:sp>
+    </p:spTree>
+    <p:extLst>
+      <p:ext uri="{BB962C8B-B14F-4D97-AF65-F5344CB8AC3E}">
+        <p14:creationId xmlns:p14="http://schemas.microsoft.com/office/powerpoint/2010/main" val="1212567091"/>
+      </p:ext>
+    </p:extLst>
+  </p:cSld>
+  <p:clrMapOvr>
+    <a:masterClrMapping/>
+  </p:clrMapOvr>
+</p:notes>
 </file>
 
 <file path=ppt/slideLayouts/slideLayout1.xml><?xml version="1.0" encoding="utf-8"?>
@@ -3362,41 +3997,62 @@
             <p:ph type="ctrTitle"/>
           </p:nvPr>
         </p:nvSpPr>
+        <p:spPr>
+          <a:xfrm>
+            <a:off x="1524000" y="868362"/>
+            <a:ext cx="9144000" cy="2387600"/>
+          </a:xfrm>
+        </p:spPr>
+        <p:txBody>
+          <a:bodyPr>
+            <a:normAutofit fontScale="90000"/>
+          </a:bodyPr>
+          <a:lstStyle/>
+          <a:p>
+            <a:r>
+              <a:rPr lang="en-GB" b="1" dirty="0">
+                <a:solidFill>
+                  <a:srgbClr val="0C2E8A"/>
+                </a:solidFill>
+                <a:latin typeface="Open sans" panose="020B0604020202020204" pitchFamily="2" charset="0"/>
+                <a:ea typeface="Open sans" panose="020B0604020202020204" pitchFamily="2" charset="0"/>
+                <a:cs typeface="Open sans" panose="020B0604020202020204" pitchFamily="2" charset="0"/>
+              </a:rPr>
+              <a:t>News scraper Dashboard Usability Testing</a:t>
+            </a:r>
+          </a:p>
+        </p:txBody>
+      </p:sp>
+      <p:sp>
+        <p:nvSpPr>
+          <p:cNvPr id="3" name="Subtitle 2">
+            <a:extLst>
+              <a:ext uri="{FF2B5EF4-FFF2-40B4-BE49-F238E27FC236}">
+                <a16:creationId xmlns:a16="http://schemas.microsoft.com/office/drawing/2014/main" id="{1D5E624C-A5F7-0D29-1119-BB6656678961}"/>
+              </a:ext>
+            </a:extLst>
+          </p:cNvPr>
+          <p:cNvSpPr>
+            <a:spLocks noGrp="1"/>
+          </p:cNvSpPr>
+          <p:nvPr>
+            <p:ph type="subTitle" idx="1"/>
+          </p:nvPr>
+        </p:nvSpPr>
         <p:spPr/>
         <p:txBody>
           <a:bodyPr/>
           <a:lstStyle/>
           <a:p>
             <a:r>
-              <a:rPr lang="en-GB" dirty="0"/>
-              <a:t>News scraper GUI Usability Testing</a:t>
-            </a:r>
-          </a:p>
-        </p:txBody>
-      </p:sp>
-      <p:sp>
-        <p:nvSpPr>
-          <p:cNvPr id="3" name="Subtitle 2">
-            <a:extLst>
-              <a:ext uri="{FF2B5EF4-FFF2-40B4-BE49-F238E27FC236}">
-                <a16:creationId xmlns:a16="http://schemas.microsoft.com/office/drawing/2014/main" id="{1D5E624C-A5F7-0D29-1119-BB6656678961}"/>
-              </a:ext>
-            </a:extLst>
-          </p:cNvPr>
-          <p:cNvSpPr>
-            <a:spLocks noGrp="1"/>
-          </p:cNvSpPr>
-          <p:nvPr>
-            <p:ph type="subTitle" idx="1"/>
-          </p:nvPr>
-        </p:nvSpPr>
-        <p:spPr/>
-        <p:txBody>
-          <a:bodyPr/>
-          <a:lstStyle/>
-          <a:p>
-            <a:r>
-              <a:rPr lang="en-GB" dirty="0"/>
+              <a:rPr lang="en-GB" b="1" dirty="0">
+                <a:solidFill>
+                  <a:srgbClr val="50D8AF"/>
+                </a:solidFill>
+                <a:latin typeface="Open sans" panose="020B0606030504020204" pitchFamily="2" charset="0"/>
+                <a:ea typeface="Open sans" panose="020B0606030504020204" pitchFamily="2" charset="0"/>
+                <a:cs typeface="Open sans" panose="020B0606030504020204" pitchFamily="2" charset="0"/>
+              </a:rPr>
               <a:t>Adam Fairlie</a:t>
             </a:r>
           </a:p>
@@ -3434,6 +4090,122 @@
       </p:grpSpPr>
       <p:sp>
         <p:nvSpPr>
+          <p:cNvPr id="3" name="Content Placeholder 2">
+            <a:extLst>
+              <a:ext uri="{FF2B5EF4-FFF2-40B4-BE49-F238E27FC236}">
+                <a16:creationId xmlns:a16="http://schemas.microsoft.com/office/drawing/2014/main" id="{CDB0A1B1-88E2-76B5-AA82-DBB97847A4C1}"/>
+              </a:ext>
+            </a:extLst>
+          </p:cNvPr>
+          <p:cNvSpPr>
+            <a:spLocks noGrp="1"/>
+          </p:cNvSpPr>
+          <p:nvPr>
+            <p:ph idx="1"/>
+          </p:nvPr>
+        </p:nvSpPr>
+        <p:spPr>
+          <a:xfrm>
+            <a:off x="838200" y="1627217"/>
+            <a:ext cx="10515600" cy="4626933"/>
+          </a:xfrm>
+        </p:spPr>
+        <p:txBody>
+          <a:bodyPr/>
+          <a:lstStyle/>
+          <a:p>
+            <a:r>
+              <a:rPr lang="en-GB" dirty="0">
+                <a:latin typeface="Open sans" panose="020B0606030504020204" pitchFamily="2" charset="0"/>
+                <a:ea typeface="Open sans" panose="020B0606030504020204" pitchFamily="2" charset="0"/>
+                <a:cs typeface="Open sans" panose="020B0606030504020204" pitchFamily="2" charset="0"/>
+              </a:rPr>
+              <a:t>Short questionnaire (5-10 mins)</a:t>
+            </a:r>
+          </a:p>
+          <a:p>
+            <a:r>
+              <a:rPr lang="en-GB" dirty="0">
+                <a:latin typeface="Open sans" panose="020B0606030504020204" pitchFamily="2" charset="0"/>
+                <a:ea typeface="Open sans" panose="020B0606030504020204" pitchFamily="2" charset="0"/>
+                <a:cs typeface="Open sans" panose="020B0606030504020204" pitchFamily="2" charset="0"/>
+              </a:rPr>
+              <a:t>Effectiveness of the interface/visualisation</a:t>
+            </a:r>
+          </a:p>
+          <a:p>
+            <a:r>
+              <a:rPr lang="en-GB" dirty="0">
+                <a:latin typeface="Open sans" panose="020B0606030504020204" pitchFamily="2" charset="0"/>
+                <a:ea typeface="Open sans" panose="020B0606030504020204" pitchFamily="2" charset="0"/>
+                <a:cs typeface="Open sans" panose="020B0606030504020204" pitchFamily="2" charset="0"/>
+              </a:rPr>
+              <a:t>Link will be in chat</a:t>
+            </a:r>
+          </a:p>
+          <a:p>
+            <a:r>
+              <a:rPr lang="en-GB" dirty="0">
+                <a:latin typeface="Open sans" panose="020B0606030504020204" pitchFamily="2" charset="0"/>
+                <a:ea typeface="Open sans" panose="020B0606030504020204" pitchFamily="2" charset="0"/>
+                <a:cs typeface="Open sans" panose="020B0606030504020204" pitchFamily="2" charset="0"/>
+              </a:rPr>
+              <a:t>Can try out live (mock) version of interface</a:t>
+            </a:r>
+          </a:p>
+        </p:txBody>
+      </p:sp>
+      <p:sp>
+        <p:nvSpPr>
+          <p:cNvPr id="4" name="Rectangle 3">
+            <a:extLst>
+              <a:ext uri="{FF2B5EF4-FFF2-40B4-BE49-F238E27FC236}">
+                <a16:creationId xmlns:a16="http://schemas.microsoft.com/office/drawing/2014/main" id="{A7D254BB-7612-3CB7-7875-1774E7D04160}"/>
+              </a:ext>
+            </a:extLst>
+          </p:cNvPr>
+          <p:cNvSpPr/>
+          <p:nvPr/>
+        </p:nvSpPr>
+        <p:spPr>
+          <a:xfrm>
+            <a:off x="0" y="0"/>
+            <a:ext cx="12192000" cy="1138687"/>
+          </a:xfrm>
+          <a:prstGeom prst="rect">
+            <a:avLst/>
+          </a:prstGeom>
+          <a:solidFill>
+            <a:srgbClr val="0C2E8A"/>
+          </a:solidFill>
+        </p:spPr>
+        <p:style>
+          <a:lnRef idx="2">
+            <a:schemeClr val="accent1">
+              <a:shade val="50000"/>
+            </a:schemeClr>
+          </a:lnRef>
+          <a:fillRef idx="1">
+            <a:schemeClr val="accent1"/>
+          </a:fillRef>
+          <a:effectRef idx="0">
+            <a:schemeClr val="accent1"/>
+          </a:effectRef>
+          <a:fontRef idx="minor">
+            <a:schemeClr val="lt1"/>
+          </a:fontRef>
+        </p:style>
+        <p:txBody>
+          <a:bodyPr rtlCol="0" anchor="ctr"/>
+          <a:lstStyle/>
+          <a:p>
+            <a:pPr algn="ctr"/>
+            <a:endParaRPr lang="en-GB"/>
+          </a:p>
+        </p:txBody>
+      </p:sp>
+      <p:sp>
+        <p:nvSpPr>
           <p:cNvPr id="2" name="Title 1">
             <a:extLst>
               <a:ext uri="{FF2B5EF4-FFF2-40B4-BE49-F238E27FC236}">
@@ -3448,49 +4220,35 @@
             <p:ph type="title"/>
           </p:nvPr>
         </p:nvSpPr>
-        <p:spPr/>
-        <p:txBody>
-          <a:bodyPr/>
-          <a:lstStyle/>
-          <a:p>
-            <a:r>
-              <a:rPr lang="en-GB" dirty="0"/>
-              <a:t>Survey</a:t>
-            </a:r>
-          </a:p>
-        </p:txBody>
-      </p:sp>
-      <p:sp>
-        <p:nvSpPr>
-          <p:cNvPr id="3" name="Content Placeholder 2">
-            <a:extLst>
-              <a:ext uri="{FF2B5EF4-FFF2-40B4-BE49-F238E27FC236}">
-                <a16:creationId xmlns:a16="http://schemas.microsoft.com/office/drawing/2014/main" id="{CDB0A1B1-88E2-76B5-AA82-DBB97847A4C1}"/>
-              </a:ext>
-            </a:extLst>
-          </p:cNvPr>
-          <p:cNvSpPr>
-            <a:spLocks noGrp="1"/>
-          </p:cNvSpPr>
-          <p:nvPr>
-            <p:ph idx="1"/>
-          </p:nvPr>
-        </p:nvSpPr>
-        <p:spPr/>
-        <p:txBody>
-          <a:bodyPr/>
-          <a:lstStyle/>
-          <a:p>
-            <a:r>
-              <a:rPr lang="en-GB" dirty="0"/>
-              <a:t>&lt;screenshot or link or something&gt;</a:t>
-            </a:r>
-          </a:p>
-          <a:p>
-            <a:r>
-              <a:rPr lang="en-GB" dirty="0"/>
-              <a:t>For usability testing section in dissertation</a:t>
-            </a:r>
+        <p:spPr>
+          <a:xfrm>
+            <a:off x="838200" y="-93439"/>
+            <a:ext cx="10515600" cy="1325563"/>
+          </a:xfrm>
+        </p:spPr>
+        <p:txBody>
+          <a:bodyPr/>
+          <a:lstStyle/>
+          <a:p>
+            <a:r>
+              <a:rPr lang="en-GB">
+                <a:solidFill>
+                  <a:schemeClr val="bg1"/>
+                </a:solidFill>
+                <a:latin typeface="Open sans" panose="020B0606030504020204" pitchFamily="2" charset="0"/>
+                <a:ea typeface="Open sans" panose="020B0606030504020204" pitchFamily="2" charset="0"/>
+                <a:cs typeface="Open sans" panose="020B0606030504020204" pitchFamily="2" charset="0"/>
+              </a:rPr>
+              <a:t>Questionnaire</a:t>
+            </a:r>
+            <a:endParaRPr lang="en-GB" dirty="0">
+              <a:solidFill>
+                <a:schemeClr val="bg1"/>
+              </a:solidFill>
+              <a:latin typeface="Open sans" panose="020B0606030504020204" pitchFamily="2" charset="0"/>
+              <a:ea typeface="Open sans" panose="020B0606030504020204" pitchFamily="2" charset="0"/>
+              <a:cs typeface="Open sans" panose="020B0606030504020204" pitchFamily="2" charset="0"/>
+            </a:endParaRPr>
           </a:p>
         </p:txBody>
       </p:sp>
@@ -3526,10 +4284,126 @@
       </p:grpSpPr>
       <p:sp>
         <p:nvSpPr>
+          <p:cNvPr id="3" name="Content Placeholder 2">
+            <a:extLst>
+              <a:ext uri="{FF2B5EF4-FFF2-40B4-BE49-F238E27FC236}">
+                <a16:creationId xmlns:a16="http://schemas.microsoft.com/office/drawing/2014/main" id="{CDB0A1B1-88E2-76B5-AA82-DBB97847A4C1}"/>
+              </a:ext>
+            </a:extLst>
+          </p:cNvPr>
+          <p:cNvSpPr>
+            <a:spLocks noGrp="1"/>
+          </p:cNvSpPr>
+          <p:nvPr>
+            <p:ph idx="1"/>
+          </p:nvPr>
+        </p:nvSpPr>
+        <p:spPr>
+          <a:xfrm>
+            <a:off x="838200" y="1627218"/>
+            <a:ext cx="10515600" cy="4351338"/>
+          </a:xfrm>
+        </p:spPr>
+        <p:txBody>
+          <a:bodyPr/>
+          <a:lstStyle/>
+          <a:p>
+            <a:r>
+              <a:rPr lang="en-GB" dirty="0">
+                <a:latin typeface="Open sans" panose="020B0606030504020204" pitchFamily="2" charset="0"/>
+                <a:ea typeface="Open sans" panose="020B0606030504020204" pitchFamily="2" charset="0"/>
+                <a:cs typeface="Open sans" panose="020B0606030504020204" pitchFamily="2" charset="0"/>
+              </a:rPr>
+              <a:t>Moving from RSS feeds to multiple configurable sources</a:t>
+            </a:r>
+          </a:p>
+          <a:p>
+            <a:r>
+              <a:rPr lang="en-GB" dirty="0">
+                <a:latin typeface="Open sans" panose="020B0606030504020204" pitchFamily="2" charset="0"/>
+                <a:ea typeface="Open sans" panose="020B0606030504020204" pitchFamily="2" charset="0"/>
+                <a:cs typeface="Open sans" panose="020B0606030504020204" pitchFamily="2" charset="0"/>
+              </a:rPr>
+              <a:t>Creating a configurable web scraper with multiple different source types</a:t>
+            </a:r>
+          </a:p>
+          <a:p>
+            <a:r>
+              <a:rPr lang="en-GB" dirty="0">
+                <a:latin typeface="Open sans" panose="020B0606030504020204" pitchFamily="2" charset="0"/>
+                <a:ea typeface="Open sans" panose="020B0606030504020204" pitchFamily="2" charset="0"/>
+                <a:cs typeface="Open sans" panose="020B0606030504020204" pitchFamily="2" charset="0"/>
+              </a:rPr>
+              <a:t>Combined with a classifier to categorise news articles</a:t>
+            </a:r>
+          </a:p>
+          <a:p>
+            <a:r>
+              <a:rPr lang="en-GB" dirty="0">
+                <a:latin typeface="Open sans" panose="020B0606030504020204" pitchFamily="2" charset="0"/>
+                <a:ea typeface="Open sans" panose="020B0606030504020204" pitchFamily="2" charset="0"/>
+                <a:cs typeface="Open sans" panose="020B0606030504020204" pitchFamily="2" charset="0"/>
+              </a:rPr>
+              <a:t>Includes a dashboard to manage the scraper and see results as visualisation</a:t>
+            </a:r>
+          </a:p>
+        </p:txBody>
+      </p:sp>
+      <p:sp>
+        <p:nvSpPr>
+          <p:cNvPr id="4" name="Rectangle 3">
+            <a:extLst>
+              <a:ext uri="{FF2B5EF4-FFF2-40B4-BE49-F238E27FC236}">
+                <a16:creationId xmlns:a16="http://schemas.microsoft.com/office/drawing/2014/main" id="{A7D254BB-7612-3CB7-7875-1774E7D04160}"/>
+              </a:ext>
+            </a:extLst>
+          </p:cNvPr>
+          <p:cNvSpPr/>
+          <p:nvPr/>
+        </p:nvSpPr>
+        <p:spPr>
+          <a:xfrm>
+            <a:off x="0" y="0"/>
+            <a:ext cx="12192000" cy="1138687"/>
+          </a:xfrm>
+          <a:prstGeom prst="rect">
+            <a:avLst/>
+          </a:prstGeom>
+          <a:solidFill>
+            <a:srgbClr val="0C2E8A"/>
+          </a:solidFill>
+        </p:spPr>
+        <p:style>
+          <a:lnRef idx="2">
+            <a:schemeClr val="accent1">
+              <a:shade val="50000"/>
+            </a:schemeClr>
+          </a:lnRef>
+          <a:fillRef idx="1">
+            <a:schemeClr val="accent1"/>
+          </a:fillRef>
+          <a:effectRef idx="0">
+            <a:schemeClr val="accent1"/>
+          </a:effectRef>
+          <a:fontRef idx="minor">
+            <a:schemeClr val="lt1"/>
+          </a:fontRef>
+        </p:style>
+        <p:txBody>
+          <a:bodyPr rtlCol="0" anchor="ctr"/>
+          <a:lstStyle/>
+          <a:p>
+            <a:pPr algn="ctr"/>
+            <a:endParaRPr lang="en-GB"/>
+          </a:p>
+        </p:txBody>
+      </p:sp>
+      <p:sp>
+        <p:nvSpPr>
           <p:cNvPr id="2" name="Title 1">
             <a:extLst>
               <a:ext uri="{FF2B5EF4-FFF2-40B4-BE49-F238E27FC236}">
-                <a16:creationId xmlns:a16="http://schemas.microsoft.com/office/drawing/2014/main" id="{4CC89470-7084-A863-C332-F6AA594D6F5C}"/>
+                <a16:creationId xmlns:a16="http://schemas.microsoft.com/office/drawing/2014/main" id="{1D40E371-0CA0-37E5-0E1F-65FF7634F80C}"/>
               </a:ext>
             </a:extLst>
           </p:cNvPr>
@@ -3540,43 +4414,26 @@
             <p:ph type="title"/>
           </p:nvPr>
         </p:nvSpPr>
-        <p:spPr/>
-        <p:txBody>
-          <a:bodyPr/>
-          <a:lstStyle/>
-          <a:p>
-            <a:r>
-              <a:rPr lang="en-GB"/>
+        <p:spPr>
+          <a:xfrm>
+            <a:off x="838200" y="-93439"/>
+            <a:ext cx="10515600" cy="1325563"/>
+          </a:xfrm>
+        </p:spPr>
+        <p:txBody>
+          <a:bodyPr/>
+          <a:lstStyle/>
+          <a:p>
+            <a:r>
+              <a:rPr lang="en-GB" dirty="0">
+                <a:solidFill>
+                  <a:schemeClr val="bg1"/>
+                </a:solidFill>
+                <a:latin typeface="Open sans" panose="020B0606030504020204" pitchFamily="2" charset="0"/>
+                <a:ea typeface="Open sans" panose="020B0606030504020204" pitchFamily="2" charset="0"/>
+                <a:cs typeface="Open sans" panose="020B0606030504020204" pitchFamily="2" charset="0"/>
+              </a:rPr>
               <a:t>Background Information</a:t>
-            </a:r>
-            <a:endParaRPr lang="en-GB" dirty="0"/>
-          </a:p>
-        </p:txBody>
-      </p:sp>
-      <p:sp>
-        <p:nvSpPr>
-          <p:cNvPr id="3" name="Content Placeholder 2">
-            <a:extLst>
-              <a:ext uri="{FF2B5EF4-FFF2-40B4-BE49-F238E27FC236}">
-                <a16:creationId xmlns:a16="http://schemas.microsoft.com/office/drawing/2014/main" id="{6CE16288-1C59-E7B9-12F3-FADA91C4EB0E}"/>
-              </a:ext>
-            </a:extLst>
-          </p:cNvPr>
-          <p:cNvSpPr>
-            <a:spLocks noGrp="1"/>
-          </p:cNvSpPr>
-          <p:nvPr>
-            <p:ph idx="1"/>
-          </p:nvPr>
-        </p:nvSpPr>
-        <p:spPr/>
-        <p:txBody>
-          <a:bodyPr/>
-          <a:lstStyle/>
-          <a:p>
-            <a:r>
-              <a:rPr lang="en-GB" dirty="0"/>
-              <a:t>Recap entire project motivation</a:t>
             </a:r>
           </a:p>
         </p:txBody>
@@ -3584,7 +4441,7 @@
     </p:spTree>
     <p:extLst>
       <p:ext uri="{BB962C8B-B14F-4D97-AF65-F5344CB8AC3E}">
-        <p14:creationId xmlns:p14="http://schemas.microsoft.com/office/powerpoint/2010/main" val="2474921898"/>
+        <p14:creationId xmlns:p14="http://schemas.microsoft.com/office/powerpoint/2010/main" val="1734501605"/>
       </p:ext>
     </p:extLst>
   </p:cSld>
@@ -3613,10 +4470,126 @@
       </p:grpSpPr>
       <p:sp>
         <p:nvSpPr>
+          <p:cNvPr id="3" name="Content Placeholder 2">
+            <a:extLst>
+              <a:ext uri="{FF2B5EF4-FFF2-40B4-BE49-F238E27FC236}">
+                <a16:creationId xmlns:a16="http://schemas.microsoft.com/office/drawing/2014/main" id="{CDB0A1B1-88E2-76B5-AA82-DBB97847A4C1}"/>
+              </a:ext>
+            </a:extLst>
+          </p:cNvPr>
+          <p:cNvSpPr>
+            <a:spLocks noGrp="1"/>
+          </p:cNvSpPr>
+          <p:nvPr>
+            <p:ph idx="1"/>
+          </p:nvPr>
+        </p:nvSpPr>
+        <p:spPr>
+          <a:xfrm>
+            <a:off x="838200" y="1627218"/>
+            <a:ext cx="10515600" cy="4351338"/>
+          </a:xfrm>
+        </p:spPr>
+        <p:txBody>
+          <a:bodyPr/>
+          <a:lstStyle/>
+          <a:p>
+            <a:r>
+              <a:rPr lang="en-GB" dirty="0">
+                <a:latin typeface="Open sans" panose="020B0606030504020204" pitchFamily="2" charset="0"/>
+                <a:ea typeface="Open sans" panose="020B0606030504020204" pitchFamily="2" charset="0"/>
+                <a:cs typeface="Open sans" panose="020B0606030504020204" pitchFamily="2" charset="0"/>
+              </a:rPr>
+              <a:t>Easy to use dashboard for managing sources</a:t>
+            </a:r>
+          </a:p>
+          <a:p>
+            <a:r>
+              <a:rPr lang="en-GB" dirty="0">
+                <a:latin typeface="Open sans" panose="020B0606030504020204" pitchFamily="2" charset="0"/>
+                <a:ea typeface="Open sans" panose="020B0606030504020204" pitchFamily="2" charset="0"/>
+                <a:cs typeface="Open sans" panose="020B0606030504020204" pitchFamily="2" charset="0"/>
+              </a:rPr>
+              <a:t>Can view which sources are currently active/inactive</a:t>
+            </a:r>
+          </a:p>
+          <a:p>
+            <a:r>
+              <a:rPr lang="en-GB" dirty="0">
+                <a:latin typeface="Open sans" panose="020B0606030504020204" pitchFamily="2" charset="0"/>
+                <a:ea typeface="Open sans" panose="020B0606030504020204" pitchFamily="2" charset="0"/>
+                <a:cs typeface="Open sans" panose="020B0606030504020204" pitchFamily="2" charset="0"/>
+              </a:rPr>
+              <a:t>Can view which sources are still effective and which are stale</a:t>
+            </a:r>
+          </a:p>
+          <a:p>
+            <a:r>
+              <a:rPr lang="en-GB" dirty="0">
+                <a:latin typeface="Open sans" panose="020B0606030504020204" pitchFamily="2" charset="0"/>
+                <a:ea typeface="Open sans" panose="020B0606030504020204" pitchFamily="2" charset="0"/>
+                <a:cs typeface="Open sans" panose="020B0606030504020204" pitchFamily="2" charset="0"/>
+              </a:rPr>
+              <a:t>Can quickly and easily add new sources</a:t>
+            </a:r>
+          </a:p>
+        </p:txBody>
+      </p:sp>
+      <p:sp>
+        <p:nvSpPr>
+          <p:cNvPr id="4" name="Rectangle 3">
+            <a:extLst>
+              <a:ext uri="{FF2B5EF4-FFF2-40B4-BE49-F238E27FC236}">
+                <a16:creationId xmlns:a16="http://schemas.microsoft.com/office/drawing/2014/main" id="{A7D254BB-7612-3CB7-7875-1774E7D04160}"/>
+              </a:ext>
+            </a:extLst>
+          </p:cNvPr>
+          <p:cNvSpPr/>
+          <p:nvPr/>
+        </p:nvSpPr>
+        <p:spPr>
+          <a:xfrm>
+            <a:off x="0" y="0"/>
+            <a:ext cx="12192000" cy="1138687"/>
+          </a:xfrm>
+          <a:prstGeom prst="rect">
+            <a:avLst/>
+          </a:prstGeom>
+          <a:solidFill>
+            <a:srgbClr val="0C2E8A"/>
+          </a:solidFill>
+        </p:spPr>
+        <p:style>
+          <a:lnRef idx="2">
+            <a:schemeClr val="accent1">
+              <a:shade val="50000"/>
+            </a:schemeClr>
+          </a:lnRef>
+          <a:fillRef idx="1">
+            <a:schemeClr val="accent1"/>
+          </a:fillRef>
+          <a:effectRef idx="0">
+            <a:schemeClr val="accent1"/>
+          </a:effectRef>
+          <a:fontRef idx="minor">
+            <a:schemeClr val="lt1"/>
+          </a:fontRef>
+        </p:style>
+        <p:txBody>
+          <a:bodyPr rtlCol="0" anchor="ctr"/>
+          <a:lstStyle/>
+          <a:p>
+            <a:pPr algn="ctr"/>
+            <a:endParaRPr lang="en-GB"/>
+          </a:p>
+        </p:txBody>
+      </p:sp>
+      <p:sp>
+        <p:nvSpPr>
           <p:cNvPr id="2" name="Title 1">
             <a:extLst>
               <a:ext uri="{FF2B5EF4-FFF2-40B4-BE49-F238E27FC236}">
-                <a16:creationId xmlns:a16="http://schemas.microsoft.com/office/drawing/2014/main" id="{C9E7A4C3-BB7B-F2FD-9135-95E2A64A2217}"/>
+                <a16:creationId xmlns:a16="http://schemas.microsoft.com/office/drawing/2014/main" id="{1D40E371-0CA0-37E5-0E1F-65FF7634F80C}"/>
               </a:ext>
             </a:extLst>
           </p:cNvPr>
@@ -3627,59 +4600,34 @@
             <p:ph type="title"/>
           </p:nvPr>
         </p:nvSpPr>
-        <p:spPr/>
-        <p:txBody>
-          <a:bodyPr/>
-          <a:lstStyle/>
-          <a:p>
-            <a:r>
-              <a:rPr lang="en-GB" dirty="0"/>
+        <p:spPr>
+          <a:xfrm>
+            <a:off x="838200" y="-93439"/>
+            <a:ext cx="10515600" cy="1325563"/>
+          </a:xfrm>
+        </p:spPr>
+        <p:txBody>
+          <a:bodyPr/>
+          <a:lstStyle/>
+          <a:p>
+            <a:r>
+              <a:rPr lang="en-GB" dirty="0">
+                <a:solidFill>
+                  <a:schemeClr val="bg1"/>
+                </a:solidFill>
+                <a:latin typeface="Open sans" panose="020B0606030504020204" pitchFamily="2" charset="0"/>
+                <a:ea typeface="Open sans" panose="020B0606030504020204" pitchFamily="2" charset="0"/>
+                <a:cs typeface="Open sans" panose="020B0606030504020204" pitchFamily="2" charset="0"/>
+              </a:rPr>
               <a:t>Motivation</a:t>
             </a:r>
-          </a:p>
-        </p:txBody>
-      </p:sp>
-      <p:sp>
-        <p:nvSpPr>
-          <p:cNvPr id="3" name="Content Placeholder 2">
-            <a:extLst>
-              <a:ext uri="{FF2B5EF4-FFF2-40B4-BE49-F238E27FC236}">
-                <a16:creationId xmlns:a16="http://schemas.microsoft.com/office/drawing/2014/main" id="{392BB03B-138D-0235-7E09-78BDACE786F5}"/>
-              </a:ext>
-            </a:extLst>
-          </p:cNvPr>
-          <p:cNvSpPr>
-            <a:spLocks noGrp="1"/>
-          </p:cNvSpPr>
-          <p:nvPr>
-            <p:ph idx="1"/>
-          </p:nvPr>
-        </p:nvSpPr>
-        <p:spPr/>
-        <p:txBody>
-          <a:bodyPr/>
-          <a:lstStyle/>
-          <a:p>
-            <a:r>
-              <a:rPr lang="en-GB" dirty="0"/>
-              <a:t>Easy to use dashboard for managing sources</a:t>
-            </a:r>
-          </a:p>
-          <a:p>
-            <a:r>
-              <a:rPr lang="en-GB" dirty="0"/>
-              <a:t>Stale sources mentioned in meeting</a:t>
-            </a:r>
-          </a:p>
-          <a:p>
-            <a:endParaRPr lang="en-GB" dirty="0"/>
           </a:p>
         </p:txBody>
       </p:sp>
     </p:spTree>
     <p:extLst>
       <p:ext uri="{BB962C8B-B14F-4D97-AF65-F5344CB8AC3E}">
-        <p14:creationId xmlns:p14="http://schemas.microsoft.com/office/powerpoint/2010/main" val="1728159646"/>
+        <p14:creationId xmlns:p14="http://schemas.microsoft.com/office/powerpoint/2010/main" val="1965850021"/>
       </p:ext>
     </p:extLst>
   </p:cSld>
@@ -3728,34 +4676,16 @@
           <a:lstStyle/>
           <a:p>
             <a:r>
-              <a:rPr lang="en-GB" dirty="0"/>
+              <a:rPr lang="en-GB" b="1" dirty="0">
+                <a:solidFill>
+                  <a:srgbClr val="0C2E8A"/>
+                </a:solidFill>
+                <a:latin typeface="Open sans" panose="020B0606030504020204" pitchFamily="2" charset="0"/>
+                <a:ea typeface="Open sans" panose="020B0606030504020204" pitchFamily="2" charset="0"/>
+                <a:cs typeface="Open sans" panose="020B0606030504020204" pitchFamily="2" charset="0"/>
+              </a:rPr>
               <a:t>Demonstration</a:t>
             </a:r>
-          </a:p>
-        </p:txBody>
-      </p:sp>
-      <p:sp>
-        <p:nvSpPr>
-          <p:cNvPr id="3" name="Subtitle 2">
-            <a:extLst>
-              <a:ext uri="{FF2B5EF4-FFF2-40B4-BE49-F238E27FC236}">
-                <a16:creationId xmlns:a16="http://schemas.microsoft.com/office/drawing/2014/main" id="{C5EB471C-3F0A-A401-DFBD-0103F2EA50D6}"/>
-              </a:ext>
-            </a:extLst>
-          </p:cNvPr>
-          <p:cNvSpPr>
-            <a:spLocks noGrp="1"/>
-          </p:cNvSpPr>
-          <p:nvPr>
-            <p:ph type="subTitle" idx="1"/>
-          </p:nvPr>
-        </p:nvSpPr>
-        <p:spPr/>
-        <p:txBody>
-          <a:bodyPr/>
-          <a:lstStyle/>
-          <a:p>
-            <a:endParaRPr lang="en-GB"/>
           </a:p>
         </p:txBody>
       </p:sp>
@@ -4065,4 +4995,299 @@
     </a:ext>
   </a:extLst>
 </a:theme>
+</file>
+
+<file path=ppt/theme/theme2.xml><?xml version="1.0" encoding="utf-8"?>
+<a:theme xmlns:a="http://schemas.openxmlformats.org/drawingml/2006/main" name="Office Theme">
+  <a:themeElements>
+    <a:clrScheme name="Office">
+      <a:dk1>
+        <a:sysClr val="windowText" lastClr="000000"/>
+      </a:dk1>
+      <a:lt1>
+        <a:sysClr val="window" lastClr="FFFFFF"/>
+      </a:lt1>
+      <a:dk2>
+        <a:srgbClr val="44546A"/>
+      </a:dk2>
+      <a:lt2>
+        <a:srgbClr val="E7E6E6"/>
+      </a:lt2>
+      <a:accent1>
+        <a:srgbClr val="4472C4"/>
+      </a:accent1>
+      <a:accent2>
+        <a:srgbClr val="ED7D31"/>
+      </a:accent2>
+      <a:accent3>
+        <a:srgbClr val="A5A5A5"/>
+      </a:accent3>
+      <a:accent4>
+        <a:srgbClr val="FFC000"/>
+      </a:accent4>
+      <a:accent5>
+        <a:srgbClr val="5B9BD5"/>
+      </a:accent5>
+      <a:accent6>
+        <a:srgbClr val="70AD47"/>
+      </a:accent6>
+      <a:hlink>
+        <a:srgbClr val="0563C1"/>
+      </a:hlink>
+      <a:folHlink>
+        <a:srgbClr val="954F72"/>
+      </a:folHlink>
+    </a:clrScheme>
+    <a:fontScheme name="Office">
+      <a:majorFont>
+        <a:latin typeface="Calibri Light" panose="020F0302020204030204"/>
+        <a:ea typeface=""/>
+        <a:cs typeface=""/>
+        <a:font script="Jpan" typeface="游ゴシック Light"/>
+        <a:font script="Hang" typeface="맑은 고딕"/>
+        <a:font script="Hans" typeface="等线 Light"/>
+        <a:font script="Hant" typeface="新細明體"/>
+        <a:font script="Arab" typeface="Times New Roman"/>
+        <a:font script="Hebr" typeface="Times New Roman"/>
+        <a:font script="Thai" typeface="Angsana New"/>
+        <a:font script="Ethi" typeface="Nyala"/>
+        <a:font script="Beng" typeface="Vrinda"/>
+        <a:font script="Gujr" typeface="Shruti"/>
+        <a:font script="Khmr" typeface="MoolBoran"/>
+        <a:font script="Knda" typeface="Tunga"/>
+        <a:font script="Guru" typeface="Raavi"/>
+        <a:font script="Cans" typeface="Euphemia"/>
+        <a:font script="Cher" typeface="Plantagenet Cherokee"/>
+        <a:font script="Yiii" typeface="Microsoft Yi Baiti"/>
+        <a:font script="Tibt" typeface="Microsoft Himalaya"/>
+        <a:font script="Thaa" typeface="MV Boli"/>
+        <a:font script="Deva" typeface="Mangal"/>
+        <a:font script="Telu" typeface="Gautami"/>
+        <a:font script="Taml" typeface="Latha"/>
+        <a:font script="Syrc" typeface="Estrangelo Edessa"/>
+        <a:font script="Orya" typeface="Kalinga"/>
+        <a:font script="Mlym" typeface="Kartika"/>
+        <a:font script="Laoo" typeface="DokChampa"/>
+        <a:font script="Sinh" typeface="Iskoola Pota"/>
+        <a:font script="Mong" typeface="Mongolian Baiti"/>
+        <a:font script="Viet" typeface="Times New Roman"/>
+        <a:font script="Uigh" typeface="Microsoft Uighur"/>
+        <a:font script="Geor" typeface="Sylfaen"/>
+        <a:font script="Armn" typeface="Arial"/>
+        <a:font script="Bugi" typeface="Leelawadee UI"/>
+        <a:font script="Bopo" typeface="Microsoft JhengHei"/>
+        <a:font script="Java" typeface="Javanese Text"/>
+        <a:font script="Lisu" typeface="Segoe UI"/>
+        <a:font script="Mymr" typeface="Myanmar Text"/>
+        <a:font script="Nkoo" typeface="Ebrima"/>
+        <a:font script="Olck" typeface="Nirmala UI"/>
+        <a:font script="Osma" typeface="Ebrima"/>
+        <a:font script="Phag" typeface="Phagspa"/>
+        <a:font script="Syrn" typeface="Estrangelo Edessa"/>
+        <a:font script="Syrj" typeface="Estrangelo Edessa"/>
+        <a:font script="Syre" typeface="Estrangelo Edessa"/>
+        <a:font script="Sora" typeface="Nirmala UI"/>
+        <a:font script="Tale" typeface="Microsoft Tai Le"/>
+        <a:font script="Talu" typeface="Microsoft New Tai Lue"/>
+        <a:font script="Tfng" typeface="Ebrima"/>
+      </a:majorFont>
+      <a:minorFont>
+        <a:latin typeface="Calibri" panose="020F0502020204030204"/>
+        <a:ea typeface=""/>
+        <a:cs typeface=""/>
+        <a:font script="Jpan" typeface="游ゴシック"/>
+        <a:font script="Hang" typeface="맑은 고딕"/>
+        <a:font script="Hans" typeface="等线"/>
+        <a:font script="Hant" typeface="新細明體"/>
+        <a:font script="Arab" typeface="Arial"/>
+        <a:font script="Hebr" typeface="Arial"/>
+        <a:font script="Thai" typeface="Cordia New"/>
+        <a:font script="Ethi" typeface="Nyala"/>
+        <a:font script="Beng" typeface="Vrinda"/>
+        <a:font script="Gujr" typeface="Shruti"/>
+        <a:font script="Khmr" typeface="DaunPenh"/>
+        <a:font script="Knda" typeface="Tunga"/>
+        <a:font script="Guru" typeface="Raavi"/>
+        <a:font script="Cans" typeface="Euphemia"/>
+        <a:font script="Cher" typeface="Plantagenet Cherokee"/>
+        <a:font script="Yiii" typeface="Microsoft Yi Baiti"/>
+        <a:font script="Tibt" typeface="Microsoft Himalaya"/>
+        <a:font script="Thaa" typeface="MV Boli"/>
+        <a:font script="Deva" typeface="Mangal"/>
+        <a:font script="Telu" typeface="Gautami"/>
+        <a:font script="Taml" typeface="Latha"/>
+        <a:font script="Syrc" typeface="Estrangelo Edessa"/>
+        <a:font script="Orya" typeface="Kalinga"/>
+        <a:font script="Mlym" typeface="Kartika"/>
+        <a:font script="Laoo" typeface="DokChampa"/>
+        <a:font script="Sinh" typeface="Iskoola Pota"/>
+        <a:font script="Mong" typeface="Mongolian Baiti"/>
+        <a:font script="Viet" typeface="Arial"/>
+        <a:font script="Uigh" typeface="Microsoft Uighur"/>
+        <a:font script="Geor" typeface="Sylfaen"/>
+        <a:font script="Armn" typeface="Arial"/>
+        <a:font script="Bugi" typeface="Leelawadee UI"/>
+        <a:font script="Bopo" typeface="Microsoft JhengHei"/>
+        <a:font script="Java" typeface="Javanese Text"/>
+        <a:font script="Lisu" typeface="Segoe UI"/>
+        <a:font script="Mymr" typeface="Myanmar Text"/>
+        <a:font script="Nkoo" typeface="Ebrima"/>
+        <a:font script="Olck" typeface="Nirmala UI"/>
+        <a:font script="Osma" typeface="Ebrima"/>
+        <a:font script="Phag" typeface="Phagspa"/>
+        <a:font script="Syrn" typeface="Estrangelo Edessa"/>
+        <a:font script="Syrj" typeface="Estrangelo Edessa"/>
+        <a:font script="Syre" typeface="Estrangelo Edessa"/>
+        <a:font script="Sora" typeface="Nirmala UI"/>
+        <a:font script="Tale" typeface="Microsoft Tai Le"/>
+        <a:font script="Talu" typeface="Microsoft New Tai Lue"/>
+        <a:font script="Tfng" typeface="Ebrima"/>
+      </a:minorFont>
+    </a:fontScheme>
+    <a:fmtScheme name="Office">
+      <a:fillStyleLst>
+        <a:solidFill>
+          <a:schemeClr val="phClr"/>
+        </a:solidFill>
+        <a:gradFill rotWithShape="1">
+          <a:gsLst>
+            <a:gs pos="0">
+              <a:schemeClr val="phClr">
+                <a:lumMod val="110000"/>
+                <a:satMod val="105000"/>
+                <a:tint val="67000"/>
+              </a:schemeClr>
+            </a:gs>
+            <a:gs pos="50000">
+              <a:schemeClr val="phClr">
+                <a:lumMod val="105000"/>
+                <a:satMod val="103000"/>
+                <a:tint val="73000"/>
+              </a:schemeClr>
+            </a:gs>
+            <a:gs pos="100000">
+              <a:schemeClr val="phClr">
+                <a:lumMod val="105000"/>
+                <a:satMod val="109000"/>
+                <a:tint val="81000"/>
+              </a:schemeClr>
+            </a:gs>
+          </a:gsLst>
+          <a:lin ang="5400000" scaled="0"/>
+        </a:gradFill>
+        <a:gradFill rotWithShape="1">
+          <a:gsLst>
+            <a:gs pos="0">
+              <a:schemeClr val="phClr">
+                <a:satMod val="103000"/>
+                <a:lumMod val="102000"/>
+                <a:tint val="94000"/>
+              </a:schemeClr>
+            </a:gs>
+            <a:gs pos="50000">
+              <a:schemeClr val="phClr">
+                <a:satMod val="110000"/>
+                <a:lumMod val="100000"/>
+                <a:shade val="100000"/>
+              </a:schemeClr>
+            </a:gs>
+            <a:gs pos="100000">
+              <a:schemeClr val="phClr">
+                <a:lumMod val="99000"/>
+                <a:satMod val="120000"/>
+                <a:shade val="78000"/>
+              </a:schemeClr>
+            </a:gs>
+          </a:gsLst>
+          <a:lin ang="5400000" scaled="0"/>
+        </a:gradFill>
+      </a:fillStyleLst>
+      <a:lnStyleLst>
+        <a:ln w="6350" cap="flat" cmpd="sng" algn="ctr">
+          <a:solidFill>
+            <a:schemeClr val="phClr"/>
+          </a:solidFill>
+          <a:prstDash val="solid"/>
+          <a:miter lim="800000"/>
+        </a:ln>
+        <a:ln w="12700" cap="flat" cmpd="sng" algn="ctr">
+          <a:solidFill>
+            <a:schemeClr val="phClr"/>
+          </a:solidFill>
+          <a:prstDash val="solid"/>
+          <a:miter lim="800000"/>
+        </a:ln>
+        <a:ln w="19050" cap="flat" cmpd="sng" algn="ctr">
+          <a:solidFill>
+            <a:schemeClr val="phClr"/>
+          </a:solidFill>
+          <a:prstDash val="solid"/>
+          <a:miter lim="800000"/>
+        </a:ln>
+      </a:lnStyleLst>
+      <a:effectStyleLst>
+        <a:effectStyle>
+          <a:effectLst/>
+        </a:effectStyle>
+        <a:effectStyle>
+          <a:effectLst/>
+        </a:effectStyle>
+        <a:effectStyle>
+          <a:effectLst>
+            <a:outerShdw blurRad="57150" dist="19050" dir="5400000" algn="ctr" rotWithShape="0">
+              <a:srgbClr val="000000">
+                <a:alpha val="63000"/>
+              </a:srgbClr>
+            </a:outerShdw>
+          </a:effectLst>
+        </a:effectStyle>
+      </a:effectStyleLst>
+      <a:bgFillStyleLst>
+        <a:solidFill>
+          <a:schemeClr val="phClr"/>
+        </a:solidFill>
+        <a:solidFill>
+          <a:schemeClr val="phClr">
+            <a:tint val="95000"/>
+            <a:satMod val="170000"/>
+          </a:schemeClr>
+        </a:solidFill>
+        <a:gradFill rotWithShape="1">
+          <a:gsLst>
+            <a:gs pos="0">
+              <a:schemeClr val="phClr">
+                <a:tint val="93000"/>
+                <a:satMod val="150000"/>
+                <a:shade val="98000"/>
+                <a:lumMod val="102000"/>
+              </a:schemeClr>
+            </a:gs>
+            <a:gs pos="50000">
+              <a:schemeClr val="phClr">
+                <a:tint val="98000"/>
+                <a:satMod val="130000"/>
+                <a:shade val="90000"/>
+                <a:lumMod val="103000"/>
+              </a:schemeClr>
+            </a:gs>
+            <a:gs pos="100000">
+              <a:schemeClr val="phClr">
+                <a:shade val="63000"/>
+                <a:satMod val="120000"/>
+              </a:schemeClr>
+            </a:gs>
+          </a:gsLst>
+          <a:lin ang="5400000" scaled="0"/>
+        </a:gradFill>
+      </a:bgFillStyleLst>
+    </a:fmtScheme>
+  </a:themeElements>
+  <a:objectDefaults/>
+  <a:extraClrSchemeLst/>
+  <a:extLst>
+    <a:ext uri="{05A4C25C-085E-4340-85A3-A5531E510DB2}">
+      <thm15:themeFamily xmlns:thm15="http://schemas.microsoft.com/office/thememl/2012/main" name="Office Theme" id="{62F939B6-93AF-4DB8-9C6B-D6C7DFDC589F}" vid="{4A3C46E8-61CC-4603-A589-7422A47A8E4A}"/>
+    </a:ext>
+  </a:extLst>
+</a:theme>
 </file>
</xml_diff>

<commit_message>
Updated dashboard and presentation
</commit_message>
<xml_diff>
--- a/research/Usability Testing Presentation.pptx
+++ b/research/Usability Testing Presentation.pptx
@@ -201,7 +201,7 @@
           <a:p>
             <a:fld id="{A4B94F35-941F-4679-9C47-BB5DBD679134}" type="datetimeFigureOut">
               <a:rPr lang="en-GB" smtClean="0"/>
-              <a:t>17/01/2023</a:t>
+              <a:t>18/01/2023</a:t>
             </a:fld>
             <a:endParaRPr lang="en-GB"/>
           </a:p>
@@ -515,7 +515,7 @@
           <a:p>
             <a:r>
               <a:rPr lang="en-GB" dirty="0"/>
-              <a:t>After the presentation I will link a short 5-10 minutes questionnaire. If possible could you fill it out whenever possible so I can use the analysis in my dissertation. It’s on the effectiveness of the interface and visualisation. The questionnaire has a link to a mock version of the interface for you to try yourself.</a:t>
+              <a:t>After the presentation I will link a short 5-10 minutes questionnaire. If possible could you fill it out whenever possible so I can use the analysis in my dissertation. It’s on the effectiveness of the interface and visualisation. The questionnaire has a link to a mock version of the interface (not connected to scraper) for you to try yourself.</a:t>
             </a:r>
           </a:p>
         </p:txBody>
@@ -601,12 +601,8 @@
           <a:lstStyle/>
           <a:p>
             <a:r>
-              <a:rPr lang="en-GB" dirty="0"/>
-              <a:t>Just to recap, </a:t>
-            </a:r>
-            <a:r>
               <a:rPr lang="en-GB" dirty="0" err="1"/>
-              <a:t>biocaster</a:t>
+              <a:t>Biocaster</a:t>
             </a:r>
             <a:r>
               <a:rPr lang="en-GB" dirty="0"/>
@@ -895,7 +891,7 @@
           <a:p>
             <a:fld id="{ADDDB1D4-6B6A-4FAC-B7EF-E51C72DDB38F}" type="datetimeFigureOut">
               <a:rPr lang="en-GB" smtClean="0"/>
-              <a:t>17/01/2023</a:t>
+              <a:t>18/01/2023</a:t>
             </a:fld>
             <a:endParaRPr lang="en-GB"/>
           </a:p>
@@ -1095,7 +1091,7 @@
           <a:p>
             <a:fld id="{ADDDB1D4-6B6A-4FAC-B7EF-E51C72DDB38F}" type="datetimeFigureOut">
               <a:rPr lang="en-GB" smtClean="0"/>
-              <a:t>17/01/2023</a:t>
+              <a:t>18/01/2023</a:t>
             </a:fld>
             <a:endParaRPr lang="en-GB"/>
           </a:p>
@@ -1305,7 +1301,7 @@
           <a:p>
             <a:fld id="{ADDDB1D4-6B6A-4FAC-B7EF-E51C72DDB38F}" type="datetimeFigureOut">
               <a:rPr lang="en-GB" smtClean="0"/>
-              <a:t>17/01/2023</a:t>
+              <a:t>18/01/2023</a:t>
             </a:fld>
             <a:endParaRPr lang="en-GB"/>
           </a:p>
@@ -1505,7 +1501,7 @@
           <a:p>
             <a:fld id="{ADDDB1D4-6B6A-4FAC-B7EF-E51C72DDB38F}" type="datetimeFigureOut">
               <a:rPr lang="en-GB" smtClean="0"/>
-              <a:t>17/01/2023</a:t>
+              <a:t>18/01/2023</a:t>
             </a:fld>
             <a:endParaRPr lang="en-GB"/>
           </a:p>
@@ -1781,7 +1777,7 @@
           <a:p>
             <a:fld id="{ADDDB1D4-6B6A-4FAC-B7EF-E51C72DDB38F}" type="datetimeFigureOut">
               <a:rPr lang="en-GB" smtClean="0"/>
-              <a:t>17/01/2023</a:t>
+              <a:t>18/01/2023</a:t>
             </a:fld>
             <a:endParaRPr lang="en-GB"/>
           </a:p>
@@ -2049,7 +2045,7 @@
           <a:p>
             <a:fld id="{ADDDB1D4-6B6A-4FAC-B7EF-E51C72DDB38F}" type="datetimeFigureOut">
               <a:rPr lang="en-GB" smtClean="0"/>
-              <a:t>17/01/2023</a:t>
+              <a:t>18/01/2023</a:t>
             </a:fld>
             <a:endParaRPr lang="en-GB"/>
           </a:p>
@@ -2464,7 +2460,7 @@
           <a:p>
             <a:fld id="{ADDDB1D4-6B6A-4FAC-B7EF-E51C72DDB38F}" type="datetimeFigureOut">
               <a:rPr lang="en-GB" smtClean="0"/>
-              <a:t>17/01/2023</a:t>
+              <a:t>18/01/2023</a:t>
             </a:fld>
             <a:endParaRPr lang="en-GB"/>
           </a:p>
@@ -2606,7 +2602,7 @@
           <a:p>
             <a:fld id="{ADDDB1D4-6B6A-4FAC-B7EF-E51C72DDB38F}" type="datetimeFigureOut">
               <a:rPr lang="en-GB" smtClean="0"/>
-              <a:t>17/01/2023</a:t>
+              <a:t>18/01/2023</a:t>
             </a:fld>
             <a:endParaRPr lang="en-GB"/>
           </a:p>
@@ -2719,7 +2715,7 @@
           <a:p>
             <a:fld id="{ADDDB1D4-6B6A-4FAC-B7EF-E51C72DDB38F}" type="datetimeFigureOut">
               <a:rPr lang="en-GB" smtClean="0"/>
-              <a:t>17/01/2023</a:t>
+              <a:t>18/01/2023</a:t>
             </a:fld>
             <a:endParaRPr lang="en-GB"/>
           </a:p>
@@ -3032,7 +3028,7 @@
           <a:p>
             <a:fld id="{ADDDB1D4-6B6A-4FAC-B7EF-E51C72DDB38F}" type="datetimeFigureOut">
               <a:rPr lang="en-GB" smtClean="0"/>
-              <a:t>17/01/2023</a:t>
+              <a:t>18/01/2023</a:t>
             </a:fld>
             <a:endParaRPr lang="en-GB"/>
           </a:p>
@@ -3321,7 +3317,7 @@
           <a:p>
             <a:fld id="{ADDDB1D4-6B6A-4FAC-B7EF-E51C72DDB38F}" type="datetimeFigureOut">
               <a:rPr lang="en-GB" smtClean="0"/>
-              <a:t>17/01/2023</a:t>
+              <a:t>18/01/2023</a:t>
             </a:fld>
             <a:endParaRPr lang="en-GB"/>
           </a:p>
@@ -3564,7 +3560,7 @@
           <a:p>
             <a:fld id="{ADDDB1D4-6B6A-4FAC-B7EF-E51C72DDB38F}" type="datetimeFigureOut">
               <a:rPr lang="en-GB" smtClean="0"/>
-              <a:t>17/01/2023</a:t>
+              <a:t>18/01/2023</a:t>
             </a:fld>
             <a:endParaRPr lang="en-GB"/>
           </a:p>
@@ -4010,6 +4006,17 @@
           <a:lstStyle/>
           <a:p>
             <a:r>
+              <a:rPr lang="en-GB" b="1">
+                <a:solidFill>
+                  <a:srgbClr val="0C2E8A"/>
+                </a:solidFill>
+                <a:latin typeface="Open sans" panose="020B0604020202020204" pitchFamily="2" charset="0"/>
+                <a:ea typeface="Open sans" panose="020B0604020202020204" pitchFamily="2" charset="0"/>
+                <a:cs typeface="Open sans" panose="020B0604020202020204" pitchFamily="2" charset="0"/>
+              </a:rPr>
+              <a:t>News Scraper </a:t>
+            </a:r>
+            <a:r>
               <a:rPr lang="en-GB" b="1" dirty="0">
                 <a:solidFill>
                   <a:srgbClr val="0C2E8A"/>
@@ -4018,7 +4025,7 @@
                 <a:ea typeface="Open sans" panose="020B0604020202020204" pitchFamily="2" charset="0"/>
                 <a:cs typeface="Open sans" panose="020B0604020202020204" pitchFamily="2" charset="0"/>
               </a:rPr>
-              <a:t>News scraper Dashboard Usability Testing</a:t>
+              <a:t>Dashboard Usability Testing</a:t>
             </a:r>
           </a:p>
         </p:txBody>
@@ -4520,7 +4527,7 @@
                 <a:ea typeface="Open sans" panose="020B0606030504020204" pitchFamily="2" charset="0"/>
                 <a:cs typeface="Open sans" panose="020B0606030504020204" pitchFamily="2" charset="0"/>
               </a:rPr>
-              <a:t>Can view which sources are still effective and which are stale</a:t>
+              <a:t>Can quickly and easily add new sources</a:t>
             </a:r>
           </a:p>
           <a:p>
@@ -4530,7 +4537,7 @@
                 <a:ea typeface="Open sans" panose="020B0606030504020204" pitchFamily="2" charset="0"/>
                 <a:cs typeface="Open sans" panose="020B0606030504020204" pitchFamily="2" charset="0"/>
               </a:rPr>
-              <a:t>Can quickly and easily add new sources</a:t>
+              <a:t>Can view which sources are still effective and which are stale</a:t>
             </a:r>
           </a:p>
         </p:txBody>

</xml_diff>

<commit_message>
Updated presentation and completed questionnaire
</commit_message>
<xml_diff>
--- a/research/Usability Testing Presentation.pptx
+++ b/research/Usability Testing Presentation.pptx
@@ -5,15 +5,22 @@
     <p:sldMasterId id="2147483648" r:id="rId1"/>
   </p:sldMasterIdLst>
   <p:notesMasterIdLst>
-    <p:notesMasterId r:id="rId8"/>
+    <p:notesMasterId r:id="rId15"/>
   </p:notesMasterIdLst>
   <p:sldIdLst>
     <p:sldId id="256" r:id="rId2"/>
-    <p:sldId id="257" r:id="rId3"/>
-    <p:sldId id="261" r:id="rId4"/>
-    <p:sldId id="262" r:id="rId5"/>
-    <p:sldId id="263" r:id="rId6"/>
-    <p:sldId id="258" r:id="rId7"/>
+    <p:sldId id="261" r:id="rId3"/>
+    <p:sldId id="271" r:id="rId4"/>
+    <p:sldId id="273" r:id="rId5"/>
+    <p:sldId id="257" r:id="rId6"/>
+    <p:sldId id="262" r:id="rId7"/>
+    <p:sldId id="258" r:id="rId8"/>
+    <p:sldId id="265" r:id="rId9"/>
+    <p:sldId id="264" r:id="rId10"/>
+    <p:sldId id="266" r:id="rId11"/>
+    <p:sldId id="267" r:id="rId12"/>
+    <p:sldId id="268" r:id="rId13"/>
+    <p:sldId id="270" r:id="rId14"/>
   </p:sldIdLst>
   <p:sldSz cx="12192000" cy="6858000"/>
   <p:notesSz cx="6858000" cy="9144000"/>
@@ -515,8 +522,20 @@
           <a:lstStyle/>
           <a:p>
             <a:r>
+              <a:rPr lang="en-GB" dirty="0" err="1"/>
+              <a:t>Biocaster</a:t>
+            </a:r>
+            <a:r>
               <a:rPr lang="en-GB" dirty="0"/>
-              <a:t>After the presentation I will link a short 5-10 minutes questionnaire. If possible could you fill it out whenever possible so I can use the analysis in my dissertation. It’s on the effectiveness of the interface and visualisation. The questionnaire has a link to a mock version of the interface (not connected to scraper) for you to try yourself.</a:t>
+              <a:t> currently gets its news information from RSS feeds. My individual project is to create a system which is more configurable and can use multiple different information sources, such as website scraping, to curate a wider range of news sources. This will be combined with a classifier to categorise the incoming articles. I am also creating a dashboard so that this system can be managed and you can see a </a:t>
+            </a:r>
+            <a:r>
+              <a:rPr lang="en-GB" dirty="0" err="1"/>
+              <a:t>kibana</a:t>
+            </a:r>
+            <a:r>
+              <a:rPr lang="en-GB" dirty="0"/>
+              <a:t> visualisation of the data gathered, which I will demonstrate today.</a:t>
             </a:r>
           </a:p>
         </p:txBody>
@@ -547,7 +566,181 @@
     </p:spTree>
     <p:extLst>
       <p:ext uri="{BB962C8B-B14F-4D97-AF65-F5344CB8AC3E}">
-        <p14:creationId xmlns:p14="http://schemas.microsoft.com/office/powerpoint/2010/main" val="405085906"/>
+        <p14:creationId xmlns:p14="http://schemas.microsoft.com/office/powerpoint/2010/main" val="638209211"/>
+      </p:ext>
+    </p:extLst>
+  </p:cSld>
+  <p:clrMapOvr>
+    <a:masterClrMapping/>
+  </p:clrMapOvr>
+</p:notes>
+</file>
+
+<file path=ppt/notesSlides/notesSlide10.xml><?xml version="1.0" encoding="utf-8"?>
+<p:notes xmlns:a="http://schemas.openxmlformats.org/drawingml/2006/main" xmlns:r="http://schemas.openxmlformats.org/officeDocument/2006/relationships" xmlns:p="http://schemas.openxmlformats.org/presentationml/2006/main">
+  <p:cSld>
+    <p:spTree>
+      <p:nvGrpSpPr>
+        <p:cNvPr id="1" name=""/>
+        <p:cNvGrpSpPr/>
+        <p:nvPr/>
+      </p:nvGrpSpPr>
+      <p:grpSpPr>
+        <a:xfrm>
+          <a:off x="0" y="0"/>
+          <a:ext cx="0" cy="0"/>
+          <a:chOff x="0" y="0"/>
+          <a:chExt cx="0" cy="0"/>
+        </a:xfrm>
+      </p:grpSpPr>
+      <p:sp>
+        <p:nvSpPr>
+          <p:cNvPr id="2" name="Slide Image Placeholder 1"/>
+          <p:cNvSpPr>
+            <a:spLocks noGrp="1" noRot="1" noChangeAspect="1"/>
+          </p:cNvSpPr>
+          <p:nvPr>
+            <p:ph type="sldImg"/>
+          </p:nvPr>
+        </p:nvSpPr>
+        <p:spPr/>
+      </p:sp>
+      <p:sp>
+        <p:nvSpPr>
+          <p:cNvPr id="3" name="Notes Placeholder 2"/>
+          <p:cNvSpPr>
+            <a:spLocks noGrp="1"/>
+          </p:cNvSpPr>
+          <p:nvPr>
+            <p:ph type="body" idx="1"/>
+          </p:nvPr>
+        </p:nvSpPr>
+        <p:spPr/>
+        <p:txBody>
+          <a:bodyPr/>
+          <a:lstStyle/>
+          <a:p>
+            <a:r>
+              <a:rPr lang="en-GB" dirty="0"/>
+              <a:t>I wanted to create an easy to use dashboard where you can easily see the sources being used in the system, and add and remove sources, and turn them on and off. You can also see which sources are stale, which was mentioned in my previous meeting as something useful.</a:t>
+            </a:r>
+          </a:p>
+        </p:txBody>
+      </p:sp>
+      <p:sp>
+        <p:nvSpPr>
+          <p:cNvPr id="4" name="Slide Number Placeholder 3"/>
+          <p:cNvSpPr>
+            <a:spLocks noGrp="1"/>
+          </p:cNvSpPr>
+          <p:nvPr>
+            <p:ph type="sldNum" sz="quarter" idx="5"/>
+          </p:nvPr>
+        </p:nvSpPr>
+        <p:spPr/>
+        <p:txBody>
+          <a:bodyPr/>
+          <a:lstStyle/>
+          <a:p>
+            <a:fld id="{0FCFED6C-7B9F-4E48-89DA-B7F4954BD38C}" type="slidenum">
+              <a:rPr lang="en-GB" smtClean="0"/>
+              <a:t>12</a:t>
+            </a:fld>
+            <a:endParaRPr lang="en-GB"/>
+          </a:p>
+        </p:txBody>
+      </p:sp>
+    </p:spTree>
+    <p:extLst>
+      <p:ext uri="{BB962C8B-B14F-4D97-AF65-F5344CB8AC3E}">
+        <p14:creationId xmlns:p14="http://schemas.microsoft.com/office/powerpoint/2010/main" val="3034778611"/>
+      </p:ext>
+    </p:extLst>
+  </p:cSld>
+  <p:clrMapOvr>
+    <a:masterClrMapping/>
+  </p:clrMapOvr>
+</p:notes>
+</file>
+
+<file path=ppt/notesSlides/notesSlide11.xml><?xml version="1.0" encoding="utf-8"?>
+<p:notes xmlns:a="http://schemas.openxmlformats.org/drawingml/2006/main" xmlns:r="http://schemas.openxmlformats.org/officeDocument/2006/relationships" xmlns:p="http://schemas.openxmlformats.org/presentationml/2006/main">
+  <p:cSld>
+    <p:spTree>
+      <p:nvGrpSpPr>
+        <p:cNvPr id="1" name=""/>
+        <p:cNvGrpSpPr/>
+        <p:nvPr/>
+      </p:nvGrpSpPr>
+      <p:grpSpPr>
+        <a:xfrm>
+          <a:off x="0" y="0"/>
+          <a:ext cx="0" cy="0"/>
+          <a:chOff x="0" y="0"/>
+          <a:chExt cx="0" cy="0"/>
+        </a:xfrm>
+      </p:grpSpPr>
+      <p:sp>
+        <p:nvSpPr>
+          <p:cNvPr id="2" name="Slide Image Placeholder 1"/>
+          <p:cNvSpPr>
+            <a:spLocks noGrp="1" noRot="1" noChangeAspect="1"/>
+          </p:cNvSpPr>
+          <p:nvPr>
+            <p:ph type="sldImg"/>
+          </p:nvPr>
+        </p:nvSpPr>
+        <p:spPr/>
+      </p:sp>
+      <p:sp>
+        <p:nvSpPr>
+          <p:cNvPr id="3" name="Notes Placeholder 2"/>
+          <p:cNvSpPr>
+            <a:spLocks noGrp="1"/>
+          </p:cNvSpPr>
+          <p:nvPr>
+            <p:ph type="body" idx="1"/>
+          </p:nvPr>
+        </p:nvSpPr>
+        <p:spPr/>
+        <p:txBody>
+          <a:bodyPr/>
+          <a:lstStyle/>
+          <a:p>
+            <a:r>
+              <a:rPr lang="en-GB" dirty="0"/>
+              <a:t>I wanted to create an easy to use dashboard where you can easily see the sources being used in the system, and add and remove sources, and turn them on and off. You can also see which sources are stale, which was mentioned in my previous meeting as something useful.</a:t>
+            </a:r>
+          </a:p>
+        </p:txBody>
+      </p:sp>
+      <p:sp>
+        <p:nvSpPr>
+          <p:cNvPr id="4" name="Slide Number Placeholder 3"/>
+          <p:cNvSpPr>
+            <a:spLocks noGrp="1"/>
+          </p:cNvSpPr>
+          <p:nvPr>
+            <p:ph type="sldNum" sz="quarter" idx="5"/>
+          </p:nvPr>
+        </p:nvSpPr>
+        <p:spPr/>
+        <p:txBody>
+          <a:bodyPr/>
+          <a:lstStyle/>
+          <a:p>
+            <a:fld id="{0FCFED6C-7B9F-4E48-89DA-B7F4954BD38C}" type="slidenum">
+              <a:rPr lang="en-GB" smtClean="0"/>
+              <a:t>13</a:t>
+            </a:fld>
+            <a:endParaRPr lang="en-GB"/>
+          </a:p>
+        </p:txBody>
+      </p:sp>
+    </p:spTree>
+    <p:extLst>
+      <p:ext uri="{BB962C8B-B14F-4D97-AF65-F5344CB8AC3E}">
+        <p14:creationId xmlns:p14="http://schemas.microsoft.com/office/powerpoint/2010/main" val="3014314713"/>
       </p:ext>
     </p:extLst>
   </p:cSld>
@@ -601,22 +794,7 @@
           <a:bodyPr/>
           <a:lstStyle/>
           <a:p>
-            <a:r>
-              <a:rPr lang="en-GB" dirty="0" err="1"/>
-              <a:t>Biocaster</a:t>
-            </a:r>
-            <a:r>
-              <a:rPr lang="en-GB" dirty="0"/>
-              <a:t> currently gets its news information from RSS feeds. My individual project is to create a system which is more configurable and can use multiple different information sources, such as website scraping, to curate a wider range of news sources. This will be combined with a classifier to categorise the incoming articles. I am also creating a dashboard so that this system can be managed and you can see a </a:t>
-            </a:r>
-            <a:r>
-              <a:rPr lang="en-GB" dirty="0" err="1"/>
-              <a:t>kibana</a:t>
-            </a:r>
-            <a:r>
-              <a:rPr lang="en-GB" dirty="0"/>
-              <a:t> visualisation of the data gathered, which I will demonstrate today.</a:t>
-            </a:r>
+            <a:endParaRPr lang="en-GB" dirty="0"/>
           </a:p>
         </p:txBody>
       </p:sp>
@@ -646,7 +824,7 @@
     </p:spTree>
     <p:extLst>
       <p:ext uri="{BB962C8B-B14F-4D97-AF65-F5344CB8AC3E}">
-        <p14:creationId xmlns:p14="http://schemas.microsoft.com/office/powerpoint/2010/main" val="638209211"/>
+        <p14:creationId xmlns:p14="http://schemas.microsoft.com/office/powerpoint/2010/main" val="3613207187"/>
       </p:ext>
     </p:extLst>
   </p:cSld>
@@ -700,10 +878,7 @@
           <a:bodyPr/>
           <a:lstStyle/>
           <a:p>
-            <a:r>
-              <a:rPr lang="en-GB" dirty="0"/>
-              <a:t>I wanted to create an easy to use dashboard where you can easily see the sources being used in the system, and add and remove sources, and turn them on and off. You can also see which sources are stale, which was mentioned in my previous meeting as something useful.</a:t>
-            </a:r>
+            <a:endParaRPr lang="en-GB" dirty="0"/>
           </a:p>
         </p:txBody>
       </p:sp>
@@ -733,7 +908,7 @@
     </p:spTree>
     <p:extLst>
       <p:ext uri="{BB962C8B-B14F-4D97-AF65-F5344CB8AC3E}">
-        <p14:creationId xmlns:p14="http://schemas.microsoft.com/office/powerpoint/2010/main" val="1212567091"/>
+        <p14:creationId xmlns:p14="http://schemas.microsoft.com/office/powerpoint/2010/main" val="1040136083"/>
       </p:ext>
     </p:extLst>
   </p:cSld>
@@ -789,7 +964,7 @@
           <a:p>
             <a:r>
               <a:rPr lang="en-GB" dirty="0"/>
-              <a:t>I wanted to create an easy to use dashboard where you can easily see the sources being used in the system, and add and remove sources, and turn them on and off. You can also see which sources are stale, which was mentioned in my previous meeting as something useful.</a:t>
+              <a:t>After the presentation I will link a short 5-10 minutes questionnaire. If possible could you fill it out whenever possible so I can use the analysis in my dissertation. It’s on the effectiveness of the interface and visualisation. The questionnaire has a link to a mock version of the interface (not connected to scraper) for you to try yourself.</a:t>
             </a:r>
           </a:p>
         </p:txBody>
@@ -820,7 +995,442 @@
     </p:spTree>
     <p:extLst>
       <p:ext uri="{BB962C8B-B14F-4D97-AF65-F5344CB8AC3E}">
-        <p14:creationId xmlns:p14="http://schemas.microsoft.com/office/powerpoint/2010/main" val="1038417033"/>
+        <p14:creationId xmlns:p14="http://schemas.microsoft.com/office/powerpoint/2010/main" val="405085906"/>
+      </p:ext>
+    </p:extLst>
+  </p:cSld>
+  <p:clrMapOvr>
+    <a:masterClrMapping/>
+  </p:clrMapOvr>
+</p:notes>
+</file>
+
+<file path=ppt/notesSlides/notesSlide5.xml><?xml version="1.0" encoding="utf-8"?>
+<p:notes xmlns:a="http://schemas.openxmlformats.org/drawingml/2006/main" xmlns:r="http://schemas.openxmlformats.org/officeDocument/2006/relationships" xmlns:p="http://schemas.openxmlformats.org/presentationml/2006/main">
+  <p:cSld>
+    <p:spTree>
+      <p:nvGrpSpPr>
+        <p:cNvPr id="1" name=""/>
+        <p:cNvGrpSpPr/>
+        <p:nvPr/>
+      </p:nvGrpSpPr>
+      <p:grpSpPr>
+        <a:xfrm>
+          <a:off x="0" y="0"/>
+          <a:ext cx="0" cy="0"/>
+          <a:chOff x="0" y="0"/>
+          <a:chExt cx="0" cy="0"/>
+        </a:xfrm>
+      </p:grpSpPr>
+      <p:sp>
+        <p:nvSpPr>
+          <p:cNvPr id="2" name="Slide Image Placeholder 1"/>
+          <p:cNvSpPr>
+            <a:spLocks noGrp="1" noRot="1" noChangeAspect="1"/>
+          </p:cNvSpPr>
+          <p:nvPr>
+            <p:ph type="sldImg"/>
+          </p:nvPr>
+        </p:nvSpPr>
+        <p:spPr/>
+      </p:sp>
+      <p:sp>
+        <p:nvSpPr>
+          <p:cNvPr id="3" name="Notes Placeholder 2"/>
+          <p:cNvSpPr>
+            <a:spLocks noGrp="1"/>
+          </p:cNvSpPr>
+          <p:nvPr>
+            <p:ph type="body" idx="1"/>
+          </p:nvPr>
+        </p:nvSpPr>
+        <p:spPr/>
+        <p:txBody>
+          <a:bodyPr/>
+          <a:lstStyle/>
+          <a:p>
+            <a:r>
+              <a:rPr lang="en-GB" dirty="0"/>
+              <a:t>I wanted to create an easy to use dashboard where you can easily see the sources being used in the system, and add and remove sources, and turn them on and off. You can also see which sources are stale, which was mentioned in my previous meeting as something useful.</a:t>
+            </a:r>
+          </a:p>
+        </p:txBody>
+      </p:sp>
+      <p:sp>
+        <p:nvSpPr>
+          <p:cNvPr id="4" name="Slide Number Placeholder 3"/>
+          <p:cNvSpPr>
+            <a:spLocks noGrp="1"/>
+          </p:cNvSpPr>
+          <p:nvPr>
+            <p:ph type="sldNum" sz="quarter" idx="5"/>
+          </p:nvPr>
+        </p:nvSpPr>
+        <p:spPr/>
+        <p:txBody>
+          <a:bodyPr/>
+          <a:lstStyle/>
+          <a:p>
+            <a:fld id="{0FCFED6C-7B9F-4E48-89DA-B7F4954BD38C}" type="slidenum">
+              <a:rPr lang="en-GB" smtClean="0"/>
+              <a:t>6</a:t>
+            </a:fld>
+            <a:endParaRPr lang="en-GB"/>
+          </a:p>
+        </p:txBody>
+      </p:sp>
+    </p:spTree>
+    <p:extLst>
+      <p:ext uri="{BB962C8B-B14F-4D97-AF65-F5344CB8AC3E}">
+        <p14:creationId xmlns:p14="http://schemas.microsoft.com/office/powerpoint/2010/main" val="1212567091"/>
+      </p:ext>
+    </p:extLst>
+  </p:cSld>
+  <p:clrMapOvr>
+    <a:masterClrMapping/>
+  </p:clrMapOvr>
+</p:notes>
+</file>
+
+<file path=ppt/notesSlides/notesSlide6.xml><?xml version="1.0" encoding="utf-8"?>
+<p:notes xmlns:a="http://schemas.openxmlformats.org/drawingml/2006/main" xmlns:r="http://schemas.openxmlformats.org/officeDocument/2006/relationships" xmlns:p="http://schemas.openxmlformats.org/presentationml/2006/main">
+  <p:cSld>
+    <p:spTree>
+      <p:nvGrpSpPr>
+        <p:cNvPr id="1" name=""/>
+        <p:cNvGrpSpPr/>
+        <p:nvPr/>
+      </p:nvGrpSpPr>
+      <p:grpSpPr>
+        <a:xfrm>
+          <a:off x="0" y="0"/>
+          <a:ext cx="0" cy="0"/>
+          <a:chOff x="0" y="0"/>
+          <a:chExt cx="0" cy="0"/>
+        </a:xfrm>
+      </p:grpSpPr>
+      <p:sp>
+        <p:nvSpPr>
+          <p:cNvPr id="2" name="Slide Image Placeholder 1"/>
+          <p:cNvSpPr>
+            <a:spLocks noGrp="1" noRot="1" noChangeAspect="1"/>
+          </p:cNvSpPr>
+          <p:nvPr>
+            <p:ph type="sldImg"/>
+          </p:nvPr>
+        </p:nvSpPr>
+        <p:spPr/>
+      </p:sp>
+      <p:sp>
+        <p:nvSpPr>
+          <p:cNvPr id="3" name="Notes Placeholder 2"/>
+          <p:cNvSpPr>
+            <a:spLocks noGrp="1"/>
+          </p:cNvSpPr>
+          <p:nvPr>
+            <p:ph type="body" idx="1"/>
+          </p:nvPr>
+        </p:nvSpPr>
+        <p:spPr/>
+        <p:txBody>
+          <a:bodyPr/>
+          <a:lstStyle/>
+          <a:p>
+            <a:r>
+              <a:rPr lang="en-GB" dirty="0"/>
+              <a:t>I wanted to create an easy to use dashboard where you can easily see the sources being used in the system, and add and remove sources, and turn them on and off. You can also see which sources are stale, which was mentioned in my previous meeting as something useful.</a:t>
+            </a:r>
+          </a:p>
+        </p:txBody>
+      </p:sp>
+      <p:sp>
+        <p:nvSpPr>
+          <p:cNvPr id="4" name="Slide Number Placeholder 3"/>
+          <p:cNvSpPr>
+            <a:spLocks noGrp="1"/>
+          </p:cNvSpPr>
+          <p:nvPr>
+            <p:ph type="sldNum" sz="quarter" idx="5"/>
+          </p:nvPr>
+        </p:nvSpPr>
+        <p:spPr/>
+        <p:txBody>
+          <a:bodyPr/>
+          <a:lstStyle/>
+          <a:p>
+            <a:fld id="{0FCFED6C-7B9F-4E48-89DA-B7F4954BD38C}" type="slidenum">
+              <a:rPr lang="en-GB" smtClean="0"/>
+              <a:t>8</a:t>
+            </a:fld>
+            <a:endParaRPr lang="en-GB"/>
+          </a:p>
+        </p:txBody>
+      </p:sp>
+    </p:spTree>
+    <p:extLst>
+      <p:ext uri="{BB962C8B-B14F-4D97-AF65-F5344CB8AC3E}">
+        <p14:creationId xmlns:p14="http://schemas.microsoft.com/office/powerpoint/2010/main" val="4206291030"/>
+      </p:ext>
+    </p:extLst>
+  </p:cSld>
+  <p:clrMapOvr>
+    <a:masterClrMapping/>
+  </p:clrMapOvr>
+</p:notes>
+</file>
+
+<file path=ppt/notesSlides/notesSlide7.xml><?xml version="1.0" encoding="utf-8"?>
+<p:notes xmlns:a="http://schemas.openxmlformats.org/drawingml/2006/main" xmlns:r="http://schemas.openxmlformats.org/officeDocument/2006/relationships" xmlns:p="http://schemas.openxmlformats.org/presentationml/2006/main">
+  <p:cSld>
+    <p:spTree>
+      <p:nvGrpSpPr>
+        <p:cNvPr id="1" name=""/>
+        <p:cNvGrpSpPr/>
+        <p:nvPr/>
+      </p:nvGrpSpPr>
+      <p:grpSpPr>
+        <a:xfrm>
+          <a:off x="0" y="0"/>
+          <a:ext cx="0" cy="0"/>
+          <a:chOff x="0" y="0"/>
+          <a:chExt cx="0" cy="0"/>
+        </a:xfrm>
+      </p:grpSpPr>
+      <p:sp>
+        <p:nvSpPr>
+          <p:cNvPr id="2" name="Slide Image Placeholder 1"/>
+          <p:cNvSpPr>
+            <a:spLocks noGrp="1" noRot="1" noChangeAspect="1"/>
+          </p:cNvSpPr>
+          <p:nvPr>
+            <p:ph type="sldImg"/>
+          </p:nvPr>
+        </p:nvSpPr>
+        <p:spPr/>
+      </p:sp>
+      <p:sp>
+        <p:nvSpPr>
+          <p:cNvPr id="3" name="Notes Placeholder 2"/>
+          <p:cNvSpPr>
+            <a:spLocks noGrp="1"/>
+          </p:cNvSpPr>
+          <p:nvPr>
+            <p:ph type="body" idx="1"/>
+          </p:nvPr>
+        </p:nvSpPr>
+        <p:spPr/>
+        <p:txBody>
+          <a:bodyPr/>
+          <a:lstStyle/>
+          <a:p>
+            <a:r>
+              <a:rPr lang="en-GB" dirty="0"/>
+              <a:t>I wanted to create an easy to use dashboard where you can easily see the sources being used in the system, and add and remove sources, and turn them on and off. You can also see which sources are stale, which was mentioned in my previous meeting as something useful.</a:t>
+            </a:r>
+          </a:p>
+        </p:txBody>
+      </p:sp>
+      <p:sp>
+        <p:nvSpPr>
+          <p:cNvPr id="4" name="Slide Number Placeholder 3"/>
+          <p:cNvSpPr>
+            <a:spLocks noGrp="1"/>
+          </p:cNvSpPr>
+          <p:nvPr>
+            <p:ph type="sldNum" sz="quarter" idx="5"/>
+          </p:nvPr>
+        </p:nvSpPr>
+        <p:spPr/>
+        <p:txBody>
+          <a:bodyPr/>
+          <a:lstStyle/>
+          <a:p>
+            <a:fld id="{0FCFED6C-7B9F-4E48-89DA-B7F4954BD38C}" type="slidenum">
+              <a:rPr lang="en-GB" smtClean="0"/>
+              <a:t>9</a:t>
+            </a:fld>
+            <a:endParaRPr lang="en-GB"/>
+          </a:p>
+        </p:txBody>
+      </p:sp>
+    </p:spTree>
+    <p:extLst>
+      <p:ext uri="{BB962C8B-B14F-4D97-AF65-F5344CB8AC3E}">
+        <p14:creationId xmlns:p14="http://schemas.microsoft.com/office/powerpoint/2010/main" val="3349497642"/>
+      </p:ext>
+    </p:extLst>
+  </p:cSld>
+  <p:clrMapOvr>
+    <a:masterClrMapping/>
+  </p:clrMapOvr>
+</p:notes>
+</file>
+
+<file path=ppt/notesSlides/notesSlide8.xml><?xml version="1.0" encoding="utf-8"?>
+<p:notes xmlns:a="http://schemas.openxmlformats.org/drawingml/2006/main" xmlns:r="http://schemas.openxmlformats.org/officeDocument/2006/relationships" xmlns:p="http://schemas.openxmlformats.org/presentationml/2006/main">
+  <p:cSld>
+    <p:spTree>
+      <p:nvGrpSpPr>
+        <p:cNvPr id="1" name=""/>
+        <p:cNvGrpSpPr/>
+        <p:nvPr/>
+      </p:nvGrpSpPr>
+      <p:grpSpPr>
+        <a:xfrm>
+          <a:off x="0" y="0"/>
+          <a:ext cx="0" cy="0"/>
+          <a:chOff x="0" y="0"/>
+          <a:chExt cx="0" cy="0"/>
+        </a:xfrm>
+      </p:grpSpPr>
+      <p:sp>
+        <p:nvSpPr>
+          <p:cNvPr id="2" name="Slide Image Placeholder 1"/>
+          <p:cNvSpPr>
+            <a:spLocks noGrp="1" noRot="1" noChangeAspect="1"/>
+          </p:cNvSpPr>
+          <p:nvPr>
+            <p:ph type="sldImg"/>
+          </p:nvPr>
+        </p:nvSpPr>
+        <p:spPr/>
+      </p:sp>
+      <p:sp>
+        <p:nvSpPr>
+          <p:cNvPr id="3" name="Notes Placeholder 2"/>
+          <p:cNvSpPr>
+            <a:spLocks noGrp="1"/>
+          </p:cNvSpPr>
+          <p:nvPr>
+            <p:ph type="body" idx="1"/>
+          </p:nvPr>
+        </p:nvSpPr>
+        <p:spPr/>
+        <p:txBody>
+          <a:bodyPr/>
+          <a:lstStyle/>
+          <a:p>
+            <a:r>
+              <a:rPr lang="en-GB" dirty="0"/>
+              <a:t>I wanted to create an easy to use dashboard where you can easily see the sources being used in the system, and add and remove sources, and turn them on and off. You can also see which sources are stale, which was mentioned in my previous meeting as something useful.</a:t>
+            </a:r>
+          </a:p>
+        </p:txBody>
+      </p:sp>
+      <p:sp>
+        <p:nvSpPr>
+          <p:cNvPr id="4" name="Slide Number Placeholder 3"/>
+          <p:cNvSpPr>
+            <a:spLocks noGrp="1"/>
+          </p:cNvSpPr>
+          <p:nvPr>
+            <p:ph type="sldNum" sz="quarter" idx="5"/>
+          </p:nvPr>
+        </p:nvSpPr>
+        <p:spPr/>
+        <p:txBody>
+          <a:bodyPr/>
+          <a:lstStyle/>
+          <a:p>
+            <a:fld id="{0FCFED6C-7B9F-4E48-89DA-B7F4954BD38C}" type="slidenum">
+              <a:rPr lang="en-GB" smtClean="0"/>
+              <a:t>10</a:t>
+            </a:fld>
+            <a:endParaRPr lang="en-GB"/>
+          </a:p>
+        </p:txBody>
+      </p:sp>
+    </p:spTree>
+    <p:extLst>
+      <p:ext uri="{BB962C8B-B14F-4D97-AF65-F5344CB8AC3E}">
+        <p14:creationId xmlns:p14="http://schemas.microsoft.com/office/powerpoint/2010/main" val="707425206"/>
+      </p:ext>
+    </p:extLst>
+  </p:cSld>
+  <p:clrMapOvr>
+    <a:masterClrMapping/>
+  </p:clrMapOvr>
+</p:notes>
+</file>
+
+<file path=ppt/notesSlides/notesSlide9.xml><?xml version="1.0" encoding="utf-8"?>
+<p:notes xmlns:a="http://schemas.openxmlformats.org/drawingml/2006/main" xmlns:r="http://schemas.openxmlformats.org/officeDocument/2006/relationships" xmlns:p="http://schemas.openxmlformats.org/presentationml/2006/main">
+  <p:cSld>
+    <p:spTree>
+      <p:nvGrpSpPr>
+        <p:cNvPr id="1" name=""/>
+        <p:cNvGrpSpPr/>
+        <p:nvPr/>
+      </p:nvGrpSpPr>
+      <p:grpSpPr>
+        <a:xfrm>
+          <a:off x="0" y="0"/>
+          <a:ext cx="0" cy="0"/>
+          <a:chOff x="0" y="0"/>
+          <a:chExt cx="0" cy="0"/>
+        </a:xfrm>
+      </p:grpSpPr>
+      <p:sp>
+        <p:nvSpPr>
+          <p:cNvPr id="2" name="Slide Image Placeholder 1"/>
+          <p:cNvSpPr>
+            <a:spLocks noGrp="1" noRot="1" noChangeAspect="1"/>
+          </p:cNvSpPr>
+          <p:nvPr>
+            <p:ph type="sldImg"/>
+          </p:nvPr>
+        </p:nvSpPr>
+        <p:spPr/>
+      </p:sp>
+      <p:sp>
+        <p:nvSpPr>
+          <p:cNvPr id="3" name="Notes Placeholder 2"/>
+          <p:cNvSpPr>
+            <a:spLocks noGrp="1"/>
+          </p:cNvSpPr>
+          <p:nvPr>
+            <p:ph type="body" idx="1"/>
+          </p:nvPr>
+        </p:nvSpPr>
+        <p:spPr/>
+        <p:txBody>
+          <a:bodyPr/>
+          <a:lstStyle/>
+          <a:p>
+            <a:r>
+              <a:rPr lang="en-GB" dirty="0"/>
+              <a:t>I wanted to create an easy to use dashboard where you can easily see the sources being used in the system, and add and remove sources, and turn them on and off. You can also see which sources are stale, which was mentioned in my previous meeting as something useful.</a:t>
+            </a:r>
+          </a:p>
+        </p:txBody>
+      </p:sp>
+      <p:sp>
+        <p:nvSpPr>
+          <p:cNvPr id="4" name="Slide Number Placeholder 3"/>
+          <p:cNvSpPr>
+            <a:spLocks noGrp="1"/>
+          </p:cNvSpPr>
+          <p:nvPr>
+            <p:ph type="sldNum" sz="quarter" idx="5"/>
+          </p:nvPr>
+        </p:nvSpPr>
+        <p:spPr/>
+        <p:txBody>
+          <a:bodyPr/>
+          <a:lstStyle/>
+          <a:p>
+            <a:fld id="{0FCFED6C-7B9F-4E48-89DA-B7F4954BD38C}" type="slidenum">
+              <a:rPr lang="en-GB" smtClean="0"/>
+              <a:t>11</a:t>
+            </a:fld>
+            <a:endParaRPr lang="en-GB"/>
+          </a:p>
+        </p:txBody>
+      </p:sp>
+    </p:spTree>
+    <p:extLst>
+      <p:ext uri="{BB962C8B-B14F-4D97-AF65-F5344CB8AC3E}">
+        <p14:creationId xmlns:p14="http://schemas.microsoft.com/office/powerpoint/2010/main" val="720439971"/>
       </p:ext>
     </p:extLst>
   </p:cSld>
@@ -4094,17 +4704,6 @@
           <a:lstStyle/>
           <a:p>
             <a:r>
-              <a:rPr lang="en-GB" b="1">
-                <a:solidFill>
-                  <a:srgbClr val="0C2E8A"/>
-                </a:solidFill>
-                <a:latin typeface="Open sans" panose="020B0604020202020204" pitchFamily="2" charset="0"/>
-                <a:ea typeface="Open sans" panose="020B0604020202020204" pitchFamily="2" charset="0"/>
-                <a:cs typeface="Open sans" panose="020B0604020202020204" pitchFamily="2" charset="0"/>
-              </a:rPr>
-              <a:t>News Scraper </a:t>
-            </a:r>
-            <a:r>
               <a:rPr lang="en-GB" b="1" dirty="0">
                 <a:solidFill>
                   <a:srgbClr val="0C2E8A"/>
@@ -4113,7 +4712,7 @@
                 <a:ea typeface="Open sans" panose="020B0604020202020204" pitchFamily="2" charset="0"/>
                 <a:cs typeface="Open sans" panose="020B0604020202020204" pitchFamily="2" charset="0"/>
               </a:rPr>
-              <a:t>Dashboard Usability Testing</a:t>
+              <a:t>News Scraper Dashboard Usability Testing</a:t>
             </a:r>
           </a:p>
         </p:txBody>
@@ -4157,6 +4756,923 @@
     <p:extLst>
       <p:ext uri="{BB962C8B-B14F-4D97-AF65-F5344CB8AC3E}">
         <p14:creationId xmlns:p14="http://schemas.microsoft.com/office/powerpoint/2010/main" val="36653618"/>
+      </p:ext>
+    </p:extLst>
+  </p:cSld>
+  <p:clrMapOvr>
+    <a:masterClrMapping/>
+  </p:clrMapOvr>
+</p:sld>
+</file>
+
+<file path=ppt/slides/slide10.xml><?xml version="1.0" encoding="utf-8"?>
+<p:sld xmlns:a="http://schemas.openxmlformats.org/drawingml/2006/main" xmlns:r="http://schemas.openxmlformats.org/officeDocument/2006/relationships" xmlns:p="http://schemas.openxmlformats.org/presentationml/2006/main">
+  <p:cSld>
+    <p:spTree>
+      <p:nvGrpSpPr>
+        <p:cNvPr id="1" name=""/>
+        <p:cNvGrpSpPr/>
+        <p:nvPr/>
+      </p:nvGrpSpPr>
+      <p:grpSpPr>
+        <a:xfrm>
+          <a:off x="0" y="0"/>
+          <a:ext cx="0" cy="0"/>
+          <a:chOff x="0" y="0"/>
+          <a:chExt cx="0" cy="0"/>
+        </a:xfrm>
+      </p:grpSpPr>
+      <p:sp>
+        <p:nvSpPr>
+          <p:cNvPr id="3" name="Content Placeholder 2">
+            <a:extLst>
+              <a:ext uri="{FF2B5EF4-FFF2-40B4-BE49-F238E27FC236}">
+                <a16:creationId xmlns:a16="http://schemas.microsoft.com/office/drawing/2014/main" id="{CDB0A1B1-88E2-76B5-AA82-DBB97847A4C1}"/>
+              </a:ext>
+            </a:extLst>
+          </p:cNvPr>
+          <p:cNvSpPr>
+            <a:spLocks noGrp="1"/>
+          </p:cNvSpPr>
+          <p:nvPr>
+            <p:ph idx="1"/>
+          </p:nvPr>
+        </p:nvSpPr>
+        <p:spPr>
+          <a:xfrm>
+            <a:off x="838200" y="1325563"/>
+            <a:ext cx="10515600" cy="667830"/>
+          </a:xfrm>
+        </p:spPr>
+        <p:txBody>
+          <a:bodyPr>
+            <a:normAutofit/>
+          </a:bodyPr>
+          <a:lstStyle/>
+          <a:p>
+            <a:r>
+              <a:rPr lang="en-GB" sz="2000" dirty="0">
+                <a:latin typeface="Open sans" panose="020B0606030504020204" pitchFamily="2" charset="0"/>
+                <a:ea typeface="Open sans" panose="020B0606030504020204" pitchFamily="2" charset="0"/>
+                <a:cs typeface="Open sans" panose="020B0606030504020204" pitchFamily="2" charset="0"/>
+              </a:rPr>
+              <a:t>Clicking the “manage sources” button will take you to the manage sources</a:t>
+            </a:r>
+            <a:br>
+              <a:rPr lang="en-GB" sz="2000" dirty="0">
+                <a:latin typeface="Open sans" panose="020B0606030504020204" pitchFamily="2" charset="0"/>
+                <a:ea typeface="Open sans" panose="020B0606030504020204" pitchFamily="2" charset="0"/>
+                <a:cs typeface="Open sans" panose="020B0606030504020204" pitchFamily="2" charset="0"/>
+              </a:rPr>
+            </a:br>
+            <a:r>
+              <a:rPr lang="en-GB" sz="2000" dirty="0">
+                <a:latin typeface="Open sans" panose="020B0606030504020204" pitchFamily="2" charset="0"/>
+                <a:ea typeface="Open sans" panose="020B0606030504020204" pitchFamily="2" charset="0"/>
+                <a:cs typeface="Open sans" panose="020B0606030504020204" pitchFamily="2" charset="0"/>
+              </a:rPr>
+              <a:t>page. You can return to the dashboard with the “back to dashboard” button</a:t>
+            </a:r>
+          </a:p>
+        </p:txBody>
+      </p:sp>
+      <p:sp>
+        <p:nvSpPr>
+          <p:cNvPr id="4" name="Rectangle 3">
+            <a:extLst>
+              <a:ext uri="{FF2B5EF4-FFF2-40B4-BE49-F238E27FC236}">
+                <a16:creationId xmlns:a16="http://schemas.microsoft.com/office/drawing/2014/main" id="{A7D254BB-7612-3CB7-7875-1774E7D04160}"/>
+              </a:ext>
+            </a:extLst>
+          </p:cNvPr>
+          <p:cNvSpPr/>
+          <p:nvPr/>
+        </p:nvSpPr>
+        <p:spPr>
+          <a:xfrm>
+            <a:off x="0" y="0"/>
+            <a:ext cx="12192000" cy="1138687"/>
+          </a:xfrm>
+          <a:prstGeom prst="rect">
+            <a:avLst/>
+          </a:prstGeom>
+          <a:solidFill>
+            <a:srgbClr val="0C2E8A"/>
+          </a:solidFill>
+        </p:spPr>
+        <p:style>
+          <a:lnRef idx="2">
+            <a:schemeClr val="accent1">
+              <a:shade val="50000"/>
+            </a:schemeClr>
+          </a:lnRef>
+          <a:fillRef idx="1">
+            <a:schemeClr val="accent1"/>
+          </a:fillRef>
+          <a:effectRef idx="0">
+            <a:schemeClr val="accent1"/>
+          </a:effectRef>
+          <a:fontRef idx="minor">
+            <a:schemeClr val="lt1"/>
+          </a:fontRef>
+        </p:style>
+        <p:txBody>
+          <a:bodyPr rtlCol="0" anchor="ctr"/>
+          <a:lstStyle/>
+          <a:p>
+            <a:pPr algn="ctr"/>
+            <a:endParaRPr lang="en-GB"/>
+          </a:p>
+        </p:txBody>
+      </p:sp>
+      <p:sp>
+        <p:nvSpPr>
+          <p:cNvPr id="2" name="Title 1">
+            <a:extLst>
+              <a:ext uri="{FF2B5EF4-FFF2-40B4-BE49-F238E27FC236}">
+                <a16:creationId xmlns:a16="http://schemas.microsoft.com/office/drawing/2014/main" id="{1D40E371-0CA0-37E5-0E1F-65FF7634F80C}"/>
+              </a:ext>
+            </a:extLst>
+          </p:cNvPr>
+          <p:cNvSpPr>
+            <a:spLocks noGrp="1"/>
+          </p:cNvSpPr>
+          <p:nvPr>
+            <p:ph type="title"/>
+          </p:nvPr>
+        </p:nvSpPr>
+        <p:spPr>
+          <a:xfrm>
+            <a:off x="838200" y="-93439"/>
+            <a:ext cx="10515600" cy="1325563"/>
+          </a:xfrm>
+        </p:spPr>
+        <p:txBody>
+          <a:bodyPr/>
+          <a:lstStyle/>
+          <a:p>
+            <a:r>
+              <a:rPr lang="en-GB" dirty="0">
+                <a:solidFill>
+                  <a:schemeClr val="bg1"/>
+                </a:solidFill>
+                <a:latin typeface="Open sans" panose="020B0606030504020204" pitchFamily="2" charset="0"/>
+                <a:ea typeface="Open sans" panose="020B0606030504020204" pitchFamily="2" charset="0"/>
+                <a:cs typeface="Open sans" panose="020B0606030504020204" pitchFamily="2" charset="0"/>
+              </a:rPr>
+              <a:t>Managing sources</a:t>
+            </a:r>
+          </a:p>
+        </p:txBody>
+      </p:sp>
+      <p:pic>
+        <p:nvPicPr>
+          <p:cNvPr id="7" name="Picture 6">
+            <a:extLst>
+              <a:ext uri="{FF2B5EF4-FFF2-40B4-BE49-F238E27FC236}">
+                <a16:creationId xmlns:a16="http://schemas.microsoft.com/office/drawing/2014/main" id="{65082B29-8DDF-1C14-2B47-A86EF31B0993}"/>
+              </a:ext>
+            </a:extLst>
+          </p:cNvPr>
+          <p:cNvPicPr>
+            <a:picLocks noChangeAspect="1"/>
+          </p:cNvPicPr>
+          <p:nvPr/>
+        </p:nvPicPr>
+        <p:blipFill>
+          <a:blip r:embed="rId3"/>
+          <a:stretch>
+            <a:fillRect/>
+          </a:stretch>
+        </p:blipFill>
+        <p:spPr>
+          <a:xfrm>
+            <a:off x="1090983" y="2868058"/>
+            <a:ext cx="4633362" cy="2530059"/>
+          </a:xfrm>
+          <a:prstGeom prst="rect">
+            <a:avLst/>
+          </a:prstGeom>
+        </p:spPr>
+      </p:pic>
+      <p:pic>
+        <p:nvPicPr>
+          <p:cNvPr id="9" name="Picture 8">
+            <a:extLst>
+              <a:ext uri="{FF2B5EF4-FFF2-40B4-BE49-F238E27FC236}">
+                <a16:creationId xmlns:a16="http://schemas.microsoft.com/office/drawing/2014/main" id="{44BDA9EE-9B9F-ACA3-9D16-86357D60E599}"/>
+              </a:ext>
+            </a:extLst>
+          </p:cNvPr>
+          <p:cNvPicPr>
+            <a:picLocks noChangeAspect="1"/>
+          </p:cNvPicPr>
+          <p:nvPr/>
+        </p:nvPicPr>
+        <p:blipFill>
+          <a:blip r:embed="rId4"/>
+          <a:stretch>
+            <a:fillRect/>
+          </a:stretch>
+        </p:blipFill>
+        <p:spPr>
+          <a:xfrm>
+            <a:off x="6719821" y="2500608"/>
+            <a:ext cx="3558035" cy="3819049"/>
+          </a:xfrm>
+          <a:prstGeom prst="rect">
+            <a:avLst/>
+          </a:prstGeom>
+        </p:spPr>
+      </p:pic>
+    </p:spTree>
+    <p:extLst>
+      <p:ext uri="{BB962C8B-B14F-4D97-AF65-F5344CB8AC3E}">
+        <p14:creationId xmlns:p14="http://schemas.microsoft.com/office/powerpoint/2010/main" val="1802143511"/>
+      </p:ext>
+    </p:extLst>
+  </p:cSld>
+  <p:clrMapOvr>
+    <a:masterClrMapping/>
+  </p:clrMapOvr>
+</p:sld>
+</file>
+
+<file path=ppt/slides/slide11.xml><?xml version="1.0" encoding="utf-8"?>
+<p:sld xmlns:a="http://schemas.openxmlformats.org/drawingml/2006/main" xmlns:r="http://schemas.openxmlformats.org/officeDocument/2006/relationships" xmlns:p="http://schemas.openxmlformats.org/presentationml/2006/main">
+  <p:cSld>
+    <p:spTree>
+      <p:nvGrpSpPr>
+        <p:cNvPr id="1" name=""/>
+        <p:cNvGrpSpPr/>
+        <p:nvPr/>
+      </p:nvGrpSpPr>
+      <p:grpSpPr>
+        <a:xfrm>
+          <a:off x="0" y="0"/>
+          <a:ext cx="0" cy="0"/>
+          <a:chOff x="0" y="0"/>
+          <a:chExt cx="0" cy="0"/>
+        </a:xfrm>
+      </p:grpSpPr>
+      <p:sp>
+        <p:nvSpPr>
+          <p:cNvPr id="3" name="Content Placeholder 2">
+            <a:extLst>
+              <a:ext uri="{FF2B5EF4-FFF2-40B4-BE49-F238E27FC236}">
+                <a16:creationId xmlns:a16="http://schemas.microsoft.com/office/drawing/2014/main" id="{CDB0A1B1-88E2-76B5-AA82-DBB97847A4C1}"/>
+              </a:ext>
+            </a:extLst>
+          </p:cNvPr>
+          <p:cNvSpPr>
+            <a:spLocks noGrp="1"/>
+          </p:cNvSpPr>
+          <p:nvPr>
+            <p:ph idx="1"/>
+          </p:nvPr>
+        </p:nvSpPr>
+        <p:spPr>
+          <a:xfrm>
+            <a:off x="838200" y="1325563"/>
+            <a:ext cx="10515600" cy="667830"/>
+          </a:xfrm>
+        </p:spPr>
+        <p:txBody>
+          <a:bodyPr>
+            <a:normAutofit fontScale="85000" lnSpcReduction="10000"/>
+          </a:bodyPr>
+          <a:lstStyle/>
+          <a:p>
+            <a:r>
+              <a:rPr lang="en-GB" sz="2000" dirty="0">
+                <a:latin typeface="Open sans" panose="020B0606030504020204" pitchFamily="2" charset="0"/>
+                <a:ea typeface="Open sans" panose="020B0606030504020204" pitchFamily="2" charset="0"/>
+                <a:cs typeface="Open sans" panose="020B0606030504020204" pitchFamily="2" charset="0"/>
+              </a:rPr>
+              <a:t>Each active source has a disable button next to it, which will add it to the disabled sources. Each disabled source has an enable button, which will add it to the enabled (or stale) sources list</a:t>
+            </a:r>
+          </a:p>
+        </p:txBody>
+      </p:sp>
+      <p:sp>
+        <p:nvSpPr>
+          <p:cNvPr id="4" name="Rectangle 3">
+            <a:extLst>
+              <a:ext uri="{FF2B5EF4-FFF2-40B4-BE49-F238E27FC236}">
+                <a16:creationId xmlns:a16="http://schemas.microsoft.com/office/drawing/2014/main" id="{A7D254BB-7612-3CB7-7875-1774E7D04160}"/>
+              </a:ext>
+            </a:extLst>
+          </p:cNvPr>
+          <p:cNvSpPr/>
+          <p:nvPr/>
+        </p:nvSpPr>
+        <p:spPr>
+          <a:xfrm>
+            <a:off x="0" y="0"/>
+            <a:ext cx="12192000" cy="1138687"/>
+          </a:xfrm>
+          <a:prstGeom prst="rect">
+            <a:avLst/>
+          </a:prstGeom>
+          <a:solidFill>
+            <a:srgbClr val="0C2E8A"/>
+          </a:solidFill>
+        </p:spPr>
+        <p:style>
+          <a:lnRef idx="2">
+            <a:schemeClr val="accent1">
+              <a:shade val="50000"/>
+            </a:schemeClr>
+          </a:lnRef>
+          <a:fillRef idx="1">
+            <a:schemeClr val="accent1"/>
+          </a:fillRef>
+          <a:effectRef idx="0">
+            <a:schemeClr val="accent1"/>
+          </a:effectRef>
+          <a:fontRef idx="minor">
+            <a:schemeClr val="lt1"/>
+          </a:fontRef>
+        </p:style>
+        <p:txBody>
+          <a:bodyPr rtlCol="0" anchor="ctr"/>
+          <a:lstStyle/>
+          <a:p>
+            <a:pPr algn="ctr"/>
+            <a:endParaRPr lang="en-GB"/>
+          </a:p>
+        </p:txBody>
+      </p:sp>
+      <p:sp>
+        <p:nvSpPr>
+          <p:cNvPr id="2" name="Title 1">
+            <a:extLst>
+              <a:ext uri="{FF2B5EF4-FFF2-40B4-BE49-F238E27FC236}">
+                <a16:creationId xmlns:a16="http://schemas.microsoft.com/office/drawing/2014/main" id="{1D40E371-0CA0-37E5-0E1F-65FF7634F80C}"/>
+              </a:ext>
+            </a:extLst>
+          </p:cNvPr>
+          <p:cNvSpPr>
+            <a:spLocks noGrp="1"/>
+          </p:cNvSpPr>
+          <p:nvPr>
+            <p:ph type="title"/>
+          </p:nvPr>
+        </p:nvSpPr>
+        <p:spPr>
+          <a:xfrm>
+            <a:off x="838200" y="-93439"/>
+            <a:ext cx="10515600" cy="1325563"/>
+          </a:xfrm>
+        </p:spPr>
+        <p:txBody>
+          <a:bodyPr/>
+          <a:lstStyle/>
+          <a:p>
+            <a:r>
+              <a:rPr lang="en-GB" dirty="0">
+                <a:solidFill>
+                  <a:schemeClr val="bg1"/>
+                </a:solidFill>
+                <a:latin typeface="Open sans" panose="020B0606030504020204" pitchFamily="2" charset="0"/>
+                <a:ea typeface="Open sans" panose="020B0606030504020204" pitchFamily="2" charset="0"/>
+                <a:cs typeface="Open sans" panose="020B0606030504020204" pitchFamily="2" charset="0"/>
+              </a:rPr>
+              <a:t>Enabling/disabling sources</a:t>
+            </a:r>
+          </a:p>
+        </p:txBody>
+      </p:sp>
+      <p:pic>
+        <p:nvPicPr>
+          <p:cNvPr id="6" name="Picture 5">
+            <a:extLst>
+              <a:ext uri="{FF2B5EF4-FFF2-40B4-BE49-F238E27FC236}">
+                <a16:creationId xmlns:a16="http://schemas.microsoft.com/office/drawing/2014/main" id="{AD091692-EDEC-6A24-D128-543CB55593C2}"/>
+              </a:ext>
+            </a:extLst>
+          </p:cNvPr>
+          <p:cNvPicPr>
+            <a:picLocks noChangeAspect="1"/>
+          </p:cNvPicPr>
+          <p:nvPr/>
+        </p:nvPicPr>
+        <p:blipFill>
+          <a:blip r:embed="rId3"/>
+          <a:stretch>
+            <a:fillRect/>
+          </a:stretch>
+        </p:blipFill>
+        <p:spPr>
+          <a:xfrm>
+            <a:off x="838200" y="2257075"/>
+            <a:ext cx="4050932" cy="3476213"/>
+          </a:xfrm>
+          <a:prstGeom prst="rect">
+            <a:avLst/>
+          </a:prstGeom>
+        </p:spPr>
+      </p:pic>
+      <p:pic>
+        <p:nvPicPr>
+          <p:cNvPr id="10" name="Picture 9">
+            <a:extLst>
+              <a:ext uri="{FF2B5EF4-FFF2-40B4-BE49-F238E27FC236}">
+                <a16:creationId xmlns:a16="http://schemas.microsoft.com/office/drawing/2014/main" id="{7514BF68-E29D-F6AB-74C2-44097AC65D48}"/>
+              </a:ext>
+            </a:extLst>
+          </p:cNvPr>
+          <p:cNvPicPr>
+            <a:picLocks noChangeAspect="1"/>
+          </p:cNvPicPr>
+          <p:nvPr/>
+        </p:nvPicPr>
+        <p:blipFill>
+          <a:blip r:embed="rId4"/>
+          <a:stretch>
+            <a:fillRect/>
+          </a:stretch>
+        </p:blipFill>
+        <p:spPr>
+          <a:xfrm>
+            <a:off x="5300612" y="2129590"/>
+            <a:ext cx="4324437" cy="3603698"/>
+          </a:xfrm>
+          <a:prstGeom prst="rect">
+            <a:avLst/>
+          </a:prstGeom>
+        </p:spPr>
+      </p:pic>
+    </p:spTree>
+    <p:extLst>
+      <p:ext uri="{BB962C8B-B14F-4D97-AF65-F5344CB8AC3E}">
+        <p14:creationId xmlns:p14="http://schemas.microsoft.com/office/powerpoint/2010/main" val="844147660"/>
+      </p:ext>
+    </p:extLst>
+  </p:cSld>
+  <p:clrMapOvr>
+    <a:masterClrMapping/>
+  </p:clrMapOvr>
+</p:sld>
+</file>
+
+<file path=ppt/slides/slide12.xml><?xml version="1.0" encoding="utf-8"?>
+<p:sld xmlns:a="http://schemas.openxmlformats.org/drawingml/2006/main" xmlns:r="http://schemas.openxmlformats.org/officeDocument/2006/relationships" xmlns:p="http://schemas.openxmlformats.org/presentationml/2006/main">
+  <p:cSld>
+    <p:spTree>
+      <p:nvGrpSpPr>
+        <p:cNvPr id="1" name=""/>
+        <p:cNvGrpSpPr/>
+        <p:nvPr/>
+      </p:nvGrpSpPr>
+      <p:grpSpPr>
+        <a:xfrm>
+          <a:off x="0" y="0"/>
+          <a:ext cx="0" cy="0"/>
+          <a:chOff x="0" y="0"/>
+          <a:chExt cx="0" cy="0"/>
+        </a:xfrm>
+      </p:grpSpPr>
+      <p:sp>
+        <p:nvSpPr>
+          <p:cNvPr id="3" name="Content Placeholder 2">
+            <a:extLst>
+              <a:ext uri="{FF2B5EF4-FFF2-40B4-BE49-F238E27FC236}">
+                <a16:creationId xmlns:a16="http://schemas.microsoft.com/office/drawing/2014/main" id="{CDB0A1B1-88E2-76B5-AA82-DBB97847A4C1}"/>
+              </a:ext>
+            </a:extLst>
+          </p:cNvPr>
+          <p:cNvSpPr>
+            <a:spLocks noGrp="1"/>
+          </p:cNvSpPr>
+          <p:nvPr>
+            <p:ph idx="1"/>
+          </p:nvPr>
+        </p:nvSpPr>
+        <p:spPr>
+          <a:xfrm>
+            <a:off x="838200" y="1325563"/>
+            <a:ext cx="10515600" cy="667830"/>
+          </a:xfrm>
+        </p:spPr>
+        <p:txBody>
+          <a:bodyPr>
+            <a:normAutofit/>
+          </a:bodyPr>
+          <a:lstStyle/>
+          <a:p>
+            <a:r>
+              <a:rPr lang="en-GB" sz="2000" dirty="0">
+                <a:latin typeface="Open sans" panose="020B0606030504020204" pitchFamily="2" charset="0"/>
+                <a:ea typeface="Open sans" panose="020B0606030504020204" pitchFamily="2" charset="0"/>
+                <a:cs typeface="Open sans" panose="020B0606030504020204" pitchFamily="2" charset="0"/>
+              </a:rPr>
+              <a:t>Each source has a delete button next to it, which will remove the source</a:t>
+            </a:r>
+          </a:p>
+        </p:txBody>
+      </p:sp>
+      <p:sp>
+        <p:nvSpPr>
+          <p:cNvPr id="4" name="Rectangle 3">
+            <a:extLst>
+              <a:ext uri="{FF2B5EF4-FFF2-40B4-BE49-F238E27FC236}">
+                <a16:creationId xmlns:a16="http://schemas.microsoft.com/office/drawing/2014/main" id="{A7D254BB-7612-3CB7-7875-1774E7D04160}"/>
+              </a:ext>
+            </a:extLst>
+          </p:cNvPr>
+          <p:cNvSpPr/>
+          <p:nvPr/>
+        </p:nvSpPr>
+        <p:spPr>
+          <a:xfrm>
+            <a:off x="0" y="0"/>
+            <a:ext cx="12192000" cy="1138687"/>
+          </a:xfrm>
+          <a:prstGeom prst="rect">
+            <a:avLst/>
+          </a:prstGeom>
+          <a:solidFill>
+            <a:srgbClr val="0C2E8A"/>
+          </a:solidFill>
+        </p:spPr>
+        <p:style>
+          <a:lnRef idx="2">
+            <a:schemeClr val="accent1">
+              <a:shade val="50000"/>
+            </a:schemeClr>
+          </a:lnRef>
+          <a:fillRef idx="1">
+            <a:schemeClr val="accent1"/>
+          </a:fillRef>
+          <a:effectRef idx="0">
+            <a:schemeClr val="accent1"/>
+          </a:effectRef>
+          <a:fontRef idx="minor">
+            <a:schemeClr val="lt1"/>
+          </a:fontRef>
+        </p:style>
+        <p:txBody>
+          <a:bodyPr rtlCol="0" anchor="ctr"/>
+          <a:lstStyle/>
+          <a:p>
+            <a:pPr algn="ctr"/>
+            <a:endParaRPr lang="en-GB"/>
+          </a:p>
+        </p:txBody>
+      </p:sp>
+      <p:sp>
+        <p:nvSpPr>
+          <p:cNvPr id="2" name="Title 1">
+            <a:extLst>
+              <a:ext uri="{FF2B5EF4-FFF2-40B4-BE49-F238E27FC236}">
+                <a16:creationId xmlns:a16="http://schemas.microsoft.com/office/drawing/2014/main" id="{1D40E371-0CA0-37E5-0E1F-65FF7634F80C}"/>
+              </a:ext>
+            </a:extLst>
+          </p:cNvPr>
+          <p:cNvSpPr>
+            <a:spLocks noGrp="1"/>
+          </p:cNvSpPr>
+          <p:nvPr>
+            <p:ph type="title"/>
+          </p:nvPr>
+        </p:nvSpPr>
+        <p:spPr>
+          <a:xfrm>
+            <a:off x="838200" y="-93439"/>
+            <a:ext cx="10515600" cy="1325563"/>
+          </a:xfrm>
+        </p:spPr>
+        <p:txBody>
+          <a:bodyPr/>
+          <a:lstStyle/>
+          <a:p>
+            <a:r>
+              <a:rPr lang="en-GB" dirty="0">
+                <a:solidFill>
+                  <a:schemeClr val="bg1"/>
+                </a:solidFill>
+                <a:latin typeface="Open sans" panose="020B0606030504020204" pitchFamily="2" charset="0"/>
+                <a:ea typeface="Open sans" panose="020B0606030504020204" pitchFamily="2" charset="0"/>
+                <a:cs typeface="Open sans" panose="020B0606030504020204" pitchFamily="2" charset="0"/>
+              </a:rPr>
+              <a:t>Deleting sources</a:t>
+            </a:r>
+          </a:p>
+        </p:txBody>
+      </p:sp>
+      <p:pic>
+        <p:nvPicPr>
+          <p:cNvPr id="7" name="Picture 6">
+            <a:extLst>
+              <a:ext uri="{FF2B5EF4-FFF2-40B4-BE49-F238E27FC236}">
+                <a16:creationId xmlns:a16="http://schemas.microsoft.com/office/drawing/2014/main" id="{939DC832-0704-CBAB-E45E-FC9E4A13D9B6}"/>
+              </a:ext>
+            </a:extLst>
+          </p:cNvPr>
+          <p:cNvPicPr>
+            <a:picLocks noChangeAspect="1"/>
+          </p:cNvPicPr>
+          <p:nvPr/>
+        </p:nvPicPr>
+        <p:blipFill>
+          <a:blip r:embed="rId3"/>
+          <a:stretch>
+            <a:fillRect/>
+          </a:stretch>
+        </p:blipFill>
+        <p:spPr>
+          <a:xfrm>
+            <a:off x="1282208" y="1993393"/>
+            <a:ext cx="4618760" cy="3971749"/>
+          </a:xfrm>
+          <a:prstGeom prst="rect">
+            <a:avLst/>
+          </a:prstGeom>
+        </p:spPr>
+      </p:pic>
+      <p:pic>
+        <p:nvPicPr>
+          <p:cNvPr id="9" name="Picture 8">
+            <a:extLst>
+              <a:ext uri="{FF2B5EF4-FFF2-40B4-BE49-F238E27FC236}">
+                <a16:creationId xmlns:a16="http://schemas.microsoft.com/office/drawing/2014/main" id="{AB3747E4-1693-BFCF-AE20-52EC3B182026}"/>
+              </a:ext>
+            </a:extLst>
+          </p:cNvPr>
+          <p:cNvPicPr>
+            <a:picLocks noChangeAspect="1"/>
+          </p:cNvPicPr>
+          <p:nvPr/>
+        </p:nvPicPr>
+        <p:blipFill>
+          <a:blip r:embed="rId4"/>
+          <a:stretch>
+            <a:fillRect/>
+          </a:stretch>
+        </p:blipFill>
+        <p:spPr>
+          <a:xfrm>
+            <a:off x="6291034" y="2040739"/>
+            <a:ext cx="4851503" cy="3877055"/>
+          </a:xfrm>
+          <a:prstGeom prst="rect">
+            <a:avLst/>
+          </a:prstGeom>
+        </p:spPr>
+      </p:pic>
+    </p:spTree>
+    <p:extLst>
+      <p:ext uri="{BB962C8B-B14F-4D97-AF65-F5344CB8AC3E}">
+        <p14:creationId xmlns:p14="http://schemas.microsoft.com/office/powerpoint/2010/main" val="3934553911"/>
+      </p:ext>
+    </p:extLst>
+  </p:cSld>
+  <p:clrMapOvr>
+    <a:masterClrMapping/>
+  </p:clrMapOvr>
+</p:sld>
+</file>
+
+<file path=ppt/slides/slide13.xml><?xml version="1.0" encoding="utf-8"?>
+<p:sld xmlns:a="http://schemas.openxmlformats.org/drawingml/2006/main" xmlns:r="http://schemas.openxmlformats.org/officeDocument/2006/relationships" xmlns:p="http://schemas.openxmlformats.org/presentationml/2006/main">
+  <p:cSld>
+    <p:spTree>
+      <p:nvGrpSpPr>
+        <p:cNvPr id="1" name=""/>
+        <p:cNvGrpSpPr/>
+        <p:nvPr/>
+      </p:nvGrpSpPr>
+      <p:grpSpPr>
+        <a:xfrm>
+          <a:off x="0" y="0"/>
+          <a:ext cx="0" cy="0"/>
+          <a:chOff x="0" y="0"/>
+          <a:chExt cx="0" cy="0"/>
+        </a:xfrm>
+      </p:grpSpPr>
+      <p:sp>
+        <p:nvSpPr>
+          <p:cNvPr id="3" name="Content Placeholder 2">
+            <a:extLst>
+              <a:ext uri="{FF2B5EF4-FFF2-40B4-BE49-F238E27FC236}">
+                <a16:creationId xmlns:a16="http://schemas.microsoft.com/office/drawing/2014/main" id="{CDB0A1B1-88E2-76B5-AA82-DBB97847A4C1}"/>
+              </a:ext>
+            </a:extLst>
+          </p:cNvPr>
+          <p:cNvSpPr>
+            <a:spLocks noGrp="1"/>
+          </p:cNvSpPr>
+          <p:nvPr>
+            <p:ph idx="1"/>
+          </p:nvPr>
+        </p:nvSpPr>
+        <p:spPr>
+          <a:xfrm>
+            <a:off x="838200" y="1325563"/>
+            <a:ext cx="10515600" cy="667830"/>
+          </a:xfrm>
+        </p:spPr>
+        <p:txBody>
+          <a:bodyPr>
+            <a:normAutofit/>
+          </a:bodyPr>
+          <a:lstStyle/>
+          <a:p>
+            <a:r>
+              <a:rPr lang="en-GB" sz="2000" dirty="0">
+                <a:latin typeface="Open sans" panose="020B0606030504020204" pitchFamily="2" charset="0"/>
+                <a:ea typeface="Open sans" panose="020B0606030504020204" pitchFamily="2" charset="0"/>
+                <a:cs typeface="Open sans" panose="020B0606030504020204" pitchFamily="2" charset="0"/>
+              </a:rPr>
+              <a:t>There is an add source button, which will create a form for adding a source. Clicking submit with a URL will create the source. Extra information can be added if known</a:t>
+            </a:r>
+          </a:p>
+        </p:txBody>
+      </p:sp>
+      <p:sp>
+        <p:nvSpPr>
+          <p:cNvPr id="4" name="Rectangle 3">
+            <a:extLst>
+              <a:ext uri="{FF2B5EF4-FFF2-40B4-BE49-F238E27FC236}">
+                <a16:creationId xmlns:a16="http://schemas.microsoft.com/office/drawing/2014/main" id="{A7D254BB-7612-3CB7-7875-1774E7D04160}"/>
+              </a:ext>
+            </a:extLst>
+          </p:cNvPr>
+          <p:cNvSpPr/>
+          <p:nvPr/>
+        </p:nvSpPr>
+        <p:spPr>
+          <a:xfrm>
+            <a:off x="0" y="0"/>
+            <a:ext cx="12192000" cy="1138687"/>
+          </a:xfrm>
+          <a:prstGeom prst="rect">
+            <a:avLst/>
+          </a:prstGeom>
+          <a:solidFill>
+            <a:srgbClr val="0C2E8A"/>
+          </a:solidFill>
+        </p:spPr>
+        <p:style>
+          <a:lnRef idx="2">
+            <a:schemeClr val="accent1">
+              <a:shade val="50000"/>
+            </a:schemeClr>
+          </a:lnRef>
+          <a:fillRef idx="1">
+            <a:schemeClr val="accent1"/>
+          </a:fillRef>
+          <a:effectRef idx="0">
+            <a:schemeClr val="accent1"/>
+          </a:effectRef>
+          <a:fontRef idx="minor">
+            <a:schemeClr val="lt1"/>
+          </a:fontRef>
+        </p:style>
+        <p:txBody>
+          <a:bodyPr rtlCol="0" anchor="ctr"/>
+          <a:lstStyle/>
+          <a:p>
+            <a:pPr algn="ctr"/>
+            <a:endParaRPr lang="en-GB"/>
+          </a:p>
+        </p:txBody>
+      </p:sp>
+      <p:sp>
+        <p:nvSpPr>
+          <p:cNvPr id="2" name="Title 1">
+            <a:extLst>
+              <a:ext uri="{FF2B5EF4-FFF2-40B4-BE49-F238E27FC236}">
+                <a16:creationId xmlns:a16="http://schemas.microsoft.com/office/drawing/2014/main" id="{1D40E371-0CA0-37E5-0E1F-65FF7634F80C}"/>
+              </a:ext>
+            </a:extLst>
+          </p:cNvPr>
+          <p:cNvSpPr>
+            <a:spLocks noGrp="1"/>
+          </p:cNvSpPr>
+          <p:nvPr>
+            <p:ph type="title"/>
+          </p:nvPr>
+        </p:nvSpPr>
+        <p:spPr>
+          <a:xfrm>
+            <a:off x="838200" y="-93439"/>
+            <a:ext cx="10515600" cy="1325563"/>
+          </a:xfrm>
+        </p:spPr>
+        <p:txBody>
+          <a:bodyPr/>
+          <a:lstStyle/>
+          <a:p>
+            <a:r>
+              <a:rPr lang="en-GB" dirty="0">
+                <a:solidFill>
+                  <a:schemeClr val="bg1"/>
+                </a:solidFill>
+                <a:latin typeface="Open sans" panose="020B0606030504020204" pitchFamily="2" charset="0"/>
+                <a:ea typeface="Open sans" panose="020B0606030504020204" pitchFamily="2" charset="0"/>
+                <a:cs typeface="Open sans" panose="020B0606030504020204" pitchFamily="2" charset="0"/>
+              </a:rPr>
+              <a:t>Adding sources</a:t>
+            </a:r>
+          </a:p>
+        </p:txBody>
+      </p:sp>
+      <p:pic>
+        <p:nvPicPr>
+          <p:cNvPr id="6" name="Picture 5">
+            <a:extLst>
+              <a:ext uri="{FF2B5EF4-FFF2-40B4-BE49-F238E27FC236}">
+                <a16:creationId xmlns:a16="http://schemas.microsoft.com/office/drawing/2014/main" id="{860EFF87-FC93-276B-D023-21E0DF44A61F}"/>
+              </a:ext>
+            </a:extLst>
+          </p:cNvPr>
+          <p:cNvPicPr>
+            <a:picLocks noChangeAspect="1"/>
+          </p:cNvPicPr>
+          <p:nvPr/>
+        </p:nvPicPr>
+        <p:blipFill>
+          <a:blip r:embed="rId3"/>
+          <a:stretch>
+            <a:fillRect/>
+          </a:stretch>
+        </p:blipFill>
+        <p:spPr>
+          <a:xfrm>
+            <a:off x="838200" y="2086832"/>
+            <a:ext cx="3711262" cy="1516511"/>
+          </a:xfrm>
+          <a:prstGeom prst="rect">
+            <a:avLst/>
+          </a:prstGeom>
+        </p:spPr>
+      </p:pic>
+      <p:pic>
+        <p:nvPicPr>
+          <p:cNvPr id="10" name="Picture 9">
+            <a:extLst>
+              <a:ext uri="{FF2B5EF4-FFF2-40B4-BE49-F238E27FC236}">
+                <a16:creationId xmlns:a16="http://schemas.microsoft.com/office/drawing/2014/main" id="{6929FAA4-59ED-4139-C6B6-551573EB1654}"/>
+              </a:ext>
+            </a:extLst>
+          </p:cNvPr>
+          <p:cNvPicPr>
+            <a:picLocks noChangeAspect="1"/>
+          </p:cNvPicPr>
+          <p:nvPr/>
+        </p:nvPicPr>
+        <p:blipFill>
+          <a:blip r:embed="rId4"/>
+          <a:stretch>
+            <a:fillRect/>
+          </a:stretch>
+        </p:blipFill>
+        <p:spPr>
+          <a:xfrm>
+            <a:off x="1530108" y="3526709"/>
+            <a:ext cx="2500151" cy="3099210"/>
+          </a:xfrm>
+          <a:prstGeom prst="rect">
+            <a:avLst/>
+          </a:prstGeom>
+        </p:spPr>
+      </p:pic>
+      <p:pic>
+        <p:nvPicPr>
+          <p:cNvPr id="12" name="Picture 11">
+            <a:extLst>
+              <a:ext uri="{FF2B5EF4-FFF2-40B4-BE49-F238E27FC236}">
+                <a16:creationId xmlns:a16="http://schemas.microsoft.com/office/drawing/2014/main" id="{5595EA93-0E64-36B7-39D8-1FE0B6388BE2}"/>
+              </a:ext>
+            </a:extLst>
+          </p:cNvPr>
+          <p:cNvPicPr>
+            <a:picLocks noChangeAspect="1"/>
+          </p:cNvPicPr>
+          <p:nvPr/>
+        </p:nvPicPr>
+        <p:blipFill>
+          <a:blip r:embed="rId5"/>
+          <a:stretch>
+            <a:fillRect/>
+          </a:stretch>
+        </p:blipFill>
+        <p:spPr>
+          <a:xfrm>
+            <a:off x="4472708" y="4017255"/>
+            <a:ext cx="5349704" cy="1097375"/>
+          </a:xfrm>
+          <a:prstGeom prst="rect">
+            <a:avLst/>
+          </a:prstGeom>
+        </p:spPr>
+      </p:pic>
+    </p:spTree>
+    <p:extLst>
+      <p:ext uri="{BB962C8B-B14F-4D97-AF65-F5344CB8AC3E}">
+        <p14:creationId xmlns:p14="http://schemas.microsoft.com/office/powerpoint/2010/main" val="1406223307"/>
       </p:ext>
     </p:extLst>
   </p:cSld>
@@ -4201,8 +5717,8 @@
         </p:nvSpPr>
         <p:spPr>
           <a:xfrm>
-            <a:off x="838200" y="1627217"/>
-            <a:ext cx="10515600" cy="4626933"/>
+            <a:off x="838200" y="1627218"/>
+            <a:ext cx="10515600" cy="4351338"/>
           </a:xfrm>
         </p:spPr>
         <p:txBody>
@@ -4215,7 +5731,7 @@
                 <a:ea typeface="Open sans" panose="020B0606030504020204" pitchFamily="2" charset="0"/>
                 <a:cs typeface="Open sans" panose="020B0606030504020204" pitchFamily="2" charset="0"/>
               </a:rPr>
-              <a:t>Short questionnaire (5-10 mins)</a:t>
+              <a:t>Moving from RSS feeds to multiple configurable sources</a:t>
             </a:r>
           </a:p>
           <a:p>
@@ -4225,24 +5741,8 @@
                 <a:ea typeface="Open sans" panose="020B0606030504020204" pitchFamily="2" charset="0"/>
                 <a:cs typeface="Open sans" panose="020B0606030504020204" pitchFamily="2" charset="0"/>
               </a:rPr>
-              <a:t>Effectiveness of the interface/visualisation</a:t>
-            </a:r>
-          </a:p>
-          <a:p>
-            <a:r>
-              <a:rPr lang="en-GB" dirty="0">
-                <a:latin typeface="Open sans" panose="020B0606030504020204" pitchFamily="2" charset="0"/>
-                <a:ea typeface="Open sans" panose="020B0606030504020204" pitchFamily="2" charset="0"/>
-                <a:cs typeface="Open sans" panose="020B0606030504020204" pitchFamily="2" charset="0"/>
-                <a:hlinkClick r:id="rId3"/>
-              </a:rPr>
-              <a:t>https://forms.gle/ujZddgkAzXitMjhU6</a:t>
-            </a:r>
-            <a:endParaRPr lang="en-GB" dirty="0">
-              <a:latin typeface="Open sans" panose="020B0606030504020204" pitchFamily="2" charset="0"/>
-              <a:ea typeface="Open sans" panose="020B0606030504020204" pitchFamily="2" charset="0"/>
-              <a:cs typeface="Open sans" panose="020B0606030504020204" pitchFamily="2" charset="0"/>
-            </a:endParaRPr>
+              <a:t>Creating a configurable web scraper with multiple different source types</a:t>
+            </a:r>
           </a:p>
           <a:p>
             <a:r>
@@ -4251,7 +5751,17 @@
                 <a:ea typeface="Open sans" panose="020B0606030504020204" pitchFamily="2" charset="0"/>
                 <a:cs typeface="Open sans" panose="020B0606030504020204" pitchFamily="2" charset="0"/>
               </a:rPr>
-              <a:t>Can try out live (mock) version of interface</a:t>
+              <a:t>Combined with a classifier to categorise news articles</a:t>
+            </a:r>
+          </a:p>
+          <a:p>
+            <a:r>
+              <a:rPr lang="en-GB" dirty="0">
+                <a:latin typeface="Open sans" panose="020B0606030504020204" pitchFamily="2" charset="0"/>
+                <a:ea typeface="Open sans" panose="020B0606030504020204" pitchFamily="2" charset="0"/>
+                <a:cs typeface="Open sans" panose="020B0606030504020204" pitchFamily="2" charset="0"/>
+              </a:rPr>
+              <a:t>Includes a dashboard to manage the scraper and see results as visualisation</a:t>
             </a:r>
           </a:p>
         </p:txBody>
@@ -4332,7 +5842,7 @@
           <a:lstStyle/>
           <a:p>
             <a:r>
-              <a:rPr lang="en-GB">
+              <a:rPr lang="en-GB" dirty="0">
                 <a:solidFill>
                   <a:schemeClr val="bg1"/>
                 </a:solidFill>
@@ -4340,23 +5850,15 @@
                 <a:ea typeface="Open sans" panose="020B0606030504020204" pitchFamily="2" charset="0"/>
                 <a:cs typeface="Open sans" panose="020B0606030504020204" pitchFamily="2" charset="0"/>
               </a:rPr>
-              <a:t>Questionnaire</a:t>
-            </a:r>
-            <a:endParaRPr lang="en-GB" dirty="0">
-              <a:solidFill>
-                <a:schemeClr val="bg1"/>
-              </a:solidFill>
-              <a:latin typeface="Open sans" panose="020B0606030504020204" pitchFamily="2" charset="0"/>
-              <a:ea typeface="Open sans" panose="020B0606030504020204" pitchFamily="2" charset="0"/>
-              <a:cs typeface="Open sans" panose="020B0606030504020204" pitchFamily="2" charset="0"/>
-            </a:endParaRPr>
+              <a:t>Background Information</a:t>
+            </a:r>
           </a:p>
         </p:txBody>
       </p:sp>
     </p:spTree>
     <p:extLst>
       <p:ext uri="{BB962C8B-B14F-4D97-AF65-F5344CB8AC3E}">
-        <p14:creationId xmlns:p14="http://schemas.microsoft.com/office/powerpoint/2010/main" val="214403025"/>
+        <p14:creationId xmlns:p14="http://schemas.microsoft.com/office/powerpoint/2010/main" val="1734501605"/>
       </p:ext>
     </p:extLst>
   </p:cSld>
@@ -4406,46 +5908,132 @@
           </a:xfrm>
         </p:spPr>
         <p:txBody>
-          <a:bodyPr/>
-          <a:lstStyle/>
-          <a:p>
-            <a:r>
-              <a:rPr lang="en-GB" dirty="0">
+          <a:bodyPr>
+            <a:normAutofit/>
+          </a:bodyPr>
+          <a:lstStyle/>
+          <a:p>
+            <a:r>
+              <a:rPr lang="en-GB" sz="2000" dirty="0">
                 <a:latin typeface="Open sans" panose="020B0606030504020204" pitchFamily="2" charset="0"/>
                 <a:ea typeface="Open sans" panose="020B0606030504020204" pitchFamily="2" charset="0"/>
                 <a:cs typeface="Open sans" panose="020B0606030504020204" pitchFamily="2" charset="0"/>
               </a:rPr>
-              <a:t>Moving from RSS feeds to multiple configurable sources</a:t>
-            </a:r>
-          </a:p>
-          <a:p>
-            <a:r>
-              <a:rPr lang="en-GB" dirty="0">
+              <a:t>Python-based web scraping system for multiple sources. Can use RSS feeds (using </a:t>
+            </a:r>
+            <a:r>
+              <a:rPr lang="en-GB" sz="2000" dirty="0" err="1">
                 <a:latin typeface="Open sans" panose="020B0606030504020204" pitchFamily="2" charset="0"/>
                 <a:ea typeface="Open sans" panose="020B0606030504020204" pitchFamily="2" charset="0"/>
                 <a:cs typeface="Open sans" panose="020B0606030504020204" pitchFamily="2" charset="0"/>
               </a:rPr>
-              <a:t>Creating a configurable web scraper with multiple different source types</a:t>
-            </a:r>
-          </a:p>
-          <a:p>
-            <a:r>
-              <a:rPr lang="en-GB" dirty="0">
+              <a:t>feedparser</a:t>
+            </a:r>
+            <a:r>
+              <a:rPr lang="en-GB" sz="2000" dirty="0">
                 <a:latin typeface="Open sans" panose="020B0606030504020204" pitchFamily="2" charset="0"/>
                 <a:ea typeface="Open sans" panose="020B0606030504020204" pitchFamily="2" charset="0"/>
                 <a:cs typeface="Open sans" panose="020B0606030504020204" pitchFamily="2" charset="0"/>
               </a:rPr>
-              <a:t>Combined with a classifier to categorise news articles</a:t>
-            </a:r>
-          </a:p>
-          <a:p>
-            <a:r>
-              <a:rPr lang="en-GB" dirty="0">
+              <a:t>) and news websites (using newspaper3k) to extract article information</a:t>
+            </a:r>
+          </a:p>
+          <a:p>
+            <a:r>
+              <a:rPr lang="en-GB" sz="2000" dirty="0">
                 <a:latin typeface="Open sans" panose="020B0606030504020204" pitchFamily="2" charset="0"/>
                 <a:ea typeface="Open sans" panose="020B0606030504020204" pitchFamily="2" charset="0"/>
                 <a:cs typeface="Open sans" panose="020B0606030504020204" pitchFamily="2" charset="0"/>
               </a:rPr>
-              <a:t>Includes a dashboard to manage the scraper and see results as visualisation</a:t>
+              <a:t>Multi-topic classification using different models to give news articles a category (health, sports, entertainment etc.)</a:t>
+            </a:r>
+          </a:p>
+          <a:p>
+            <a:r>
+              <a:rPr lang="en-GB" sz="2000" dirty="0">
+                <a:latin typeface="Open sans" panose="020B0606030504020204" pitchFamily="2" charset="0"/>
+                <a:ea typeface="Open sans" panose="020B0606030504020204" pitchFamily="2" charset="0"/>
+                <a:cs typeface="Open sans" panose="020B0606030504020204" pitchFamily="2" charset="0"/>
+              </a:rPr>
+              <a:t>Database for storing information (article headline, body, category, source name, language etc.) using </a:t>
+            </a:r>
+            <a:r>
+              <a:rPr lang="en-GB" sz="2000" dirty="0" err="1">
+                <a:latin typeface="Open sans" panose="020B0606030504020204" pitchFamily="2" charset="0"/>
+                <a:ea typeface="Open sans" panose="020B0606030504020204" pitchFamily="2" charset="0"/>
+                <a:cs typeface="Open sans" panose="020B0606030504020204" pitchFamily="2" charset="0"/>
+              </a:rPr>
+              <a:t>elasticsearch</a:t>
+            </a:r>
+            <a:endParaRPr lang="en-GB" sz="2000" dirty="0">
+              <a:latin typeface="Open sans" panose="020B0606030504020204" pitchFamily="2" charset="0"/>
+              <a:ea typeface="Open sans" panose="020B0606030504020204" pitchFamily="2" charset="0"/>
+              <a:cs typeface="Open sans" panose="020B0606030504020204" pitchFamily="2" charset="0"/>
+            </a:endParaRPr>
+          </a:p>
+          <a:p>
+            <a:r>
+              <a:rPr lang="en-GB" sz="2000" b="1" dirty="0">
+                <a:latin typeface="Open sans" panose="020B0606030504020204" pitchFamily="2" charset="0"/>
+                <a:ea typeface="Open sans" panose="020B0606030504020204" pitchFamily="2" charset="0"/>
+                <a:cs typeface="Open sans" panose="020B0606030504020204" pitchFamily="2" charset="0"/>
+              </a:rPr>
+              <a:t>Visualisation</a:t>
+            </a:r>
+            <a:r>
+              <a:rPr lang="en-GB" sz="2000" dirty="0">
+                <a:latin typeface="Open sans" panose="020B0606030504020204" pitchFamily="2" charset="0"/>
+                <a:ea typeface="Open sans" panose="020B0606030504020204" pitchFamily="2" charset="0"/>
+                <a:cs typeface="Open sans" panose="020B0606030504020204" pitchFamily="2" charset="0"/>
+              </a:rPr>
+              <a:t> of database information through elastic </a:t>
+            </a:r>
+            <a:r>
+              <a:rPr lang="en-GB" sz="2000" dirty="0" err="1">
+                <a:latin typeface="Open sans" panose="020B0606030504020204" pitchFamily="2" charset="0"/>
+                <a:ea typeface="Open sans" panose="020B0606030504020204" pitchFamily="2" charset="0"/>
+                <a:cs typeface="Open sans" panose="020B0606030504020204" pitchFamily="2" charset="0"/>
+              </a:rPr>
+              <a:t>kibana</a:t>
+            </a:r>
+            <a:endParaRPr lang="en-GB" sz="2000" dirty="0">
+              <a:latin typeface="Open sans" panose="020B0606030504020204" pitchFamily="2" charset="0"/>
+              <a:ea typeface="Open sans" panose="020B0606030504020204" pitchFamily="2" charset="0"/>
+              <a:cs typeface="Open sans" panose="020B0606030504020204" pitchFamily="2" charset="0"/>
+            </a:endParaRPr>
+          </a:p>
+          <a:p>
+            <a:r>
+              <a:rPr lang="en-GB" sz="2000" b="1" dirty="0">
+                <a:latin typeface="Open sans" panose="020B0606030504020204" pitchFamily="2" charset="0"/>
+                <a:ea typeface="Open sans" panose="020B0606030504020204" pitchFamily="2" charset="0"/>
+                <a:cs typeface="Open sans" panose="020B0606030504020204" pitchFamily="2" charset="0"/>
+              </a:rPr>
+              <a:t>Web interface </a:t>
+            </a:r>
+            <a:r>
+              <a:rPr lang="en-GB" sz="2000" dirty="0">
+                <a:latin typeface="Open sans" panose="020B0606030504020204" pitchFamily="2" charset="0"/>
+                <a:ea typeface="Open sans" panose="020B0606030504020204" pitchFamily="2" charset="0"/>
+                <a:cs typeface="Open sans" panose="020B0606030504020204" pitchFamily="2" charset="0"/>
+              </a:rPr>
+              <a:t>for managing python scraping system (using eel library to connect </a:t>
+            </a:r>
+            <a:r>
+              <a:rPr lang="en-GB" sz="2000" dirty="0" err="1">
+                <a:latin typeface="Open sans" panose="020B0606030504020204" pitchFamily="2" charset="0"/>
+                <a:ea typeface="Open sans" panose="020B0606030504020204" pitchFamily="2" charset="0"/>
+                <a:cs typeface="Open sans" panose="020B0606030504020204" pitchFamily="2" charset="0"/>
+              </a:rPr>
+              <a:t>javascript</a:t>
+            </a:r>
+            <a:r>
+              <a:rPr lang="en-GB" sz="2000" dirty="0">
+                <a:latin typeface="Open sans" panose="020B0606030504020204" pitchFamily="2" charset="0"/>
+                <a:ea typeface="Open sans" panose="020B0606030504020204" pitchFamily="2" charset="0"/>
+                <a:cs typeface="Open sans" panose="020B0606030504020204" pitchFamily="2" charset="0"/>
+              </a:rPr>
+              <a:t> to python)</a:t>
             </a:r>
           </a:p>
         </p:txBody>
@@ -4534,7 +6122,7 @@
                 <a:ea typeface="Open sans" panose="020B0606030504020204" pitchFamily="2" charset="0"/>
                 <a:cs typeface="Open sans" panose="020B0606030504020204" pitchFamily="2" charset="0"/>
               </a:rPr>
-              <a:t>Background Information</a:t>
+              <a:t>Functionality</a:t>
             </a:r>
           </a:p>
         </p:txBody>
@@ -4542,7 +6130,7 @@
     </p:spTree>
     <p:extLst>
       <p:ext uri="{BB962C8B-B14F-4D97-AF65-F5344CB8AC3E}">
-        <p14:creationId xmlns:p14="http://schemas.microsoft.com/office/powerpoint/2010/main" val="1734501605"/>
+        <p14:creationId xmlns:p14="http://schemas.microsoft.com/office/powerpoint/2010/main" val="1935483162"/>
       </p:ext>
     </p:extLst>
   </p:cSld>
@@ -4571,73 +6159,6 @@
       </p:grpSpPr>
       <p:sp>
         <p:nvSpPr>
-          <p:cNvPr id="3" name="Content Placeholder 2">
-            <a:extLst>
-              <a:ext uri="{FF2B5EF4-FFF2-40B4-BE49-F238E27FC236}">
-                <a16:creationId xmlns:a16="http://schemas.microsoft.com/office/drawing/2014/main" id="{CDB0A1B1-88E2-76B5-AA82-DBB97847A4C1}"/>
-              </a:ext>
-            </a:extLst>
-          </p:cNvPr>
-          <p:cNvSpPr>
-            <a:spLocks noGrp="1"/>
-          </p:cNvSpPr>
-          <p:nvPr>
-            <p:ph idx="1"/>
-          </p:nvPr>
-        </p:nvSpPr>
-        <p:spPr>
-          <a:xfrm>
-            <a:off x="838200" y="1627218"/>
-            <a:ext cx="10515600" cy="4351338"/>
-          </a:xfrm>
-        </p:spPr>
-        <p:txBody>
-          <a:bodyPr/>
-          <a:lstStyle/>
-          <a:p>
-            <a:r>
-              <a:rPr lang="en-GB" dirty="0">
-                <a:latin typeface="Open sans" panose="020B0606030504020204" pitchFamily="2" charset="0"/>
-                <a:ea typeface="Open sans" panose="020B0606030504020204" pitchFamily="2" charset="0"/>
-                <a:cs typeface="Open sans" panose="020B0606030504020204" pitchFamily="2" charset="0"/>
-              </a:rPr>
-              <a:t>Easy to use dashboard for managing sources</a:t>
-            </a:r>
-          </a:p>
-          <a:p>
-            <a:r>
-              <a:rPr lang="en-GB" dirty="0">
-                <a:latin typeface="Open sans" panose="020B0606030504020204" pitchFamily="2" charset="0"/>
-                <a:ea typeface="Open sans" panose="020B0606030504020204" pitchFamily="2" charset="0"/>
-                <a:cs typeface="Open sans" panose="020B0606030504020204" pitchFamily="2" charset="0"/>
-              </a:rPr>
-              <a:t>Can view which sources are currently active/inactive</a:t>
-            </a:r>
-          </a:p>
-          <a:p>
-            <a:r>
-              <a:rPr lang="en-GB" dirty="0">
-                <a:latin typeface="Open sans" panose="020B0606030504020204" pitchFamily="2" charset="0"/>
-                <a:ea typeface="Open sans" panose="020B0606030504020204" pitchFamily="2" charset="0"/>
-                <a:cs typeface="Open sans" panose="020B0606030504020204" pitchFamily="2" charset="0"/>
-              </a:rPr>
-              <a:t>Can quickly and easily add new sources</a:t>
-            </a:r>
-          </a:p>
-          <a:p>
-            <a:r>
-              <a:rPr lang="en-GB" dirty="0">
-                <a:latin typeface="Open sans" panose="020B0606030504020204" pitchFamily="2" charset="0"/>
-                <a:ea typeface="Open sans" panose="020B0606030504020204" pitchFamily="2" charset="0"/>
-                <a:cs typeface="Open sans" panose="020B0606030504020204" pitchFamily="2" charset="0"/>
-              </a:rPr>
-              <a:t>Can view which sources are still effective and which are stale</a:t>
-            </a:r>
-          </a:p>
-        </p:txBody>
-      </p:sp>
-      <p:sp>
-        <p:nvSpPr>
           <p:cNvPr id="4" name="Rectangle 3">
             <a:extLst>
               <a:ext uri="{FF2B5EF4-FFF2-40B4-BE49-F238E27FC236}">
@@ -4720,15 +6241,560 @@
                 <a:ea typeface="Open sans" panose="020B0606030504020204" pitchFamily="2" charset="0"/>
                 <a:cs typeface="Open sans" panose="020B0606030504020204" pitchFamily="2" charset="0"/>
               </a:rPr>
-              <a:t>Motivation</a:t>
-            </a:r>
-          </a:p>
-        </p:txBody>
-      </p:sp>
+              <a:t>Architecture</a:t>
+            </a:r>
+          </a:p>
+        </p:txBody>
+      </p:sp>
+      <p:sp>
+        <p:nvSpPr>
+          <p:cNvPr id="5" name="Rectangle 4">
+            <a:extLst>
+              <a:ext uri="{FF2B5EF4-FFF2-40B4-BE49-F238E27FC236}">
+                <a16:creationId xmlns:a16="http://schemas.microsoft.com/office/drawing/2014/main" id="{D3A802DB-23CB-7CB9-4B56-206BB79B6273}"/>
+              </a:ext>
+            </a:extLst>
+          </p:cNvPr>
+          <p:cNvSpPr/>
+          <p:nvPr/>
+        </p:nvSpPr>
+        <p:spPr>
+          <a:xfrm>
+            <a:off x="4096512" y="1774802"/>
+            <a:ext cx="2286000" cy="1161288"/>
+          </a:xfrm>
+          <a:prstGeom prst="rect">
+            <a:avLst/>
+          </a:prstGeom>
+          <a:noFill/>
+          <a:ln>
+            <a:solidFill>
+              <a:schemeClr val="tx1"/>
+            </a:solidFill>
+          </a:ln>
+        </p:spPr>
+        <p:style>
+          <a:lnRef idx="2">
+            <a:schemeClr val="accent1">
+              <a:shade val="50000"/>
+            </a:schemeClr>
+          </a:lnRef>
+          <a:fillRef idx="1">
+            <a:schemeClr val="accent1"/>
+          </a:fillRef>
+          <a:effectRef idx="0">
+            <a:schemeClr val="accent1"/>
+          </a:effectRef>
+          <a:fontRef idx="minor">
+            <a:schemeClr val="lt1"/>
+          </a:fontRef>
+        </p:style>
+        <p:txBody>
+          <a:bodyPr rtlCol="0" anchor="ctr"/>
+          <a:lstStyle/>
+          <a:p>
+            <a:pPr algn="ctr"/>
+            <a:r>
+              <a:rPr lang="en-GB" dirty="0">
+                <a:solidFill>
+                  <a:sysClr val="windowText" lastClr="000000"/>
+                </a:solidFill>
+              </a:rPr>
+              <a:t>Web scaping system</a:t>
+            </a:r>
+          </a:p>
+        </p:txBody>
+      </p:sp>
+      <p:sp>
+        <p:nvSpPr>
+          <p:cNvPr id="6" name="Rectangle 5">
+            <a:extLst>
+              <a:ext uri="{FF2B5EF4-FFF2-40B4-BE49-F238E27FC236}">
+                <a16:creationId xmlns:a16="http://schemas.microsoft.com/office/drawing/2014/main" id="{768650D3-35DD-5616-0E9B-7BD05B6D971D}"/>
+              </a:ext>
+            </a:extLst>
+          </p:cNvPr>
+          <p:cNvSpPr/>
+          <p:nvPr/>
+        </p:nvSpPr>
+        <p:spPr>
+          <a:xfrm>
+            <a:off x="6882384" y="4974336"/>
+            <a:ext cx="2286000" cy="1161288"/>
+          </a:xfrm>
+          <a:prstGeom prst="rect">
+            <a:avLst/>
+          </a:prstGeom>
+          <a:noFill/>
+          <a:ln>
+            <a:solidFill>
+              <a:schemeClr val="tx1"/>
+            </a:solidFill>
+          </a:ln>
+        </p:spPr>
+        <p:style>
+          <a:lnRef idx="2">
+            <a:schemeClr val="accent1">
+              <a:shade val="50000"/>
+            </a:schemeClr>
+          </a:lnRef>
+          <a:fillRef idx="1">
+            <a:schemeClr val="accent1"/>
+          </a:fillRef>
+          <a:effectRef idx="0">
+            <a:schemeClr val="accent1"/>
+          </a:effectRef>
+          <a:fontRef idx="minor">
+            <a:schemeClr val="lt1"/>
+          </a:fontRef>
+        </p:style>
+        <p:txBody>
+          <a:bodyPr rtlCol="0" anchor="ctr"/>
+          <a:lstStyle/>
+          <a:p>
+            <a:pPr algn="ctr"/>
+            <a:r>
+              <a:rPr lang="en-GB" dirty="0">
+                <a:solidFill>
+                  <a:sysClr val="windowText" lastClr="000000"/>
+                </a:solidFill>
+              </a:rPr>
+              <a:t>Visualisation</a:t>
+            </a:r>
+          </a:p>
+        </p:txBody>
+      </p:sp>
+      <p:sp>
+        <p:nvSpPr>
+          <p:cNvPr id="7" name="Rectangle 6">
+            <a:extLst>
+              <a:ext uri="{FF2B5EF4-FFF2-40B4-BE49-F238E27FC236}">
+                <a16:creationId xmlns:a16="http://schemas.microsoft.com/office/drawing/2014/main" id="{0A20303F-B541-CDD4-70FC-2432B67A41A3}"/>
+              </a:ext>
+            </a:extLst>
+          </p:cNvPr>
+          <p:cNvSpPr/>
+          <p:nvPr/>
+        </p:nvSpPr>
+        <p:spPr>
+          <a:xfrm>
+            <a:off x="4096512" y="3374569"/>
+            <a:ext cx="2286000" cy="1161288"/>
+          </a:xfrm>
+          <a:prstGeom prst="rect">
+            <a:avLst/>
+          </a:prstGeom>
+          <a:noFill/>
+          <a:ln>
+            <a:solidFill>
+              <a:schemeClr val="tx1"/>
+            </a:solidFill>
+          </a:ln>
+        </p:spPr>
+        <p:style>
+          <a:lnRef idx="2">
+            <a:schemeClr val="accent1">
+              <a:shade val="50000"/>
+            </a:schemeClr>
+          </a:lnRef>
+          <a:fillRef idx="1">
+            <a:schemeClr val="accent1"/>
+          </a:fillRef>
+          <a:effectRef idx="0">
+            <a:schemeClr val="accent1"/>
+          </a:effectRef>
+          <a:fontRef idx="minor">
+            <a:schemeClr val="lt1"/>
+          </a:fontRef>
+        </p:style>
+        <p:txBody>
+          <a:bodyPr rtlCol="0" anchor="ctr"/>
+          <a:lstStyle/>
+          <a:p>
+            <a:pPr algn="ctr"/>
+            <a:r>
+              <a:rPr lang="en-GB" dirty="0">
+                <a:solidFill>
+                  <a:sysClr val="windowText" lastClr="000000"/>
+                </a:solidFill>
+              </a:rPr>
+              <a:t>Classifier</a:t>
+            </a:r>
+          </a:p>
+        </p:txBody>
+      </p:sp>
+      <p:sp>
+        <p:nvSpPr>
+          <p:cNvPr id="8" name="Rectangle 7">
+            <a:extLst>
+              <a:ext uri="{FF2B5EF4-FFF2-40B4-BE49-F238E27FC236}">
+                <a16:creationId xmlns:a16="http://schemas.microsoft.com/office/drawing/2014/main" id="{EB982045-21AA-0A68-F8DB-D54DE52D91B3}"/>
+              </a:ext>
+            </a:extLst>
+          </p:cNvPr>
+          <p:cNvSpPr/>
+          <p:nvPr/>
+        </p:nvSpPr>
+        <p:spPr>
+          <a:xfrm>
+            <a:off x="4096512" y="4976333"/>
+            <a:ext cx="2286000" cy="1161288"/>
+          </a:xfrm>
+          <a:prstGeom prst="rect">
+            <a:avLst/>
+          </a:prstGeom>
+          <a:noFill/>
+          <a:ln>
+            <a:solidFill>
+              <a:schemeClr val="tx1"/>
+            </a:solidFill>
+          </a:ln>
+        </p:spPr>
+        <p:style>
+          <a:lnRef idx="2">
+            <a:schemeClr val="accent1">
+              <a:shade val="50000"/>
+            </a:schemeClr>
+          </a:lnRef>
+          <a:fillRef idx="1">
+            <a:schemeClr val="accent1"/>
+          </a:fillRef>
+          <a:effectRef idx="0">
+            <a:schemeClr val="accent1"/>
+          </a:effectRef>
+          <a:fontRef idx="minor">
+            <a:schemeClr val="lt1"/>
+          </a:fontRef>
+        </p:style>
+        <p:txBody>
+          <a:bodyPr rtlCol="0" anchor="ctr"/>
+          <a:lstStyle/>
+          <a:p>
+            <a:pPr algn="ctr"/>
+            <a:r>
+              <a:rPr lang="en-GB" dirty="0">
+                <a:solidFill>
+                  <a:sysClr val="windowText" lastClr="000000"/>
+                </a:solidFill>
+              </a:rPr>
+              <a:t>Database</a:t>
+            </a:r>
+          </a:p>
+        </p:txBody>
+      </p:sp>
+      <p:sp>
+        <p:nvSpPr>
+          <p:cNvPr id="9" name="Rectangle 8">
+            <a:extLst>
+              <a:ext uri="{FF2B5EF4-FFF2-40B4-BE49-F238E27FC236}">
+                <a16:creationId xmlns:a16="http://schemas.microsoft.com/office/drawing/2014/main" id="{B0D659E6-2410-560D-749A-695D0D953AB4}"/>
+              </a:ext>
+            </a:extLst>
+          </p:cNvPr>
+          <p:cNvSpPr/>
+          <p:nvPr/>
+        </p:nvSpPr>
+        <p:spPr>
+          <a:xfrm>
+            <a:off x="7211568" y="1774802"/>
+            <a:ext cx="2286000" cy="1161288"/>
+          </a:xfrm>
+          <a:prstGeom prst="rect">
+            <a:avLst/>
+          </a:prstGeom>
+          <a:noFill/>
+          <a:ln>
+            <a:solidFill>
+              <a:schemeClr val="tx1"/>
+            </a:solidFill>
+          </a:ln>
+        </p:spPr>
+        <p:style>
+          <a:lnRef idx="2">
+            <a:schemeClr val="accent1">
+              <a:shade val="50000"/>
+            </a:schemeClr>
+          </a:lnRef>
+          <a:fillRef idx="1">
+            <a:schemeClr val="accent1"/>
+          </a:fillRef>
+          <a:effectRef idx="0">
+            <a:schemeClr val="accent1"/>
+          </a:effectRef>
+          <a:fontRef idx="minor">
+            <a:schemeClr val="lt1"/>
+          </a:fontRef>
+        </p:style>
+        <p:txBody>
+          <a:bodyPr rtlCol="0" anchor="ctr"/>
+          <a:lstStyle/>
+          <a:p>
+            <a:pPr algn="ctr"/>
+            <a:r>
+              <a:rPr lang="en-GB" dirty="0">
+                <a:solidFill>
+                  <a:sysClr val="windowText" lastClr="000000"/>
+                </a:solidFill>
+              </a:rPr>
+              <a:t>Web interface</a:t>
+            </a:r>
+          </a:p>
+        </p:txBody>
+      </p:sp>
+      <p:cxnSp>
+        <p:nvCxnSpPr>
+          <p:cNvPr id="11" name="Straight Arrow Connector 10">
+            <a:extLst>
+              <a:ext uri="{FF2B5EF4-FFF2-40B4-BE49-F238E27FC236}">
+                <a16:creationId xmlns:a16="http://schemas.microsoft.com/office/drawing/2014/main" id="{266781C8-6BBF-F24B-F3B7-9DE9B04E832C}"/>
+              </a:ext>
+            </a:extLst>
+          </p:cNvPr>
+          <p:cNvCxnSpPr>
+            <a:cxnSpLocks/>
+          </p:cNvCxnSpPr>
+          <p:nvPr/>
+        </p:nvCxnSpPr>
+        <p:spPr>
+          <a:xfrm>
+            <a:off x="6382512" y="2103120"/>
+            <a:ext cx="829056" cy="0"/>
+          </a:xfrm>
+          <a:prstGeom prst="straightConnector1">
+            <a:avLst/>
+          </a:prstGeom>
+          <a:ln>
+            <a:tailEnd type="triangle"/>
+          </a:ln>
+        </p:spPr>
+        <p:style>
+          <a:lnRef idx="1">
+            <a:schemeClr val="dk1"/>
+          </a:lnRef>
+          <a:fillRef idx="0">
+            <a:schemeClr val="dk1"/>
+          </a:fillRef>
+          <a:effectRef idx="0">
+            <a:schemeClr val="dk1"/>
+          </a:effectRef>
+          <a:fontRef idx="minor">
+            <a:schemeClr val="tx1"/>
+          </a:fontRef>
+        </p:style>
+      </p:cxnSp>
+      <p:cxnSp>
+        <p:nvCxnSpPr>
+          <p:cNvPr id="12" name="Straight Arrow Connector 11">
+            <a:extLst>
+              <a:ext uri="{FF2B5EF4-FFF2-40B4-BE49-F238E27FC236}">
+                <a16:creationId xmlns:a16="http://schemas.microsoft.com/office/drawing/2014/main" id="{89012AE6-3160-2A6B-E611-0617F58B50AA}"/>
+              </a:ext>
+            </a:extLst>
+          </p:cNvPr>
+          <p:cNvCxnSpPr>
+            <a:cxnSpLocks/>
+          </p:cNvCxnSpPr>
+          <p:nvPr/>
+        </p:nvCxnSpPr>
+        <p:spPr>
+          <a:xfrm flipH="1">
+            <a:off x="6382512" y="2575560"/>
+            <a:ext cx="829056" cy="0"/>
+          </a:xfrm>
+          <a:prstGeom prst="straightConnector1">
+            <a:avLst/>
+          </a:prstGeom>
+          <a:ln>
+            <a:tailEnd type="triangle"/>
+          </a:ln>
+        </p:spPr>
+        <p:style>
+          <a:lnRef idx="1">
+            <a:schemeClr val="dk1"/>
+          </a:lnRef>
+          <a:fillRef idx="0">
+            <a:schemeClr val="dk1"/>
+          </a:fillRef>
+          <a:effectRef idx="0">
+            <a:schemeClr val="dk1"/>
+          </a:effectRef>
+          <a:fontRef idx="minor">
+            <a:schemeClr val="tx1"/>
+          </a:fontRef>
+        </p:style>
+      </p:cxnSp>
+      <p:cxnSp>
+        <p:nvCxnSpPr>
+          <p:cNvPr id="14" name="Straight Arrow Connector 13">
+            <a:extLst>
+              <a:ext uri="{FF2B5EF4-FFF2-40B4-BE49-F238E27FC236}">
+                <a16:creationId xmlns:a16="http://schemas.microsoft.com/office/drawing/2014/main" id="{26FCA8E1-3956-02DA-6A71-624C7E9C087B}"/>
+              </a:ext>
+            </a:extLst>
+          </p:cNvPr>
+          <p:cNvCxnSpPr>
+            <a:cxnSpLocks/>
+            <a:endCxn id="9" idx="2"/>
+          </p:cNvCxnSpPr>
+          <p:nvPr/>
+        </p:nvCxnSpPr>
+        <p:spPr>
+          <a:xfrm flipV="1">
+            <a:off x="8354568" y="2936090"/>
+            <a:ext cx="0" cy="2038246"/>
+          </a:xfrm>
+          <a:prstGeom prst="straightConnector1">
+            <a:avLst/>
+          </a:prstGeom>
+          <a:ln>
+            <a:tailEnd type="triangle"/>
+          </a:ln>
+        </p:spPr>
+        <p:style>
+          <a:lnRef idx="1">
+            <a:schemeClr val="dk1"/>
+          </a:lnRef>
+          <a:fillRef idx="0">
+            <a:schemeClr val="dk1"/>
+          </a:fillRef>
+          <a:effectRef idx="0">
+            <a:schemeClr val="dk1"/>
+          </a:effectRef>
+          <a:fontRef idx="minor">
+            <a:schemeClr val="tx1"/>
+          </a:fontRef>
+        </p:style>
+      </p:cxnSp>
+      <p:cxnSp>
+        <p:nvCxnSpPr>
+          <p:cNvPr id="18" name="Straight Arrow Connector 17">
+            <a:extLst>
+              <a:ext uri="{FF2B5EF4-FFF2-40B4-BE49-F238E27FC236}">
+                <a16:creationId xmlns:a16="http://schemas.microsoft.com/office/drawing/2014/main" id="{E6237D9B-E75F-62BB-067B-E88900B5A958}"/>
+              </a:ext>
+            </a:extLst>
+          </p:cNvPr>
+          <p:cNvCxnSpPr>
+            <a:cxnSpLocks/>
+            <a:endCxn id="6" idx="1"/>
+          </p:cNvCxnSpPr>
+          <p:nvPr/>
+        </p:nvCxnSpPr>
+        <p:spPr>
+          <a:xfrm>
+            <a:off x="6382512" y="5554980"/>
+            <a:ext cx="499872" cy="0"/>
+          </a:xfrm>
+          <a:prstGeom prst="straightConnector1">
+            <a:avLst/>
+          </a:prstGeom>
+          <a:ln>
+            <a:tailEnd type="triangle"/>
+          </a:ln>
+        </p:spPr>
+        <p:style>
+          <a:lnRef idx="1">
+            <a:schemeClr val="dk1"/>
+          </a:lnRef>
+          <a:fillRef idx="0">
+            <a:schemeClr val="dk1"/>
+          </a:fillRef>
+          <a:effectRef idx="0">
+            <a:schemeClr val="dk1"/>
+          </a:effectRef>
+          <a:fontRef idx="minor">
+            <a:schemeClr val="tx1"/>
+          </a:fontRef>
+        </p:style>
+      </p:cxnSp>
+      <p:cxnSp>
+        <p:nvCxnSpPr>
+          <p:cNvPr id="24" name="Straight Arrow Connector 23">
+            <a:extLst>
+              <a:ext uri="{FF2B5EF4-FFF2-40B4-BE49-F238E27FC236}">
+                <a16:creationId xmlns:a16="http://schemas.microsoft.com/office/drawing/2014/main" id="{A61544E3-CB4A-7170-7DB4-31E008A41B50}"/>
+              </a:ext>
+            </a:extLst>
+          </p:cNvPr>
+          <p:cNvCxnSpPr>
+            <a:cxnSpLocks/>
+            <a:stCxn id="5" idx="2"/>
+            <a:endCxn id="7" idx="0"/>
+          </p:cNvCxnSpPr>
+          <p:nvPr/>
+        </p:nvCxnSpPr>
+        <p:spPr>
+          <a:xfrm>
+            <a:off x="5239512" y="2936090"/>
+            <a:ext cx="0" cy="438479"/>
+          </a:xfrm>
+          <a:prstGeom prst="straightConnector1">
+            <a:avLst/>
+          </a:prstGeom>
+          <a:ln>
+            <a:tailEnd type="triangle"/>
+          </a:ln>
+        </p:spPr>
+        <p:style>
+          <a:lnRef idx="1">
+            <a:schemeClr val="dk1"/>
+          </a:lnRef>
+          <a:fillRef idx="0">
+            <a:schemeClr val="dk1"/>
+          </a:fillRef>
+          <a:effectRef idx="0">
+            <a:schemeClr val="dk1"/>
+          </a:effectRef>
+          <a:fontRef idx="minor">
+            <a:schemeClr val="tx1"/>
+          </a:fontRef>
+        </p:style>
+      </p:cxnSp>
+      <p:cxnSp>
+        <p:nvCxnSpPr>
+          <p:cNvPr id="28" name="Straight Arrow Connector 27">
+            <a:extLst>
+              <a:ext uri="{FF2B5EF4-FFF2-40B4-BE49-F238E27FC236}">
+                <a16:creationId xmlns:a16="http://schemas.microsoft.com/office/drawing/2014/main" id="{C5984C5B-02D7-FC0C-086D-5610CEFF50A3}"/>
+              </a:ext>
+            </a:extLst>
+          </p:cNvPr>
+          <p:cNvCxnSpPr>
+            <a:cxnSpLocks/>
+          </p:cNvCxnSpPr>
+          <p:nvPr/>
+        </p:nvCxnSpPr>
+        <p:spPr>
+          <a:xfrm>
+            <a:off x="5239512" y="4535857"/>
+            <a:ext cx="0" cy="438479"/>
+          </a:xfrm>
+          <a:prstGeom prst="straightConnector1">
+            <a:avLst/>
+          </a:prstGeom>
+          <a:ln>
+            <a:tailEnd type="triangle"/>
+          </a:ln>
+        </p:spPr>
+        <p:style>
+          <a:lnRef idx="1">
+            <a:schemeClr val="dk1"/>
+          </a:lnRef>
+          <a:fillRef idx="0">
+            <a:schemeClr val="dk1"/>
+          </a:fillRef>
+          <a:effectRef idx="0">
+            <a:schemeClr val="dk1"/>
+          </a:effectRef>
+          <a:fontRef idx="minor">
+            <a:schemeClr val="tx1"/>
+          </a:fontRef>
+        </p:style>
+      </p:cxnSp>
     </p:spTree>
     <p:extLst>
       <p:ext uri="{BB962C8B-B14F-4D97-AF65-F5344CB8AC3E}">
-        <p14:creationId xmlns:p14="http://schemas.microsoft.com/office/powerpoint/2010/main" val="1965850021"/>
+        <p14:creationId xmlns:p14="http://schemas.microsoft.com/office/powerpoint/2010/main" val="1237304428"/>
       </p:ext>
     </p:extLst>
   </p:cSld>
@@ -4773,8 +6839,8 @@
         </p:nvSpPr>
         <p:spPr>
           <a:xfrm>
-            <a:off x="838200" y="1627218"/>
-            <a:ext cx="10515600" cy="4351338"/>
+            <a:off x="838200" y="1627217"/>
+            <a:ext cx="10515600" cy="4626933"/>
           </a:xfrm>
         </p:spPr>
         <p:txBody>
@@ -4787,8 +6853,24 @@
                 <a:ea typeface="Open sans" panose="020B0606030504020204" pitchFamily="2" charset="0"/>
                 <a:cs typeface="Open sans" panose="020B0606030504020204" pitchFamily="2" charset="0"/>
               </a:rPr>
-              <a:t>Easy to use dashboard for managing sources</a:t>
-            </a:r>
+              <a:t>Short questionnaire (5-10 mins)</a:t>
+            </a:r>
+          </a:p>
+          <a:p>
+            <a:r>
+              <a:rPr lang="en-GB" dirty="0">
+                <a:latin typeface="Open sans" panose="020B0606030504020204" pitchFamily="2" charset="0"/>
+                <a:ea typeface="Open sans" panose="020B0606030504020204" pitchFamily="2" charset="0"/>
+                <a:cs typeface="Open sans" panose="020B0606030504020204" pitchFamily="2" charset="0"/>
+                <a:hlinkClick r:id="rId3"/>
+              </a:rPr>
+              <a:t>https://forms.gle/ZUEmhvvvu8g1vCq87</a:t>
+            </a:r>
+            <a:endParaRPr lang="en-GB" dirty="0">
+              <a:latin typeface="Open sans" panose="020B0606030504020204" pitchFamily="2" charset="0"/>
+              <a:ea typeface="Open sans" panose="020B0606030504020204" pitchFamily="2" charset="0"/>
+              <a:cs typeface="Open sans" panose="020B0606030504020204" pitchFamily="2" charset="0"/>
+            </a:endParaRPr>
           </a:p>
           <a:p>
             <a:r>
@@ -4797,27 +6879,7 @@
                 <a:ea typeface="Open sans" panose="020B0606030504020204" pitchFamily="2" charset="0"/>
                 <a:cs typeface="Open sans" panose="020B0606030504020204" pitchFamily="2" charset="0"/>
               </a:rPr>
-              <a:t>Can view which sources are currently active/inactive</a:t>
-            </a:r>
-          </a:p>
-          <a:p>
-            <a:r>
-              <a:rPr lang="en-GB" dirty="0">
-                <a:latin typeface="Open sans" panose="020B0606030504020204" pitchFamily="2" charset="0"/>
-                <a:ea typeface="Open sans" panose="020B0606030504020204" pitchFamily="2" charset="0"/>
-                <a:cs typeface="Open sans" panose="020B0606030504020204" pitchFamily="2" charset="0"/>
-              </a:rPr>
-              <a:t>Can quickly and easily add new sources</a:t>
-            </a:r>
-          </a:p>
-          <a:p>
-            <a:r>
-              <a:rPr lang="en-GB" dirty="0">
-                <a:latin typeface="Open sans" panose="020B0606030504020204" pitchFamily="2" charset="0"/>
-                <a:ea typeface="Open sans" panose="020B0606030504020204" pitchFamily="2" charset="0"/>
-                <a:cs typeface="Open sans" panose="020B0606030504020204" pitchFamily="2" charset="0"/>
-              </a:rPr>
-              <a:t>Can view which sources are still effective and which are stale</a:t>
+              <a:t>Can try out live (mock) version of interface</a:t>
             </a:r>
           </a:p>
         </p:txBody>
@@ -4898,7 +6960,7 @@
           <a:lstStyle/>
           <a:p>
             <a:r>
-              <a:rPr lang="en-GB" dirty="0">
+              <a:rPr lang="en-GB">
                 <a:solidFill>
                   <a:schemeClr val="bg1"/>
                 </a:solidFill>
@@ -4906,15 +6968,23 @@
                 <a:ea typeface="Open sans" panose="020B0606030504020204" pitchFamily="2" charset="0"/>
                 <a:cs typeface="Open sans" panose="020B0606030504020204" pitchFamily="2" charset="0"/>
               </a:rPr>
-              <a:t>Motivation</a:t>
-            </a:r>
+              <a:t>Questionnaire</a:t>
+            </a:r>
+            <a:endParaRPr lang="en-GB" dirty="0">
+              <a:solidFill>
+                <a:schemeClr val="bg1"/>
+              </a:solidFill>
+              <a:latin typeface="Open sans" panose="020B0606030504020204" pitchFamily="2" charset="0"/>
+              <a:ea typeface="Open sans" panose="020B0606030504020204" pitchFamily="2" charset="0"/>
+              <a:cs typeface="Open sans" panose="020B0606030504020204" pitchFamily="2" charset="0"/>
+            </a:endParaRPr>
           </a:p>
         </p:txBody>
       </p:sp>
     </p:spTree>
     <p:extLst>
       <p:ext uri="{BB962C8B-B14F-4D97-AF65-F5344CB8AC3E}">
-        <p14:creationId xmlns:p14="http://schemas.microsoft.com/office/powerpoint/2010/main" val="2172328375"/>
+        <p14:creationId xmlns:p14="http://schemas.microsoft.com/office/powerpoint/2010/main" val="214403025"/>
       </p:ext>
     </p:extLst>
   </p:cSld>
@@ -4943,6 +7013,238 @@
       </p:grpSpPr>
       <p:sp>
         <p:nvSpPr>
+          <p:cNvPr id="3" name="Content Placeholder 2">
+            <a:extLst>
+              <a:ext uri="{FF2B5EF4-FFF2-40B4-BE49-F238E27FC236}">
+                <a16:creationId xmlns:a16="http://schemas.microsoft.com/office/drawing/2014/main" id="{CDB0A1B1-88E2-76B5-AA82-DBB97847A4C1}"/>
+              </a:ext>
+            </a:extLst>
+          </p:cNvPr>
+          <p:cNvSpPr>
+            <a:spLocks noGrp="1"/>
+          </p:cNvSpPr>
+          <p:nvPr>
+            <p:ph idx="1"/>
+          </p:nvPr>
+        </p:nvSpPr>
+        <p:spPr>
+          <a:xfrm>
+            <a:off x="838200" y="1627218"/>
+            <a:ext cx="10515600" cy="4351338"/>
+          </a:xfrm>
+        </p:spPr>
+        <p:txBody>
+          <a:bodyPr>
+            <a:normAutofit/>
+          </a:bodyPr>
+          <a:lstStyle/>
+          <a:p>
+            <a:r>
+              <a:rPr lang="en-GB" sz="2000" dirty="0">
+                <a:latin typeface="Open sans" panose="020B0606030504020204" pitchFamily="2" charset="0"/>
+                <a:ea typeface="Open sans" panose="020B0606030504020204" pitchFamily="2" charset="0"/>
+                <a:cs typeface="Open sans" panose="020B0606030504020204" pitchFamily="2" charset="0"/>
+              </a:rPr>
+              <a:t>Evaluation on </a:t>
+            </a:r>
+            <a:r>
+              <a:rPr lang="en-GB" sz="2000" dirty="0" err="1">
+                <a:latin typeface="Open sans" panose="020B0606030504020204" pitchFamily="2" charset="0"/>
+                <a:ea typeface="Open sans" panose="020B0606030504020204" pitchFamily="2" charset="0"/>
+                <a:cs typeface="Open sans" panose="020B0606030504020204" pitchFamily="2" charset="0"/>
+              </a:rPr>
+              <a:t>kibana</a:t>
+            </a:r>
+            <a:r>
+              <a:rPr lang="en-GB" sz="2000" dirty="0">
+                <a:latin typeface="Open sans" panose="020B0606030504020204" pitchFamily="2" charset="0"/>
+                <a:ea typeface="Open sans" panose="020B0606030504020204" pitchFamily="2" charset="0"/>
+                <a:cs typeface="Open sans" panose="020B0606030504020204" pitchFamily="2" charset="0"/>
+              </a:rPr>
+              <a:t> visualisation and web interface</a:t>
+            </a:r>
+          </a:p>
+          <a:p>
+            <a:r>
+              <a:rPr lang="en-GB" sz="2000" dirty="0">
+                <a:latin typeface="Open sans" panose="020B0606030504020204" pitchFamily="2" charset="0"/>
+                <a:ea typeface="Open sans" panose="020B0606030504020204" pitchFamily="2" charset="0"/>
+                <a:cs typeface="Open sans" panose="020B0606030504020204" pitchFamily="2" charset="0"/>
+              </a:rPr>
+              <a:t>Research Questions:</a:t>
+            </a:r>
+          </a:p>
+          <a:p>
+            <a:r>
+              <a:rPr lang="en-GB" sz="2000" b="0" i="0" dirty="0">
+                <a:solidFill>
+                  <a:srgbClr val="202124"/>
+                </a:solidFill>
+                <a:effectLst/>
+                <a:latin typeface="Open Sans" pitchFamily="2" charset="0"/>
+                <a:ea typeface="Open Sans" pitchFamily="2" charset="0"/>
+                <a:cs typeface="Open Sans" pitchFamily="2" charset="0"/>
+              </a:rPr>
+              <a:t>“Does the visualisation provide a complete and effective overview of the data collected?”</a:t>
+            </a:r>
+            <a:endParaRPr lang="en-GB" sz="2000" dirty="0">
+              <a:latin typeface="Open Sans" pitchFamily="2" charset="0"/>
+              <a:ea typeface="Open Sans" pitchFamily="2" charset="0"/>
+              <a:cs typeface="Open Sans" pitchFamily="2" charset="0"/>
+            </a:endParaRPr>
+          </a:p>
+          <a:p>
+            <a:r>
+              <a:rPr lang="en-GB" sz="2000" b="0" i="0" dirty="0">
+                <a:solidFill>
+                  <a:srgbClr val="202124"/>
+                </a:solidFill>
+                <a:effectLst/>
+                <a:latin typeface="Open Sans" pitchFamily="2" charset="0"/>
+                <a:ea typeface="Open Sans" pitchFamily="2" charset="0"/>
+                <a:cs typeface="Open Sans" pitchFamily="2" charset="0"/>
+              </a:rPr>
+              <a:t>“Does the interface allow users to easily and effectively manage the underlying web scraping system?”</a:t>
+            </a:r>
+            <a:endParaRPr lang="en-GB" sz="2000" dirty="0">
+              <a:latin typeface="Open Sans" pitchFamily="2" charset="0"/>
+              <a:ea typeface="Open Sans" pitchFamily="2" charset="0"/>
+              <a:cs typeface="Open Sans" pitchFamily="2" charset="0"/>
+            </a:endParaRPr>
+          </a:p>
+          <a:p>
+            <a:r>
+              <a:rPr lang="en-GB" sz="2000" dirty="0">
+                <a:latin typeface="Open sans" panose="020B0606030504020204" pitchFamily="2" charset="0"/>
+                <a:ea typeface="Open sans" panose="020B0606030504020204" pitchFamily="2" charset="0"/>
+                <a:cs typeface="Open sans" panose="020B0606030504020204" pitchFamily="2" charset="0"/>
+              </a:rPr>
+              <a:t>Will perform analyses (aggregations, qualitative coding) for dissertation evaluation</a:t>
+            </a:r>
+          </a:p>
+        </p:txBody>
+      </p:sp>
+      <p:sp>
+        <p:nvSpPr>
+          <p:cNvPr id="4" name="Rectangle 3">
+            <a:extLst>
+              <a:ext uri="{FF2B5EF4-FFF2-40B4-BE49-F238E27FC236}">
+                <a16:creationId xmlns:a16="http://schemas.microsoft.com/office/drawing/2014/main" id="{A7D254BB-7612-3CB7-7875-1774E7D04160}"/>
+              </a:ext>
+            </a:extLst>
+          </p:cNvPr>
+          <p:cNvSpPr/>
+          <p:nvPr/>
+        </p:nvSpPr>
+        <p:spPr>
+          <a:xfrm>
+            <a:off x="0" y="0"/>
+            <a:ext cx="12192000" cy="1138687"/>
+          </a:xfrm>
+          <a:prstGeom prst="rect">
+            <a:avLst/>
+          </a:prstGeom>
+          <a:solidFill>
+            <a:srgbClr val="0C2E8A"/>
+          </a:solidFill>
+        </p:spPr>
+        <p:style>
+          <a:lnRef idx="2">
+            <a:schemeClr val="accent1">
+              <a:shade val="50000"/>
+            </a:schemeClr>
+          </a:lnRef>
+          <a:fillRef idx="1">
+            <a:schemeClr val="accent1"/>
+          </a:fillRef>
+          <a:effectRef idx="0">
+            <a:schemeClr val="accent1"/>
+          </a:effectRef>
+          <a:fontRef idx="minor">
+            <a:schemeClr val="lt1"/>
+          </a:fontRef>
+        </p:style>
+        <p:txBody>
+          <a:bodyPr rtlCol="0" anchor="ctr"/>
+          <a:lstStyle/>
+          <a:p>
+            <a:pPr algn="ctr"/>
+            <a:endParaRPr lang="en-GB"/>
+          </a:p>
+        </p:txBody>
+      </p:sp>
+      <p:sp>
+        <p:nvSpPr>
+          <p:cNvPr id="2" name="Title 1">
+            <a:extLst>
+              <a:ext uri="{FF2B5EF4-FFF2-40B4-BE49-F238E27FC236}">
+                <a16:creationId xmlns:a16="http://schemas.microsoft.com/office/drawing/2014/main" id="{1D40E371-0CA0-37E5-0E1F-65FF7634F80C}"/>
+              </a:ext>
+            </a:extLst>
+          </p:cNvPr>
+          <p:cNvSpPr>
+            <a:spLocks noGrp="1"/>
+          </p:cNvSpPr>
+          <p:nvPr>
+            <p:ph type="title"/>
+          </p:nvPr>
+        </p:nvSpPr>
+        <p:spPr>
+          <a:xfrm>
+            <a:off x="838200" y="-93439"/>
+            <a:ext cx="10515600" cy="1325563"/>
+          </a:xfrm>
+        </p:spPr>
+        <p:txBody>
+          <a:bodyPr/>
+          <a:lstStyle/>
+          <a:p>
+            <a:r>
+              <a:rPr lang="en-GB" dirty="0">
+                <a:solidFill>
+                  <a:schemeClr val="bg1"/>
+                </a:solidFill>
+                <a:latin typeface="Open sans" panose="020B0606030504020204" pitchFamily="2" charset="0"/>
+                <a:ea typeface="Open sans" panose="020B0606030504020204" pitchFamily="2" charset="0"/>
+                <a:cs typeface="Open sans" panose="020B0606030504020204" pitchFamily="2" charset="0"/>
+              </a:rPr>
+              <a:t>Motivation</a:t>
+            </a:r>
+          </a:p>
+        </p:txBody>
+      </p:sp>
+    </p:spTree>
+    <p:extLst>
+      <p:ext uri="{BB962C8B-B14F-4D97-AF65-F5344CB8AC3E}">
+        <p14:creationId xmlns:p14="http://schemas.microsoft.com/office/powerpoint/2010/main" val="1965850021"/>
+      </p:ext>
+    </p:extLst>
+  </p:cSld>
+  <p:clrMapOvr>
+    <a:masterClrMapping/>
+  </p:clrMapOvr>
+</p:sld>
+</file>
+
+<file path=ppt/slides/slide7.xml><?xml version="1.0" encoding="utf-8"?>
+<p:sld xmlns:a="http://schemas.openxmlformats.org/drawingml/2006/main" xmlns:r="http://schemas.openxmlformats.org/officeDocument/2006/relationships" xmlns:p="http://schemas.openxmlformats.org/presentationml/2006/main">
+  <p:cSld>
+    <p:spTree>
+      <p:nvGrpSpPr>
+        <p:cNvPr id="1" name=""/>
+        <p:cNvGrpSpPr/>
+        <p:nvPr/>
+      </p:nvGrpSpPr>
+      <p:grpSpPr>
+        <a:xfrm>
+          <a:off x="0" y="0"/>
+          <a:ext cx="0" cy="0"/>
+          <a:chOff x="0" y="0"/>
+          <a:chExt cx="0" cy="0"/>
+        </a:xfrm>
+      </p:grpSpPr>
+      <p:sp>
+        <p:nvSpPr>
           <p:cNvPr id="2" name="Title 1">
             <a:extLst>
               <a:ext uri="{FF2B5EF4-FFF2-40B4-BE49-F238E27FC236}">
@@ -4980,6 +7282,410 @@
     <p:extLst>
       <p:ext uri="{BB962C8B-B14F-4D97-AF65-F5344CB8AC3E}">
         <p14:creationId xmlns:p14="http://schemas.microsoft.com/office/powerpoint/2010/main" val="1064376262"/>
+      </p:ext>
+    </p:extLst>
+  </p:cSld>
+  <p:clrMapOvr>
+    <a:masterClrMapping/>
+  </p:clrMapOvr>
+</p:sld>
+</file>
+
+<file path=ppt/slides/slide8.xml><?xml version="1.0" encoding="utf-8"?>
+<p:sld xmlns:a="http://schemas.openxmlformats.org/drawingml/2006/main" xmlns:r="http://schemas.openxmlformats.org/officeDocument/2006/relationships" xmlns:p="http://schemas.openxmlformats.org/presentationml/2006/main">
+  <p:cSld>
+    <p:spTree>
+      <p:nvGrpSpPr>
+        <p:cNvPr id="1" name=""/>
+        <p:cNvGrpSpPr/>
+        <p:nvPr/>
+      </p:nvGrpSpPr>
+      <p:grpSpPr>
+        <a:xfrm>
+          <a:off x="0" y="0"/>
+          <a:ext cx="0" cy="0"/>
+          <a:chOff x="0" y="0"/>
+          <a:chExt cx="0" cy="0"/>
+        </a:xfrm>
+      </p:grpSpPr>
+      <p:sp>
+        <p:nvSpPr>
+          <p:cNvPr id="3" name="Content Placeholder 2">
+            <a:extLst>
+              <a:ext uri="{FF2B5EF4-FFF2-40B4-BE49-F238E27FC236}">
+                <a16:creationId xmlns:a16="http://schemas.microsoft.com/office/drawing/2014/main" id="{CDB0A1B1-88E2-76B5-AA82-DBB97847A4C1}"/>
+              </a:ext>
+            </a:extLst>
+          </p:cNvPr>
+          <p:cNvSpPr>
+            <a:spLocks noGrp="1"/>
+          </p:cNvSpPr>
+          <p:nvPr>
+            <p:ph idx="1"/>
+          </p:nvPr>
+        </p:nvSpPr>
+        <p:spPr>
+          <a:xfrm>
+            <a:off x="838200" y="1325563"/>
+            <a:ext cx="10515600" cy="512478"/>
+          </a:xfrm>
+        </p:spPr>
+        <p:txBody>
+          <a:bodyPr>
+            <a:normAutofit fontScale="92500" lnSpcReduction="20000"/>
+          </a:bodyPr>
+          <a:lstStyle/>
+          <a:p>
+            <a:r>
+              <a:rPr lang="en-GB" sz="2000" dirty="0">
+                <a:latin typeface="Open sans" panose="020B0606030504020204" pitchFamily="2" charset="0"/>
+                <a:ea typeface="Open sans" panose="020B0606030504020204" pitchFamily="2" charset="0"/>
+                <a:cs typeface="Open sans" panose="020B0606030504020204" pitchFamily="2" charset="0"/>
+              </a:rPr>
+              <a:t>Clicking the start/stop scraping button on the homepage will toggle whether the scraper is running</a:t>
+            </a:r>
+          </a:p>
+        </p:txBody>
+      </p:sp>
+      <p:sp>
+        <p:nvSpPr>
+          <p:cNvPr id="4" name="Rectangle 3">
+            <a:extLst>
+              <a:ext uri="{FF2B5EF4-FFF2-40B4-BE49-F238E27FC236}">
+                <a16:creationId xmlns:a16="http://schemas.microsoft.com/office/drawing/2014/main" id="{A7D254BB-7612-3CB7-7875-1774E7D04160}"/>
+              </a:ext>
+            </a:extLst>
+          </p:cNvPr>
+          <p:cNvSpPr/>
+          <p:nvPr/>
+        </p:nvSpPr>
+        <p:spPr>
+          <a:xfrm>
+            <a:off x="0" y="0"/>
+            <a:ext cx="12192000" cy="1138687"/>
+          </a:xfrm>
+          <a:prstGeom prst="rect">
+            <a:avLst/>
+          </a:prstGeom>
+          <a:solidFill>
+            <a:srgbClr val="0C2E8A"/>
+          </a:solidFill>
+        </p:spPr>
+        <p:style>
+          <a:lnRef idx="2">
+            <a:schemeClr val="accent1">
+              <a:shade val="50000"/>
+            </a:schemeClr>
+          </a:lnRef>
+          <a:fillRef idx="1">
+            <a:schemeClr val="accent1"/>
+          </a:fillRef>
+          <a:effectRef idx="0">
+            <a:schemeClr val="accent1"/>
+          </a:effectRef>
+          <a:fontRef idx="minor">
+            <a:schemeClr val="lt1"/>
+          </a:fontRef>
+        </p:style>
+        <p:txBody>
+          <a:bodyPr rtlCol="0" anchor="ctr"/>
+          <a:lstStyle/>
+          <a:p>
+            <a:pPr algn="ctr"/>
+            <a:endParaRPr lang="en-GB"/>
+          </a:p>
+        </p:txBody>
+      </p:sp>
+      <p:sp>
+        <p:nvSpPr>
+          <p:cNvPr id="2" name="Title 1">
+            <a:extLst>
+              <a:ext uri="{FF2B5EF4-FFF2-40B4-BE49-F238E27FC236}">
+                <a16:creationId xmlns:a16="http://schemas.microsoft.com/office/drawing/2014/main" id="{1D40E371-0CA0-37E5-0E1F-65FF7634F80C}"/>
+              </a:ext>
+            </a:extLst>
+          </p:cNvPr>
+          <p:cNvSpPr>
+            <a:spLocks noGrp="1"/>
+          </p:cNvSpPr>
+          <p:nvPr>
+            <p:ph type="title"/>
+          </p:nvPr>
+        </p:nvSpPr>
+        <p:spPr>
+          <a:xfrm>
+            <a:off x="838200" y="-93439"/>
+            <a:ext cx="10515600" cy="1325563"/>
+          </a:xfrm>
+        </p:spPr>
+        <p:txBody>
+          <a:bodyPr/>
+          <a:lstStyle/>
+          <a:p>
+            <a:r>
+              <a:rPr lang="en-GB" dirty="0">
+                <a:solidFill>
+                  <a:schemeClr val="bg1"/>
+                </a:solidFill>
+                <a:latin typeface="Open sans" panose="020B0606030504020204" pitchFamily="2" charset="0"/>
+                <a:ea typeface="Open sans" panose="020B0606030504020204" pitchFamily="2" charset="0"/>
+                <a:cs typeface="Open sans" panose="020B0606030504020204" pitchFamily="2" charset="0"/>
+              </a:rPr>
+              <a:t>Enabling/disabling</a:t>
+            </a:r>
+          </a:p>
+        </p:txBody>
+      </p:sp>
+      <p:pic>
+        <p:nvPicPr>
+          <p:cNvPr id="7" name="Picture 6">
+            <a:extLst>
+              <a:ext uri="{FF2B5EF4-FFF2-40B4-BE49-F238E27FC236}">
+                <a16:creationId xmlns:a16="http://schemas.microsoft.com/office/drawing/2014/main" id="{A30FB53D-F264-2F35-CF19-8905A4A5D5CF}"/>
+              </a:ext>
+            </a:extLst>
+          </p:cNvPr>
+          <p:cNvPicPr>
+            <a:picLocks noChangeAspect="1"/>
+          </p:cNvPicPr>
+          <p:nvPr/>
+        </p:nvPicPr>
+        <p:blipFill>
+          <a:blip r:embed="rId3"/>
+          <a:stretch>
+            <a:fillRect/>
+          </a:stretch>
+        </p:blipFill>
+        <p:spPr>
+          <a:xfrm>
+            <a:off x="1209855" y="2632592"/>
+            <a:ext cx="4633362" cy="2690093"/>
+          </a:xfrm>
+          <a:prstGeom prst="rect">
+            <a:avLst/>
+          </a:prstGeom>
+        </p:spPr>
+      </p:pic>
+      <p:pic>
+        <p:nvPicPr>
+          <p:cNvPr id="9" name="Picture 8">
+            <a:extLst>
+              <a:ext uri="{FF2B5EF4-FFF2-40B4-BE49-F238E27FC236}">
+                <a16:creationId xmlns:a16="http://schemas.microsoft.com/office/drawing/2014/main" id="{1E4D48A5-5024-1B6D-98C9-8A8B23E8074F}"/>
+              </a:ext>
+            </a:extLst>
+          </p:cNvPr>
+          <p:cNvPicPr>
+            <a:picLocks noChangeAspect="1"/>
+          </p:cNvPicPr>
+          <p:nvPr/>
+        </p:nvPicPr>
+        <p:blipFill>
+          <a:blip r:embed="rId4"/>
+          <a:stretch>
+            <a:fillRect/>
+          </a:stretch>
+        </p:blipFill>
+        <p:spPr>
+          <a:xfrm>
+            <a:off x="6348785" y="2724040"/>
+            <a:ext cx="4511431" cy="2598645"/>
+          </a:xfrm>
+          <a:prstGeom prst="rect">
+            <a:avLst/>
+          </a:prstGeom>
+        </p:spPr>
+      </p:pic>
+    </p:spTree>
+    <p:extLst>
+      <p:ext uri="{BB962C8B-B14F-4D97-AF65-F5344CB8AC3E}">
+        <p14:creationId xmlns:p14="http://schemas.microsoft.com/office/powerpoint/2010/main" val="1528341679"/>
+      </p:ext>
+    </p:extLst>
+  </p:cSld>
+  <p:clrMapOvr>
+    <a:masterClrMapping/>
+  </p:clrMapOvr>
+</p:sld>
+</file>
+
+<file path=ppt/slides/slide9.xml><?xml version="1.0" encoding="utf-8"?>
+<p:sld xmlns:a="http://schemas.openxmlformats.org/drawingml/2006/main" xmlns:r="http://schemas.openxmlformats.org/officeDocument/2006/relationships" xmlns:p="http://schemas.openxmlformats.org/presentationml/2006/main">
+  <p:cSld>
+    <p:spTree>
+      <p:nvGrpSpPr>
+        <p:cNvPr id="1" name=""/>
+        <p:cNvGrpSpPr/>
+        <p:nvPr/>
+      </p:nvGrpSpPr>
+      <p:grpSpPr>
+        <a:xfrm>
+          <a:off x="0" y="0"/>
+          <a:ext cx="0" cy="0"/>
+          <a:chOff x="0" y="0"/>
+          <a:chExt cx="0" cy="0"/>
+        </a:xfrm>
+      </p:grpSpPr>
+      <p:sp>
+        <p:nvSpPr>
+          <p:cNvPr id="3" name="Content Placeholder 2">
+            <a:extLst>
+              <a:ext uri="{FF2B5EF4-FFF2-40B4-BE49-F238E27FC236}">
+                <a16:creationId xmlns:a16="http://schemas.microsoft.com/office/drawing/2014/main" id="{CDB0A1B1-88E2-76B5-AA82-DBB97847A4C1}"/>
+              </a:ext>
+            </a:extLst>
+          </p:cNvPr>
+          <p:cNvSpPr>
+            <a:spLocks noGrp="1"/>
+          </p:cNvSpPr>
+          <p:nvPr>
+            <p:ph idx="1"/>
+          </p:nvPr>
+        </p:nvSpPr>
+        <p:spPr>
+          <a:xfrm>
+            <a:off x="838200" y="1325563"/>
+            <a:ext cx="10515600" cy="512478"/>
+          </a:xfrm>
+        </p:spPr>
+        <p:txBody>
+          <a:bodyPr/>
+          <a:lstStyle/>
+          <a:p>
+            <a:r>
+              <a:rPr lang="en-GB" dirty="0">
+                <a:latin typeface="Open sans" panose="020B0606030504020204" pitchFamily="2" charset="0"/>
+                <a:ea typeface="Open sans" panose="020B0606030504020204" pitchFamily="2" charset="0"/>
+                <a:cs typeface="Open sans" panose="020B0606030504020204" pitchFamily="2" charset="0"/>
+              </a:rPr>
+              <a:t>Can be toggled with the show/hide visualisation button</a:t>
+            </a:r>
+          </a:p>
+        </p:txBody>
+      </p:sp>
+      <p:sp>
+        <p:nvSpPr>
+          <p:cNvPr id="4" name="Rectangle 3">
+            <a:extLst>
+              <a:ext uri="{FF2B5EF4-FFF2-40B4-BE49-F238E27FC236}">
+                <a16:creationId xmlns:a16="http://schemas.microsoft.com/office/drawing/2014/main" id="{A7D254BB-7612-3CB7-7875-1774E7D04160}"/>
+              </a:ext>
+            </a:extLst>
+          </p:cNvPr>
+          <p:cNvSpPr/>
+          <p:nvPr/>
+        </p:nvSpPr>
+        <p:spPr>
+          <a:xfrm>
+            <a:off x="0" y="0"/>
+            <a:ext cx="12192000" cy="1138687"/>
+          </a:xfrm>
+          <a:prstGeom prst="rect">
+            <a:avLst/>
+          </a:prstGeom>
+          <a:solidFill>
+            <a:srgbClr val="0C2E8A"/>
+          </a:solidFill>
+        </p:spPr>
+        <p:style>
+          <a:lnRef idx="2">
+            <a:schemeClr val="accent1">
+              <a:shade val="50000"/>
+            </a:schemeClr>
+          </a:lnRef>
+          <a:fillRef idx="1">
+            <a:schemeClr val="accent1"/>
+          </a:fillRef>
+          <a:effectRef idx="0">
+            <a:schemeClr val="accent1"/>
+          </a:effectRef>
+          <a:fontRef idx="minor">
+            <a:schemeClr val="lt1"/>
+          </a:fontRef>
+        </p:style>
+        <p:txBody>
+          <a:bodyPr rtlCol="0" anchor="ctr"/>
+          <a:lstStyle/>
+          <a:p>
+            <a:pPr algn="ctr"/>
+            <a:endParaRPr lang="en-GB"/>
+          </a:p>
+        </p:txBody>
+      </p:sp>
+      <p:sp>
+        <p:nvSpPr>
+          <p:cNvPr id="2" name="Title 1">
+            <a:extLst>
+              <a:ext uri="{FF2B5EF4-FFF2-40B4-BE49-F238E27FC236}">
+                <a16:creationId xmlns:a16="http://schemas.microsoft.com/office/drawing/2014/main" id="{1D40E371-0CA0-37E5-0E1F-65FF7634F80C}"/>
+              </a:ext>
+            </a:extLst>
+          </p:cNvPr>
+          <p:cNvSpPr>
+            <a:spLocks noGrp="1"/>
+          </p:cNvSpPr>
+          <p:nvPr>
+            <p:ph type="title"/>
+          </p:nvPr>
+        </p:nvSpPr>
+        <p:spPr>
+          <a:xfrm>
+            <a:off x="838200" y="-93439"/>
+            <a:ext cx="10515600" cy="1325563"/>
+          </a:xfrm>
+        </p:spPr>
+        <p:txBody>
+          <a:bodyPr/>
+          <a:lstStyle/>
+          <a:p>
+            <a:r>
+              <a:rPr lang="en-GB" dirty="0">
+                <a:solidFill>
+                  <a:schemeClr val="bg1"/>
+                </a:solidFill>
+                <a:latin typeface="Open sans" panose="020B0606030504020204" pitchFamily="2" charset="0"/>
+                <a:ea typeface="Open sans" panose="020B0606030504020204" pitchFamily="2" charset="0"/>
+                <a:cs typeface="Open sans" panose="020B0606030504020204" pitchFamily="2" charset="0"/>
+              </a:rPr>
+              <a:t>Visualisation</a:t>
+            </a:r>
+          </a:p>
+        </p:txBody>
+      </p:sp>
+      <p:pic>
+        <p:nvPicPr>
+          <p:cNvPr id="6" name="Picture 5">
+            <a:extLst>
+              <a:ext uri="{FF2B5EF4-FFF2-40B4-BE49-F238E27FC236}">
+                <a16:creationId xmlns:a16="http://schemas.microsoft.com/office/drawing/2014/main" id="{6F9DCC1B-AB0B-9A52-8FEE-F7C58C4D95F0}"/>
+              </a:ext>
+            </a:extLst>
+          </p:cNvPr>
+          <p:cNvPicPr>
+            <a:picLocks noChangeAspect="1"/>
+          </p:cNvPicPr>
+          <p:nvPr/>
+        </p:nvPicPr>
+        <p:blipFill>
+          <a:blip r:embed="rId3"/>
+          <a:stretch>
+            <a:fillRect/>
+          </a:stretch>
+        </p:blipFill>
+        <p:spPr>
+          <a:xfrm>
+            <a:off x="2231136" y="1931480"/>
+            <a:ext cx="8019288" cy="4432709"/>
+          </a:xfrm>
+          <a:prstGeom prst="rect">
+            <a:avLst/>
+          </a:prstGeom>
+        </p:spPr>
+      </p:pic>
+    </p:spTree>
+    <p:extLst>
+      <p:ext uri="{BB962C8B-B14F-4D97-AF65-F5344CB8AC3E}">
+        <p14:creationId xmlns:p14="http://schemas.microsoft.com/office/powerpoint/2010/main" val="1970925233"/>
       </p:ext>
     </p:extLst>
   </p:cSld>

</xml_diff>